<commit_message>
Added firm size and wages lecture plus Stata do file. Working on R version
</commit_message>
<xml_diff>
--- a/firm_size_and_wages/Firm size and wages_2017.pptx
+++ b/firm_size_and_wages/Firm size and wages_2017.pptx
@@ -171,13 +171,33 @@
       </a:defRPr>
     </a:lvl9pPr>
   </p:defaultTextStyle>
+  <p:extLst>
+    <p:ext uri="{EFAFB233-063F-42B5-8137-9DF3F51BA10A}">
+      <p15:sldGuideLst xmlns:p15="http://schemas.microsoft.com/office/powerpoint/2012/main">
+        <p15:guide id="1" orient="horz" pos="2160">
+          <p15:clr>
+            <a:srgbClr val="A4A3A4"/>
+          </p15:clr>
+        </p15:guide>
+        <p15:guide id="2" pos="2880">
+          <p15:clr>
+            <a:srgbClr val="A4A3A4"/>
+          </p15:clr>
+        </p15:guide>
+      </p15:sldGuideLst>
+    </p:ext>
+  </p:extLst>
 </p:presentation>
 </file>
 
+<file path=ppt/revisionInfo.xml><?xml version="1.0" encoding="utf-8"?>
+<p1510:revInfo xmlns:a="http://schemas.openxmlformats.org/drawingml/2006/main" xmlns:r="http://schemas.openxmlformats.org/officeDocument/2006/relationships" xmlns:p1510="http://schemas.microsoft.com/office/powerpoint/2015/10/main"/>
+</file>
+
 <file path=ppt/charts/chart1.xml><?xml version="1.0" encoding="utf-8"?>
-<c:chartSpace xmlns:c="http://schemas.openxmlformats.org/drawingml/2006/chart" xmlns:a="http://schemas.openxmlformats.org/drawingml/2006/main" xmlns:r="http://schemas.openxmlformats.org/officeDocument/2006/relationships">
+<c:chartSpace xmlns:c="http://schemas.openxmlformats.org/drawingml/2006/chart" xmlns:a="http://schemas.openxmlformats.org/drawingml/2006/main" xmlns:r="http://schemas.openxmlformats.org/officeDocument/2006/relationships" xmlns:c16r2="http://schemas.microsoft.com/office/drawing/2015/06/chart">
   <c:date1904 val="0"/>
-  <c:lang val="en-ZA"/>
+  <c:lang val="en-US"/>
   <c:roundedCorners val="0"/>
   <mc:AlternateContent xmlns:mc="http://schemas.openxmlformats.org/markup-compatibility/2006">
     <mc:Choice xmlns:c14="http://schemas.microsoft.com/office/drawing/2007/8/2/chart" Requires="c14">
@@ -339,6 +359,11 @@
             </c:numRef>
           </c:val>
           <c:smooth val="0"/>
+          <c:extLst>
+            <c:ext xmlns:c16="http://schemas.microsoft.com/office/drawing/2014/chart" uri="{C3380CC4-5D6E-409C-BE32-E72D297353CC}">
+              <c16:uniqueId val="{00000000-148C-4F61-AACA-F2759B4593EE}"/>
+            </c:ext>
+          </c:extLst>
         </c:ser>
         <c:dLbls>
           <c:showLegendKey val="0"/>
@@ -348,7 +373,6 @@
           <c:showPercent val="0"/>
           <c:showBubbleSize val="0"/>
         </c:dLbls>
-        <c:marker val="1"/>
         <c:smooth val="0"/>
         <c:axId val="78293632"/>
         <c:axId val="46940928"/>
@@ -376,7 +400,6 @@
               </a:p>
             </c:rich>
           </c:tx>
-          <c:layout/>
           <c:overlay val="0"/>
         </c:title>
         <c:numFmt formatCode="General" sourceLinked="1"/>
@@ -414,7 +437,6 @@
               </a:p>
             </c:rich>
           </c:tx>
-          <c:layout/>
           <c:overlay val="0"/>
         </c:title>
         <c:numFmt formatCode="General" sourceLinked="1"/>
@@ -447,9 +469,9 @@
 </file>
 
 <file path=ppt/charts/chart2.xml><?xml version="1.0" encoding="utf-8"?>
-<c:chartSpace xmlns:c="http://schemas.openxmlformats.org/drawingml/2006/chart" xmlns:a="http://schemas.openxmlformats.org/drawingml/2006/main" xmlns:r="http://schemas.openxmlformats.org/officeDocument/2006/relationships">
+<c:chartSpace xmlns:c="http://schemas.openxmlformats.org/drawingml/2006/chart" xmlns:a="http://schemas.openxmlformats.org/drawingml/2006/main" xmlns:r="http://schemas.openxmlformats.org/officeDocument/2006/relationships" xmlns:c16r2="http://schemas.microsoft.com/office/drawing/2015/06/chart">
   <c:date1904 val="0"/>
-  <c:lang val="en-ZA"/>
+  <c:lang val="en-US"/>
   <c:roundedCorners val="0"/>
   <mc:AlternateContent xmlns:mc="http://schemas.openxmlformats.org/markup-compatibility/2006">
     <mc:Choice xmlns:c14="http://schemas.microsoft.com/office/drawing/2007/8/2/chart" Requires="c14">
@@ -476,7 +498,6 @@
           </a:p>
         </c:rich>
       </c:tx>
-      <c:layout/>
       <c:overlay val="0"/>
     </c:title>
     <c:autoTitleDeleted val="0"/>
@@ -566,6 +587,11 @@
               </c:numCache>
             </c:numRef>
           </c:val>
+          <c:extLst>
+            <c:ext xmlns:c16="http://schemas.microsoft.com/office/drawing/2014/chart" uri="{C3380CC4-5D6E-409C-BE32-E72D297353CC}">
+              <c16:uniqueId val="{00000000-B719-4E63-9953-5FD74637F774}"/>
+            </c:ext>
+          </c:extLst>
         </c:ser>
         <c:ser>
           <c:idx val="1"/>
@@ -647,6 +673,11 @@
               </c:numCache>
             </c:numRef>
           </c:val>
+          <c:extLst>
+            <c:ext xmlns:c16="http://schemas.microsoft.com/office/drawing/2014/chart" uri="{C3380CC4-5D6E-409C-BE32-E72D297353CC}">
+              <c16:uniqueId val="{00000001-B719-4E63-9953-5FD74637F774}"/>
+            </c:ext>
+          </c:extLst>
         </c:ser>
         <c:dLbls>
           <c:showLegendKey val="0"/>
@@ -667,6 +698,7 @@
         </c:scaling>
         <c:delete val="0"/>
         <c:axPos val="b"/>
+        <c:numFmt formatCode="General" sourceLinked="0"/>
         <c:majorTickMark val="out"/>
         <c:minorTickMark val="none"/>
         <c:tickLblPos val="nextTo"/>
@@ -696,7 +728,6 @@
     </c:plotArea>
     <c:legend>
       <c:legendPos val="r"/>
-      <c:layout/>
       <c:overlay val="0"/>
     </c:legend>
     <c:plotVisOnly val="1"/>
@@ -710,9 +741,9 @@
 </file>
 
 <file path=ppt/charts/chart3.xml><?xml version="1.0" encoding="utf-8"?>
-<c:chartSpace xmlns:c="http://schemas.openxmlformats.org/drawingml/2006/chart" xmlns:a="http://schemas.openxmlformats.org/drawingml/2006/main" xmlns:r="http://schemas.openxmlformats.org/officeDocument/2006/relationships">
+<c:chartSpace xmlns:c="http://schemas.openxmlformats.org/drawingml/2006/chart" xmlns:a="http://schemas.openxmlformats.org/drawingml/2006/main" xmlns:r="http://schemas.openxmlformats.org/officeDocument/2006/relationships" xmlns:c16r2="http://schemas.microsoft.com/office/drawing/2015/06/chart">
   <c:date1904 val="0"/>
-  <c:lang val="en-ZA"/>
+  <c:lang val="en-US"/>
   <c:roundedCorners val="0"/>
   <mc:AlternateContent xmlns:mc="http://schemas.openxmlformats.org/markup-compatibility/2006">
     <mc:Choice xmlns:c14="http://schemas.microsoft.com/office/drawing/2007/8/2/chart" Requires="c14">
@@ -739,7 +770,6 @@
           </a:p>
         </c:rich>
       </c:tx>
-      <c:layout/>
       <c:overlay val="0"/>
     </c:title>
     <c:autoTitleDeleted val="0"/>
@@ -803,6 +833,11 @@
               </c:numCache>
             </c:numRef>
           </c:val>
+          <c:extLst>
+            <c:ext xmlns:c16="http://schemas.microsoft.com/office/drawing/2014/chart" uri="{C3380CC4-5D6E-409C-BE32-E72D297353CC}">
+              <c16:uniqueId val="{00000000-872A-48B9-ADFD-765AF065C830}"/>
+            </c:ext>
+          </c:extLst>
         </c:ser>
         <c:dLbls>
           <c:showLegendKey val="0"/>
@@ -823,6 +858,7 @@
         </c:scaling>
         <c:delete val="0"/>
         <c:axPos val="b"/>
+        <c:numFmt formatCode="General" sourceLinked="0"/>
         <c:majorTickMark val="out"/>
         <c:minorTickMark val="none"/>
         <c:tickLblPos val="nextTo"/>
@@ -1446,35 +1482,35 @@
           <a:p>
             <a:pPr lvl="0"/>
             <a:r>
-              <a:rPr lang="en-ZA" noProof="0" smtClean="0"/>
+              <a:rPr lang="en-ZA" noProof="0"/>
               <a:t>Click to edit Master text styles</a:t>
             </a:r>
           </a:p>
           <a:p>
             <a:pPr lvl="1"/>
             <a:r>
-              <a:rPr lang="en-ZA" noProof="0" smtClean="0"/>
+              <a:rPr lang="en-ZA" noProof="0"/>
               <a:t>Second level</a:t>
             </a:r>
           </a:p>
           <a:p>
             <a:pPr lvl="2"/>
             <a:r>
-              <a:rPr lang="en-ZA" noProof="0" smtClean="0"/>
+              <a:rPr lang="en-ZA" noProof="0"/>
               <a:t>Third level</a:t>
             </a:r>
           </a:p>
           <a:p>
             <a:pPr lvl="3"/>
             <a:r>
-              <a:rPr lang="en-ZA" noProof="0" smtClean="0"/>
+              <a:rPr lang="en-ZA" noProof="0"/>
               <a:t>Fourth level</a:t>
             </a:r>
           </a:p>
           <a:p>
             <a:pPr lvl="4"/>
             <a:r>
-              <a:rPr lang="en-ZA" noProof="0" smtClean="0"/>
+              <a:rPr lang="en-ZA" noProof="0"/>
               <a:t>Fifth level</a:t>
             </a:r>
           </a:p>
@@ -2119,7 +2155,7 @@
               <a:defRPr/>
             </a:pPr>
             <a:r>
-              <a:rPr lang="en-ZA" sz="1000" b="1" dirty="0" err="1" smtClean="0">
+              <a:rPr lang="en-ZA" sz="1000" b="1" dirty="0" err="1">
                 <a:solidFill>
                   <a:srgbClr val="8C969C"/>
                 </a:solidFill>
@@ -2129,7 +2165,7 @@
               <a:t>Fakulteit</a:t>
             </a:r>
             <a:r>
-              <a:rPr lang="en-ZA" sz="1000" b="1" dirty="0" smtClean="0">
+              <a:rPr lang="en-ZA" sz="1000" b="1" dirty="0">
                 <a:solidFill>
                   <a:srgbClr val="8C969C"/>
                 </a:solidFill>
@@ -2139,7 +2175,7 @@
               <a:t> </a:t>
             </a:r>
             <a:r>
-              <a:rPr lang="en-ZA" sz="1000" b="1" dirty="0" err="1" smtClean="0">
+              <a:rPr lang="en-ZA" sz="1000" b="1" dirty="0" err="1">
                 <a:solidFill>
                   <a:srgbClr val="8C969C"/>
                 </a:solidFill>
@@ -2149,7 +2185,7 @@
               <a:t>Geneeskunde</a:t>
             </a:r>
             <a:r>
-              <a:rPr lang="en-ZA" sz="1000" b="1" dirty="0" smtClean="0">
+              <a:rPr lang="en-ZA" sz="1000" b="1" dirty="0">
                 <a:solidFill>
                   <a:srgbClr val="8C969C"/>
                 </a:solidFill>
@@ -2159,7 +2195,7 @@
               <a:t> en </a:t>
             </a:r>
             <a:r>
-              <a:rPr lang="en-ZA" sz="1000" b="1" dirty="0" err="1" smtClean="0">
+              <a:rPr lang="en-ZA" sz="1000" b="1" dirty="0" err="1">
                 <a:solidFill>
                   <a:srgbClr val="8C969C"/>
                 </a:solidFill>
@@ -2169,7 +2205,7 @@
               <a:t>Gesondheidswetenskappe</a:t>
             </a:r>
             <a:r>
-              <a:rPr lang="en-ZA" sz="1000" b="1" dirty="0" smtClean="0">
+              <a:rPr lang="en-ZA" sz="1000" b="1" dirty="0">
                 <a:solidFill>
                   <a:srgbClr val="8C969C"/>
                 </a:solidFill>
@@ -2184,7 +2220,7 @@
               <a:defRPr/>
             </a:pPr>
             <a:r>
-              <a:rPr lang="en-ZA" sz="1000" b="1" dirty="0" smtClean="0">
+              <a:rPr lang="en-ZA" sz="1000" b="1" dirty="0">
                 <a:solidFill>
                   <a:srgbClr val="8C969C"/>
                 </a:solidFill>
@@ -2195,7 +2231,7 @@
               <a:t></a:t>
             </a:r>
             <a:r>
-              <a:rPr lang="en-ZA" sz="1000" b="1" dirty="0" smtClean="0">
+              <a:rPr lang="en-ZA" sz="1000" b="1" dirty="0">
                 <a:solidFill>
                   <a:srgbClr val="8C969C"/>
                 </a:solidFill>
@@ -2210,7 +2246,7 @@
               <a:defRPr/>
             </a:pPr>
             <a:r>
-              <a:rPr lang="en-ZA" sz="1000" b="1" dirty="0" smtClean="0">
+              <a:rPr lang="en-ZA" sz="1000" b="1" dirty="0">
                 <a:solidFill>
                   <a:srgbClr val="8C969C"/>
                 </a:solidFill>
@@ -2220,7 +2256,7 @@
               <a:t>Faculty of Medicine and Health Sciences </a:t>
             </a:r>
             <a:r>
-              <a:rPr lang="en-ZA" sz="1000" dirty="0" smtClean="0"/>
+              <a:rPr lang="en-ZA" sz="1000" dirty="0"/>
               <a:t> </a:t>
             </a:r>
           </a:p>
@@ -2291,10 +2327,10 @@
           <a:p>
             <a:pPr lvl="0"/>
             <a:r>
-              <a:rPr lang="en-US" noProof="0" smtClean="0"/>
+              <a:rPr lang="en-US" noProof="0"/>
               <a:t>Click to edit Master title style</a:t>
             </a:r>
-            <a:endParaRPr lang="en-ZA" noProof="0" smtClean="0"/>
+            <a:endParaRPr lang="en-ZA" noProof="0"/>
           </a:p>
         </p:txBody>
       </p:sp>
@@ -2326,10 +2362,10 @@
           <a:p>
             <a:pPr lvl="0"/>
             <a:r>
-              <a:rPr lang="en-US" noProof="0" smtClean="0"/>
+              <a:rPr lang="en-US" noProof="0"/>
               <a:t>Click to edit Master subtitle style</a:t>
             </a:r>
-            <a:endParaRPr lang="en-ZA" noProof="0" dirty="0" smtClean="0"/>
+            <a:endParaRPr lang="en-ZA" noProof="0" dirty="0"/>
           </a:p>
         </p:txBody>
       </p:sp>
@@ -2374,7 +2410,7 @@
           <a:lstStyle/>
           <a:p>
             <a:r>
-              <a:rPr lang="en-US" smtClean="0"/>
+              <a:rPr lang="en-US"/>
               <a:t>Click to edit Master title style</a:t>
             </a:r>
             <a:endParaRPr lang="en-ZA"/>
@@ -2398,35 +2434,35 @@
           <a:p>
             <a:pPr lvl="0"/>
             <a:r>
-              <a:rPr lang="en-US" smtClean="0"/>
+              <a:rPr lang="en-US"/>
               <a:t>Click to edit Master text styles</a:t>
             </a:r>
           </a:p>
           <a:p>
             <a:pPr lvl="1"/>
             <a:r>
-              <a:rPr lang="en-US" smtClean="0"/>
+              <a:rPr lang="en-US"/>
               <a:t>Second level</a:t>
             </a:r>
           </a:p>
           <a:p>
             <a:pPr lvl="2"/>
             <a:r>
-              <a:rPr lang="en-US" smtClean="0"/>
+              <a:rPr lang="en-US"/>
               <a:t>Third level</a:t>
             </a:r>
           </a:p>
           <a:p>
             <a:pPr lvl="3"/>
             <a:r>
-              <a:rPr lang="en-US" smtClean="0"/>
+              <a:rPr lang="en-US"/>
               <a:t>Fourth level</a:t>
             </a:r>
           </a:p>
           <a:p>
             <a:pPr lvl="4"/>
             <a:r>
-              <a:rPr lang="en-US" smtClean="0"/>
+              <a:rPr lang="en-US"/>
               <a:t>Fifth level</a:t>
             </a:r>
             <a:endParaRPr lang="en-ZA"/>
@@ -2514,7 +2550,7 @@
           <a:lstStyle/>
           <a:p>
             <a:r>
-              <a:rPr lang="en-US" smtClean="0"/>
+              <a:rPr lang="en-US"/>
               <a:t>Click to edit Master title style</a:t>
             </a:r>
             <a:endParaRPr lang="en-ZA"/>
@@ -2543,35 +2579,35 @@
           <a:p>
             <a:pPr lvl="0"/>
             <a:r>
-              <a:rPr lang="en-US" smtClean="0"/>
+              <a:rPr lang="en-US"/>
               <a:t>Click to edit Master text styles</a:t>
             </a:r>
           </a:p>
           <a:p>
             <a:pPr lvl="1"/>
             <a:r>
-              <a:rPr lang="en-US" smtClean="0"/>
+              <a:rPr lang="en-US"/>
               <a:t>Second level</a:t>
             </a:r>
           </a:p>
           <a:p>
             <a:pPr lvl="2"/>
             <a:r>
-              <a:rPr lang="en-US" smtClean="0"/>
+              <a:rPr lang="en-US"/>
               <a:t>Third level</a:t>
             </a:r>
           </a:p>
           <a:p>
             <a:pPr lvl="3"/>
             <a:r>
-              <a:rPr lang="en-US" smtClean="0"/>
+              <a:rPr lang="en-US"/>
               <a:t>Fourth level</a:t>
             </a:r>
           </a:p>
           <a:p>
             <a:pPr lvl="4"/>
             <a:r>
-              <a:rPr lang="en-US" smtClean="0"/>
+              <a:rPr lang="en-US"/>
               <a:t>Fifth level</a:t>
             </a:r>
             <a:endParaRPr lang="en-ZA"/>
@@ -2659,7 +2695,7 @@
           <a:lstStyle/>
           <a:p>
             <a:r>
-              <a:rPr lang="en-US" smtClean="0"/>
+              <a:rPr lang="en-US"/>
               <a:t>Click to edit Master title style</a:t>
             </a:r>
             <a:endParaRPr lang="en-ZA"/>
@@ -2688,10 +2724,10 @@
           <a:p>
             <a:pPr lvl="0"/>
             <a:r>
-              <a:rPr lang="en-US" noProof="0" smtClean="0"/>
+              <a:rPr lang="en-US" noProof="0"/>
               <a:t>Click icon to add chart</a:t>
             </a:r>
-            <a:endParaRPr lang="en-ZA" noProof="0" smtClean="0"/>
+            <a:endParaRPr lang="en-ZA" noProof="0"/>
           </a:p>
         </p:txBody>
       </p:sp>
@@ -2776,7 +2812,7 @@
           <a:lstStyle/>
           <a:p>
             <a:r>
-              <a:rPr lang="en-US" smtClean="0"/>
+              <a:rPr lang="en-US"/>
               <a:t>Click to edit Master title style</a:t>
             </a:r>
             <a:endParaRPr lang="en-ZA"/>
@@ -2859,7 +2895,7 @@
           <a:lstStyle/>
           <a:p>
             <a:r>
-              <a:rPr lang="en-US" smtClean="0"/>
+              <a:rPr lang="en-US"/>
               <a:t>Click to edit Master title style</a:t>
             </a:r>
             <a:endParaRPr lang="en-ZA"/>
@@ -2883,35 +2919,35 @@
           <a:p>
             <a:pPr lvl="0"/>
             <a:r>
-              <a:rPr lang="en-US" smtClean="0"/>
+              <a:rPr lang="en-US"/>
               <a:t>Click to edit Master text styles</a:t>
             </a:r>
           </a:p>
           <a:p>
             <a:pPr lvl="1"/>
             <a:r>
-              <a:rPr lang="en-US" smtClean="0"/>
+              <a:rPr lang="en-US"/>
               <a:t>Second level</a:t>
             </a:r>
           </a:p>
           <a:p>
             <a:pPr lvl="2"/>
             <a:r>
-              <a:rPr lang="en-US" smtClean="0"/>
+              <a:rPr lang="en-US"/>
               <a:t>Third level</a:t>
             </a:r>
           </a:p>
           <a:p>
             <a:pPr lvl="3"/>
             <a:r>
-              <a:rPr lang="en-US" smtClean="0"/>
+              <a:rPr lang="en-US"/>
               <a:t>Fourth level</a:t>
             </a:r>
           </a:p>
           <a:p>
             <a:pPr lvl="4"/>
             <a:r>
-              <a:rPr lang="en-US" smtClean="0"/>
+              <a:rPr lang="en-US"/>
               <a:t>Fifth level</a:t>
             </a:r>
             <a:endParaRPr lang="en-ZA"/>
@@ -3003,7 +3039,7 @@
           </a:lstStyle>
           <a:p>
             <a:r>
-              <a:rPr lang="en-US" smtClean="0"/>
+              <a:rPr lang="en-US"/>
               <a:t>Click to edit Master title style</a:t>
             </a:r>
             <a:endParaRPr lang="en-ZA"/>
@@ -3069,7 +3105,7 @@
           <a:p>
             <a:pPr lvl="0"/>
             <a:r>
-              <a:rPr lang="en-US" smtClean="0"/>
+              <a:rPr lang="en-US"/>
               <a:t>Click to edit Master text styles</a:t>
             </a:r>
           </a:p>
@@ -3151,7 +3187,7 @@
           <a:lstStyle/>
           <a:p>
             <a:r>
-              <a:rPr lang="en-US" smtClean="0"/>
+              <a:rPr lang="en-US"/>
               <a:t>Click to edit Master title style</a:t>
             </a:r>
             <a:endParaRPr lang="en-ZA"/>
@@ -3208,35 +3244,35 @@
           <a:p>
             <a:pPr lvl="0"/>
             <a:r>
-              <a:rPr lang="en-US" smtClean="0"/>
+              <a:rPr lang="en-US"/>
               <a:t>Click to edit Master text styles</a:t>
             </a:r>
           </a:p>
           <a:p>
             <a:pPr lvl="1"/>
             <a:r>
-              <a:rPr lang="en-US" smtClean="0"/>
+              <a:rPr lang="en-US"/>
               <a:t>Second level</a:t>
             </a:r>
           </a:p>
           <a:p>
             <a:pPr lvl="2"/>
             <a:r>
-              <a:rPr lang="en-US" smtClean="0"/>
+              <a:rPr lang="en-US"/>
               <a:t>Third level</a:t>
             </a:r>
           </a:p>
           <a:p>
             <a:pPr lvl="3"/>
             <a:r>
-              <a:rPr lang="en-US" smtClean="0"/>
+              <a:rPr lang="en-US"/>
               <a:t>Fourth level</a:t>
             </a:r>
           </a:p>
           <a:p>
             <a:pPr lvl="4"/>
             <a:r>
-              <a:rPr lang="en-US" smtClean="0"/>
+              <a:rPr lang="en-US"/>
               <a:t>Fifth level</a:t>
             </a:r>
             <a:endParaRPr lang="en-ZA"/>
@@ -3293,35 +3329,35 @@
           <a:p>
             <a:pPr lvl="0"/>
             <a:r>
-              <a:rPr lang="en-US" smtClean="0"/>
+              <a:rPr lang="en-US"/>
               <a:t>Click to edit Master text styles</a:t>
             </a:r>
           </a:p>
           <a:p>
             <a:pPr lvl="1"/>
             <a:r>
-              <a:rPr lang="en-US" smtClean="0"/>
+              <a:rPr lang="en-US"/>
               <a:t>Second level</a:t>
             </a:r>
           </a:p>
           <a:p>
             <a:pPr lvl="2"/>
             <a:r>
-              <a:rPr lang="en-US" smtClean="0"/>
+              <a:rPr lang="en-US"/>
               <a:t>Third level</a:t>
             </a:r>
           </a:p>
           <a:p>
             <a:pPr lvl="3"/>
             <a:r>
-              <a:rPr lang="en-US" smtClean="0"/>
+              <a:rPr lang="en-US"/>
               <a:t>Fourth level</a:t>
             </a:r>
           </a:p>
           <a:p>
             <a:pPr lvl="4"/>
             <a:r>
-              <a:rPr lang="en-US" smtClean="0"/>
+              <a:rPr lang="en-US"/>
               <a:t>Fifth level</a:t>
             </a:r>
             <a:endParaRPr lang="en-ZA"/>
@@ -3413,7 +3449,7 @@
           </a:lstStyle>
           <a:p>
             <a:r>
-              <a:rPr lang="en-US" smtClean="0"/>
+              <a:rPr lang="en-US"/>
               <a:t>Click to edit Master title style</a:t>
             </a:r>
             <a:endParaRPr lang="en-ZA"/>
@@ -3479,7 +3515,7 @@
           <a:p>
             <a:pPr lvl="0"/>
             <a:r>
-              <a:rPr lang="en-US" smtClean="0"/>
+              <a:rPr lang="en-US"/>
               <a:t>Click to edit Master text styles</a:t>
             </a:r>
           </a:p>
@@ -3535,35 +3571,35 @@
           <a:p>
             <a:pPr lvl="0"/>
             <a:r>
-              <a:rPr lang="en-US" smtClean="0"/>
+              <a:rPr lang="en-US"/>
               <a:t>Click to edit Master text styles</a:t>
             </a:r>
           </a:p>
           <a:p>
             <a:pPr lvl="1"/>
             <a:r>
-              <a:rPr lang="en-US" smtClean="0"/>
+              <a:rPr lang="en-US"/>
               <a:t>Second level</a:t>
             </a:r>
           </a:p>
           <a:p>
             <a:pPr lvl="2"/>
             <a:r>
-              <a:rPr lang="en-US" smtClean="0"/>
+              <a:rPr lang="en-US"/>
               <a:t>Third level</a:t>
             </a:r>
           </a:p>
           <a:p>
             <a:pPr lvl="3"/>
             <a:r>
-              <a:rPr lang="en-US" smtClean="0"/>
+              <a:rPr lang="en-US"/>
               <a:t>Fourth level</a:t>
             </a:r>
           </a:p>
           <a:p>
             <a:pPr lvl="4"/>
             <a:r>
-              <a:rPr lang="en-US" smtClean="0"/>
+              <a:rPr lang="en-US"/>
               <a:t>Fifth level</a:t>
             </a:r>
             <a:endParaRPr lang="en-ZA"/>
@@ -3629,7 +3665,7 @@
           <a:p>
             <a:pPr lvl="0"/>
             <a:r>
-              <a:rPr lang="en-US" smtClean="0"/>
+              <a:rPr lang="en-US"/>
               <a:t>Click to edit Master text styles</a:t>
             </a:r>
           </a:p>
@@ -3685,35 +3721,35 @@
           <a:p>
             <a:pPr lvl="0"/>
             <a:r>
-              <a:rPr lang="en-US" smtClean="0"/>
+              <a:rPr lang="en-US"/>
               <a:t>Click to edit Master text styles</a:t>
             </a:r>
           </a:p>
           <a:p>
             <a:pPr lvl="1"/>
             <a:r>
-              <a:rPr lang="en-US" smtClean="0"/>
+              <a:rPr lang="en-US"/>
               <a:t>Second level</a:t>
             </a:r>
           </a:p>
           <a:p>
             <a:pPr lvl="2"/>
             <a:r>
-              <a:rPr lang="en-US" smtClean="0"/>
+              <a:rPr lang="en-US"/>
               <a:t>Third level</a:t>
             </a:r>
           </a:p>
           <a:p>
             <a:pPr lvl="3"/>
             <a:r>
-              <a:rPr lang="en-US" smtClean="0"/>
+              <a:rPr lang="en-US"/>
               <a:t>Fourth level</a:t>
             </a:r>
           </a:p>
           <a:p>
             <a:pPr lvl="4"/>
             <a:r>
-              <a:rPr lang="en-US" smtClean="0"/>
+              <a:rPr lang="en-US"/>
               <a:t>Fifth level</a:t>
             </a:r>
             <a:endParaRPr lang="en-ZA"/>
@@ -3796,7 +3832,7 @@
           <a:lstStyle/>
           <a:p>
             <a:r>
-              <a:rPr lang="en-US" smtClean="0"/>
+              <a:rPr lang="en-US"/>
               <a:t>Click to edit Master title style</a:t>
             </a:r>
             <a:endParaRPr lang="en-ZA"/>
@@ -3948,7 +3984,7 @@
           </a:lstStyle>
           <a:p>
             <a:r>
-              <a:rPr lang="en-US" smtClean="0"/>
+              <a:rPr lang="en-US"/>
               <a:t>Click to edit Master title style</a:t>
             </a:r>
             <a:endParaRPr lang="en-ZA"/>
@@ -4005,35 +4041,35 @@
           <a:p>
             <a:pPr lvl="0"/>
             <a:r>
-              <a:rPr lang="en-US" smtClean="0"/>
+              <a:rPr lang="en-US"/>
               <a:t>Click to edit Master text styles</a:t>
             </a:r>
           </a:p>
           <a:p>
             <a:pPr lvl="1"/>
             <a:r>
-              <a:rPr lang="en-US" smtClean="0"/>
+              <a:rPr lang="en-US"/>
               <a:t>Second level</a:t>
             </a:r>
           </a:p>
           <a:p>
             <a:pPr lvl="2"/>
             <a:r>
-              <a:rPr lang="en-US" smtClean="0"/>
+              <a:rPr lang="en-US"/>
               <a:t>Third level</a:t>
             </a:r>
           </a:p>
           <a:p>
             <a:pPr lvl="3"/>
             <a:r>
-              <a:rPr lang="en-US" smtClean="0"/>
+              <a:rPr lang="en-US"/>
               <a:t>Fourth level</a:t>
             </a:r>
           </a:p>
           <a:p>
             <a:pPr lvl="4"/>
             <a:r>
-              <a:rPr lang="en-US" smtClean="0"/>
+              <a:rPr lang="en-US"/>
               <a:t>Fifth level</a:t>
             </a:r>
             <a:endParaRPr lang="en-ZA"/>
@@ -4099,7 +4135,7 @@
           <a:p>
             <a:pPr lvl="0"/>
             <a:r>
-              <a:rPr lang="en-US" smtClean="0"/>
+              <a:rPr lang="en-US"/>
               <a:t>Click to edit Master text styles</a:t>
             </a:r>
           </a:p>
@@ -4190,7 +4226,7 @@
           </a:lstStyle>
           <a:p>
             <a:r>
-              <a:rPr lang="en-US" smtClean="0"/>
+              <a:rPr lang="en-US"/>
               <a:t>Click to edit Master title style</a:t>
             </a:r>
             <a:endParaRPr lang="en-ZA"/>
@@ -4256,10 +4292,10 @@
           <a:p>
             <a:pPr lvl="0"/>
             <a:r>
-              <a:rPr lang="en-US" noProof="0" smtClean="0"/>
+              <a:rPr lang="en-US" noProof="0"/>
               <a:t>Click icon to add picture</a:t>
             </a:r>
-            <a:endParaRPr lang="en-ZA" noProof="0" smtClean="0"/>
+            <a:endParaRPr lang="en-ZA" noProof="0"/>
           </a:p>
         </p:txBody>
       </p:sp>
@@ -4322,7 +4358,7 @@
           <a:p>
             <a:pPr lvl="0"/>
             <a:r>
-              <a:rPr lang="en-US" smtClean="0"/>
+              <a:rPr lang="en-US"/>
               <a:t>Click to edit Master text styles</a:t>
             </a:r>
           </a:p>
@@ -4517,10 +4553,10 @@
           <a:p>
             <a:pPr lvl="0"/>
             <a:r>
-              <a:rPr lang="en-US" smtClean="0"/>
+              <a:rPr lang="en-US"/>
               <a:t>Click to edit Master title style</a:t>
             </a:r>
-            <a:endParaRPr lang="en-ZA" smtClean="0"/>
+            <a:endParaRPr lang="en-ZA"/>
           </a:p>
         </p:txBody>
       </p:sp>
@@ -4561,38 +4597,38 @@
           <a:p>
             <a:pPr lvl="0"/>
             <a:r>
-              <a:rPr lang="en-US" smtClean="0"/>
+              <a:rPr lang="en-US"/>
               <a:t>Click to edit Master text styles</a:t>
             </a:r>
           </a:p>
           <a:p>
             <a:pPr lvl="1"/>
             <a:r>
-              <a:rPr lang="en-US" smtClean="0"/>
+              <a:rPr lang="en-US"/>
               <a:t>Second level</a:t>
             </a:r>
           </a:p>
           <a:p>
             <a:pPr lvl="2"/>
             <a:r>
-              <a:rPr lang="en-US" smtClean="0"/>
+              <a:rPr lang="en-US"/>
               <a:t>Third level</a:t>
             </a:r>
           </a:p>
           <a:p>
             <a:pPr lvl="3"/>
             <a:r>
-              <a:rPr lang="en-US" smtClean="0"/>
+              <a:rPr lang="en-US"/>
               <a:t>Fourth level</a:t>
             </a:r>
           </a:p>
           <a:p>
             <a:pPr lvl="4"/>
             <a:r>
-              <a:rPr lang="en-US" smtClean="0"/>
+              <a:rPr lang="en-US"/>
               <a:t>Fifth level</a:t>
             </a:r>
-            <a:endParaRPr lang="en-ZA" smtClean="0"/>
+            <a:endParaRPr lang="en-ZA"/>
           </a:p>
         </p:txBody>
       </p:sp>
@@ -5206,7 +5242,7 @@
           </a:p>
           <a:p>
             <a:pPr algn="ctr"/>
-            <a:endParaRPr lang="en-ZA" dirty="0" smtClean="0">
+            <a:endParaRPr lang="en-ZA" dirty="0">
               <a:latin typeface="Calibri" pitchFamily="34" charset="0"/>
             </a:endParaRPr>
           </a:p>
@@ -5230,19 +5266,16 @@
           <a:p>
             <a:pPr algn="ctr"/>
             <a:r>
-              <a:rPr lang="en-ZA" sz="2000" dirty="0" smtClean="0">
+              <a:rPr lang="en-ZA" sz="2000" dirty="0">
                 <a:latin typeface="Calibri" pitchFamily="34" charset="0"/>
               </a:rPr>
               <a:t>Neil Rankin</a:t>
             </a:r>
-            <a:endParaRPr lang="en-ZA" sz="2000" dirty="0">
-              <a:latin typeface="Calibri" pitchFamily="34" charset="0"/>
-            </a:endParaRPr>
           </a:p>
           <a:p>
             <a:pPr algn="ctr"/>
             <a:r>
-              <a:rPr lang="en-ZA" sz="2000" dirty="0" smtClean="0">
+              <a:rPr lang="en-ZA" sz="2000" dirty="0">
                 <a:latin typeface="Calibri" pitchFamily="34" charset="0"/>
               </a:rPr>
               <a:t>Economics Department, Stellenbosch University</a:t>
@@ -5250,36 +5283,27 @@
           </a:p>
           <a:p>
             <a:pPr algn="ctr"/>
-            <a:endParaRPr lang="en-ZA" sz="2000" dirty="0" smtClean="0">
+            <a:endParaRPr lang="en-ZA" sz="2000" dirty="0">
               <a:latin typeface="Calibri" pitchFamily="34" charset="0"/>
             </a:endParaRPr>
           </a:p>
           <a:p>
             <a:pPr algn="ctr"/>
             <a:r>
-              <a:rPr lang="en-ZA" sz="2000" dirty="0" smtClean="0">
+              <a:rPr lang="en-ZA" sz="2000" dirty="0">
                 <a:latin typeface="Calibri" pitchFamily="34" charset="0"/>
               </a:rPr>
-              <a:t>August</a:t>
-            </a:r>
-            <a:r>
-              <a:rPr lang="en-ZA" sz="2000" dirty="0" smtClean="0">
-                <a:latin typeface="Calibri" pitchFamily="34" charset="0"/>
-              </a:rPr>
-              <a:t> 2017</a:t>
-            </a:r>
-            <a:endParaRPr lang="en-ZA" sz="2000" dirty="0" smtClean="0">
-              <a:latin typeface="Calibri" pitchFamily="34" charset="0"/>
-            </a:endParaRPr>
+              <a:t>August 2017</a:t>
+            </a:r>
           </a:p>
           <a:p>
             <a:pPr algn="ctr"/>
-            <a:endParaRPr lang="en-ZA" dirty="0" smtClean="0">
-              <a:latin typeface="Calibri" pitchFamily="34" charset="0"/>
-            </a:endParaRPr>
-          </a:p>
-          <a:p>
-            <a:endParaRPr lang="en-ZA" sz="1400" dirty="0" smtClean="0">
+            <a:endParaRPr lang="en-ZA" dirty="0">
+              <a:latin typeface="Calibri" pitchFamily="34" charset="0"/>
+            </a:endParaRPr>
+          </a:p>
+          <a:p>
+            <a:endParaRPr lang="en-ZA" sz="1400" dirty="0">
               <a:latin typeface="Calibri" pitchFamily="34" charset="0"/>
             </a:endParaRPr>
           </a:p>
@@ -5416,7 +5440,7 @@
               <a:defRPr/>
             </a:pPr>
             <a:r>
-              <a:rPr lang="en-ZA" sz="3200" kern="0" dirty="0" smtClean="0">
+              <a:rPr lang="en-ZA" sz="3200" kern="0" dirty="0">
                 <a:latin typeface="+mj-lt"/>
                 <a:ea typeface="+mj-ea"/>
                 <a:cs typeface="+mj-cs"/>
@@ -5442,7 +5466,7 @@
               <a:tabLst/>
               <a:defRPr/>
             </a:pPr>
-            <a:endParaRPr lang="en-ZA" sz="3200" kern="0" dirty="0" smtClean="0">
+            <a:endParaRPr lang="en-ZA" sz="3200" kern="0" dirty="0">
               <a:latin typeface="+mj-lt"/>
               <a:ea typeface="+mj-ea"/>
               <a:cs typeface="+mj-cs"/>
@@ -5467,7 +5491,7 @@
               <a:defRPr/>
             </a:pPr>
             <a:r>
-              <a:rPr lang="en-ZA" sz="3200" kern="0" dirty="0" smtClean="0">
+              <a:rPr lang="en-ZA" sz="3200" kern="0" dirty="0">
                 <a:latin typeface="+mj-lt"/>
                 <a:ea typeface="+mj-ea"/>
                 <a:cs typeface="+mj-cs"/>
@@ -5494,7 +5518,7 @@
               <a:defRPr/>
             </a:pPr>
             <a:r>
-              <a:rPr kumimoji="0" lang="en-ZA" sz="3200" b="0" i="0" u="none" strike="noStrike" kern="0" cap="none" spc="0" normalizeH="0" baseline="0" noProof="0" dirty="0" smtClean="0">
+              <a:rPr kumimoji="0" lang="en-ZA" sz="3200" b="0" i="0" u="none" strike="noStrike" kern="0" cap="none" spc="0" normalizeH="0" baseline="0" noProof="0" dirty="0">
                 <a:ln>
                   <a:noFill/>
                 </a:ln>
@@ -5511,7 +5535,7 @@
               <a:t>And how government policies distort the firm-</a:t>
             </a:r>
             <a:r>
-              <a:rPr kumimoji="0" lang="en-ZA" sz="3200" b="0" i="0" u="none" strike="noStrike" kern="0" cap="none" spc="0" normalizeH="0" noProof="0" dirty="0" smtClean="0">
+              <a:rPr kumimoji="0" lang="en-ZA" sz="3200" b="0" i="0" u="none" strike="noStrike" kern="0" cap="none" spc="0" normalizeH="0" noProof="0" dirty="0">
                 <a:ln>
                   <a:noFill/>
                 </a:ln>
@@ -5527,7 +5551,7 @@
               </a:rPr>
               <a:t>size distribution</a:t>
             </a:r>
-            <a:endParaRPr kumimoji="0" lang="en-ZA" sz="3200" b="0" i="0" u="none" strike="noStrike" kern="0" cap="none" spc="0" normalizeH="0" baseline="0" noProof="0" dirty="0" smtClean="0">
+            <a:endParaRPr kumimoji="0" lang="en-ZA" sz="3200" b="0" i="0" u="none" strike="noStrike" kern="0" cap="none" spc="0" normalizeH="0" baseline="0" noProof="0" dirty="0">
               <a:ln>
                 <a:noFill/>
               </a:ln>
@@ -5549,13 +5573,6 @@
   <p:clrMapOvr>
     <a:masterClrMapping/>
   </p:clrMapOvr>
-  <p:timing>
-    <p:tnLst>
-      <p:par>
-        <p:cTn id="1" dur="indefinite" restart="never" nodeType="tmRoot"/>
-      </p:par>
-    </p:tnLst>
-  </p:timing>
 </p:sld>
 </file>
 
@@ -5650,10 +5667,10 @@
           <a:lstStyle/>
           <a:p>
             <a:r>
-              <a:rPr lang="en-US" b="1" dirty="0" smtClean="0"/>
+              <a:rPr lang="en-US" b="1" dirty="0"/>
               <a:t>Why do larger firms pay more?</a:t>
             </a:r>
-            <a:endParaRPr lang="en-ZA" dirty="0" smtClean="0"/>
+            <a:endParaRPr lang="en-ZA" dirty="0"/>
           </a:p>
         </p:txBody>
       </p:sp>
@@ -5681,7 +5698,7 @@
               <a:buNone/>
             </a:pPr>
             <a:r>
-              <a:rPr lang="en-US" sz="2000" dirty="0" smtClean="0"/>
+              <a:rPr lang="en-US" sz="2000" dirty="0"/>
               <a:t>Some potential theoretical explanations</a:t>
             </a:r>
           </a:p>
@@ -5697,84 +5714,84 @@
               <a:buAutoNum type="arabicPeriod" startAt="3"/>
             </a:pPr>
             <a:r>
-              <a:rPr lang="en-US" sz="2000" dirty="0" smtClean="0"/>
+              <a:rPr lang="en-US" sz="2000" dirty="0"/>
               <a:t>Imperfections in factor (or product) markets</a:t>
             </a:r>
           </a:p>
           <a:p>
             <a:pPr marL="857250" lvl="1" indent="-457200"/>
-            <a:endParaRPr lang="en-US" sz="1800" dirty="0" smtClean="0"/>
+            <a:endParaRPr lang="en-US" sz="1800" dirty="0"/>
           </a:p>
           <a:p>
             <a:pPr marL="857250" lvl="1" indent="-457200"/>
             <a:r>
-              <a:rPr lang="en-US" sz="1800" dirty="0" smtClean="0"/>
+              <a:rPr lang="en-US" sz="1800" dirty="0"/>
               <a:t>Different costs of capital for firms</a:t>
             </a:r>
           </a:p>
           <a:p>
             <a:pPr marL="1257300" lvl="2" indent="-457200"/>
             <a:r>
-              <a:rPr lang="en-US" sz="1600" dirty="0" smtClean="0"/>
+              <a:rPr lang="en-US" sz="1600" dirty="0"/>
               <a:t>Larger firms face lower costs of capital and thus invest in more</a:t>
             </a:r>
           </a:p>
           <a:p>
             <a:pPr marL="1257300" lvl="2" indent="-457200"/>
             <a:r>
-              <a:rPr lang="en-US" sz="1600" dirty="0" smtClean="0"/>
+              <a:rPr lang="en-US" sz="1600" dirty="0"/>
               <a:t>Or could borrow for R&amp;D</a:t>
             </a:r>
           </a:p>
           <a:p>
             <a:pPr marL="857250" lvl="1" indent="-457200"/>
-            <a:endParaRPr lang="en-US" sz="1800" dirty="0" smtClean="0"/>
+            <a:endParaRPr lang="en-US" sz="1800" dirty="0"/>
           </a:p>
           <a:p>
             <a:pPr marL="857250" lvl="1" indent="-457200"/>
             <a:r>
-              <a:rPr lang="en-US" sz="1800" dirty="0" smtClean="0"/>
+              <a:rPr lang="en-US" sz="1800" dirty="0"/>
               <a:t>Rent sharing</a:t>
             </a:r>
           </a:p>
           <a:p>
             <a:pPr marL="1257300" lvl="2" indent="-457200"/>
             <a:r>
-              <a:rPr lang="en-US" sz="1600" dirty="0" smtClean="0"/>
+              <a:rPr lang="en-US" sz="1600" dirty="0"/>
               <a:t>Imperfect competition means mark-ups are higher</a:t>
             </a:r>
           </a:p>
           <a:p>
             <a:pPr marL="1257300" lvl="2" indent="-457200"/>
             <a:r>
-              <a:rPr lang="en-US" sz="1600" dirty="0" smtClean="0"/>
+              <a:rPr lang="en-US" sz="1600" dirty="0"/>
               <a:t>These rents are shared between firm and workers, especially if the workers have bargaining power</a:t>
             </a:r>
           </a:p>
           <a:p>
             <a:pPr marL="1257300" lvl="2" indent="-457200"/>
             <a:r>
-              <a:rPr lang="en-US" sz="1600" dirty="0" smtClean="0"/>
+              <a:rPr lang="en-US" sz="1600" dirty="0"/>
               <a:t>What creates these rents?</a:t>
             </a:r>
           </a:p>
           <a:p>
             <a:pPr marL="1714500" lvl="3" indent="-457200"/>
             <a:r>
-              <a:rPr lang="en-US" sz="1500" dirty="0" smtClean="0"/>
+              <a:rPr lang="en-US" sz="1500" dirty="0"/>
               <a:t>Barriers to entry (natural and regulatory)</a:t>
             </a:r>
           </a:p>
           <a:p>
             <a:pPr marL="1714500" lvl="3" indent="-457200"/>
             <a:r>
-              <a:rPr lang="en-US" sz="1500" dirty="0" smtClean="0"/>
+              <a:rPr lang="en-US" sz="1500" dirty="0"/>
               <a:t>Think about SA’s collective bargaining structure</a:t>
             </a:r>
           </a:p>
           <a:p>
             <a:pPr marL="1257300" lvl="2" indent="-457200"/>
-            <a:endParaRPr lang="en-US" sz="1600" dirty="0" smtClean="0">
+            <a:endParaRPr lang="en-US" sz="1600" dirty="0">
               <a:latin typeface="Calibri" pitchFamily="34" charset="0"/>
             </a:endParaRPr>
           </a:p>
@@ -5782,7 +5799,7 @@
             <a:pPr marL="0" indent="0">
               <a:buNone/>
             </a:pPr>
-            <a:endParaRPr lang="en-US" sz="1800" dirty="0" smtClean="0">
+            <a:endParaRPr lang="en-US" sz="1800" dirty="0">
               <a:latin typeface="Calibri" pitchFamily="34" charset="0"/>
             </a:endParaRPr>
           </a:p>
@@ -5794,7 +5811,7 @@
           </a:p>
           <a:p>
             <a:pPr marL="857250" lvl="1" indent="-457200"/>
-            <a:endParaRPr lang="en-US" sz="1800" dirty="0" smtClean="0">
+            <a:endParaRPr lang="en-US" sz="1800" dirty="0">
               <a:latin typeface="Calibri" pitchFamily="34" charset="0"/>
             </a:endParaRPr>
           </a:p>
@@ -5802,7 +5819,7 @@
             <a:pPr marL="0" indent="0">
               <a:buNone/>
             </a:pPr>
-            <a:endParaRPr lang="en-US" sz="1800" dirty="0" smtClean="0">
+            <a:endParaRPr lang="en-US" sz="1800" dirty="0">
               <a:latin typeface="Calibri" pitchFamily="34" charset="0"/>
             </a:endParaRPr>
           </a:p>
@@ -5820,7 +5837,7 @@
               <a:buFont typeface="Arial" charset="0"/>
               <a:buChar char="•"/>
             </a:pPr>
-            <a:endParaRPr lang="en-US" sz="1800" dirty="0" smtClean="0">
+            <a:endParaRPr lang="en-US" sz="1800" dirty="0">
               <a:latin typeface="Calibri" pitchFamily="34" charset="0"/>
             </a:endParaRPr>
           </a:p>
@@ -5829,7 +5846,7 @@
               <a:buFont typeface="Arial" charset="0"/>
               <a:buChar char="•"/>
             </a:pPr>
-            <a:endParaRPr lang="en-US" sz="1800" dirty="0" smtClean="0">
+            <a:endParaRPr lang="en-US" sz="1800" dirty="0">
               <a:latin typeface="Calibri" pitchFamily="34" charset="0"/>
             </a:endParaRPr>
           </a:p>
@@ -5838,7 +5855,7 @@
               <a:buFont typeface="Arial" charset="0"/>
               <a:buChar char="•"/>
             </a:pPr>
-            <a:endParaRPr lang="en-US" sz="1800" dirty="0" smtClean="0">
+            <a:endParaRPr lang="en-US" sz="1800" dirty="0">
               <a:latin typeface="Calibri" pitchFamily="34" charset="0"/>
             </a:endParaRPr>
           </a:p>
@@ -5855,7 +5872,7 @@
             <a:pPr marL="400050" lvl="1" indent="0">
               <a:buNone/>
             </a:pPr>
-            <a:endParaRPr lang="en-US" sz="1800" dirty="0" smtClean="0">
+            <a:endParaRPr lang="en-US" sz="1800" dirty="0">
               <a:latin typeface="Calibri" pitchFamily="34" charset="0"/>
             </a:endParaRPr>
           </a:p>
@@ -5863,7 +5880,7 @@
             <a:pPr marL="400050" lvl="1" indent="0">
               <a:buNone/>
             </a:pPr>
-            <a:endParaRPr lang="en-US" sz="1800" dirty="0" smtClean="0">
+            <a:endParaRPr lang="en-US" sz="1800" dirty="0">
               <a:latin typeface="Calibri" pitchFamily="34" charset="0"/>
             </a:endParaRPr>
           </a:p>
@@ -5872,15 +5889,15 @@
               <a:buFont typeface="Arial" charset="0"/>
               <a:buChar char="•"/>
             </a:pPr>
-            <a:endParaRPr lang="en-US" sz="1800" dirty="0" smtClean="0">
-              <a:latin typeface="Calibri" pitchFamily="34" charset="0"/>
-            </a:endParaRPr>
-          </a:p>
-          <a:p>
-            <a:endParaRPr lang="en-ZA" dirty="0" smtClean="0"/>
-          </a:p>
-          <a:p>
-            <a:endParaRPr lang="en-ZA" dirty="0" smtClean="0"/>
+            <a:endParaRPr lang="en-US" sz="1800" dirty="0">
+              <a:latin typeface="Calibri" pitchFamily="34" charset="0"/>
+            </a:endParaRPr>
+          </a:p>
+          <a:p>
+            <a:endParaRPr lang="en-ZA" dirty="0"/>
+          </a:p>
+          <a:p>
+            <a:endParaRPr lang="en-ZA" dirty="0"/>
           </a:p>
         </p:txBody>
       </p:sp>
@@ -5894,13 +5911,6 @@
   <p:clrMapOvr>
     <a:masterClrMapping/>
   </p:clrMapOvr>
-  <p:timing>
-    <p:tnLst>
-      <p:par>
-        <p:cTn id="1" dur="indefinite" restart="never" nodeType="tmRoot"/>
-      </p:par>
-    </p:tnLst>
-  </p:timing>
 </p:sld>
 </file>
 
@@ -5995,10 +6005,10 @@
           <a:lstStyle/>
           <a:p>
             <a:r>
-              <a:rPr lang="en-US" b="1" dirty="0" smtClean="0"/>
+              <a:rPr lang="en-US" b="1" dirty="0"/>
               <a:t>Why do larger firms pay more?</a:t>
             </a:r>
-            <a:endParaRPr lang="en-ZA" dirty="0" smtClean="0"/>
+            <a:endParaRPr lang="en-ZA" dirty="0"/>
           </a:p>
         </p:txBody>
       </p:sp>
@@ -6027,32 +6037,32 @@
               <a:buAutoNum type="arabicPeriod" startAt="3"/>
             </a:pPr>
             <a:r>
-              <a:rPr lang="en-US" sz="2000" dirty="0" smtClean="0"/>
+              <a:rPr lang="en-US" sz="2000" dirty="0"/>
               <a:t>Imperfections in factor (or product) markets cont.</a:t>
             </a:r>
           </a:p>
           <a:p>
             <a:pPr marL="857250" lvl="1" indent="-457200"/>
-            <a:endParaRPr lang="en-US" sz="1800" dirty="0" smtClean="0"/>
+            <a:endParaRPr lang="en-US" sz="1800" dirty="0"/>
           </a:p>
           <a:p>
             <a:pPr marL="857250" lvl="1" indent="-457200"/>
             <a:r>
-              <a:rPr lang="en-US" sz="1800" dirty="0" smtClean="0"/>
+              <a:rPr lang="en-US" sz="1800" dirty="0"/>
               <a:t>Efficiency wages</a:t>
             </a:r>
           </a:p>
           <a:p>
             <a:pPr marL="1257300" lvl="2" indent="-457200"/>
             <a:r>
-              <a:rPr lang="en-US" sz="1600" dirty="0" smtClean="0"/>
+              <a:rPr lang="en-US" sz="1600" dirty="0"/>
               <a:t>Monitoring at larger firms is more difficult</a:t>
             </a:r>
           </a:p>
           <a:p>
             <a:pPr marL="1257300" lvl="2" indent="-457200"/>
             <a:r>
-              <a:rPr lang="en-US" sz="1600" dirty="0" smtClean="0"/>
+              <a:rPr lang="en-US" sz="1600" dirty="0"/>
               <a:t>Firms pay higher wages so that opportunity cost of losing a job is higher and thus motivation not to shirk is also higher</a:t>
             </a:r>
           </a:p>
@@ -6063,34 +6073,34 @@
           <a:p>
             <a:pPr marL="457200" indent="-457200"/>
             <a:r>
-              <a:rPr lang="en-US" sz="1900" dirty="0" smtClean="0"/>
+              <a:rPr lang="en-US" sz="1900" dirty="0"/>
               <a:t>All these arguments are based on idea that the earnings equations are missing something</a:t>
             </a:r>
           </a:p>
           <a:p>
             <a:pPr marL="857250" lvl="1" indent="-457200"/>
             <a:r>
-              <a:rPr lang="en-US" sz="1700" dirty="0" smtClean="0"/>
+              <a:rPr lang="en-US" sz="1700" dirty="0"/>
               <a:t>Skills profile</a:t>
             </a:r>
           </a:p>
           <a:p>
             <a:pPr marL="857250" lvl="1" indent="-457200"/>
             <a:r>
-              <a:rPr lang="en-US" sz="1700" dirty="0" smtClean="0"/>
+              <a:rPr lang="en-US" sz="1700" dirty="0"/>
               <a:t>Technology of firms</a:t>
             </a:r>
           </a:p>
           <a:p>
             <a:pPr marL="857250" lvl="1" indent="-457200"/>
             <a:r>
-              <a:rPr lang="en-US" sz="1700" dirty="0" smtClean="0"/>
+              <a:rPr lang="en-US" sz="1700" dirty="0"/>
               <a:t>Factor or product markets</a:t>
             </a:r>
           </a:p>
           <a:p>
             <a:pPr marL="1257300" lvl="2" indent="-457200"/>
-            <a:endParaRPr lang="en-US" sz="1600" dirty="0" smtClean="0">
+            <a:endParaRPr lang="en-US" sz="1600" dirty="0">
               <a:latin typeface="Calibri" pitchFamily="34" charset="0"/>
             </a:endParaRPr>
           </a:p>
@@ -6098,7 +6108,7 @@
             <a:pPr marL="0" indent="0">
               <a:buNone/>
             </a:pPr>
-            <a:endParaRPr lang="en-US" sz="1800" dirty="0" smtClean="0">
+            <a:endParaRPr lang="en-US" sz="1800" dirty="0">
               <a:latin typeface="Calibri" pitchFamily="34" charset="0"/>
             </a:endParaRPr>
           </a:p>
@@ -6110,7 +6120,7 @@
           </a:p>
           <a:p>
             <a:pPr marL="857250" lvl="1" indent="-457200"/>
-            <a:endParaRPr lang="en-US" sz="1800" dirty="0" smtClean="0">
+            <a:endParaRPr lang="en-US" sz="1800" dirty="0">
               <a:latin typeface="Calibri" pitchFamily="34" charset="0"/>
             </a:endParaRPr>
           </a:p>
@@ -6118,7 +6128,7 @@
             <a:pPr marL="0" indent="0">
               <a:buNone/>
             </a:pPr>
-            <a:endParaRPr lang="en-US" sz="1800" dirty="0" smtClean="0">
+            <a:endParaRPr lang="en-US" sz="1800" dirty="0">
               <a:latin typeface="Calibri" pitchFamily="34" charset="0"/>
             </a:endParaRPr>
           </a:p>
@@ -6136,7 +6146,7 @@
               <a:buFont typeface="Arial" charset="0"/>
               <a:buChar char="•"/>
             </a:pPr>
-            <a:endParaRPr lang="en-US" sz="1800" dirty="0" smtClean="0">
+            <a:endParaRPr lang="en-US" sz="1800" dirty="0">
               <a:latin typeface="Calibri" pitchFamily="34" charset="0"/>
             </a:endParaRPr>
           </a:p>
@@ -6145,7 +6155,7 @@
               <a:buFont typeface="Arial" charset="0"/>
               <a:buChar char="•"/>
             </a:pPr>
-            <a:endParaRPr lang="en-US" sz="1800" dirty="0" smtClean="0">
+            <a:endParaRPr lang="en-US" sz="1800" dirty="0">
               <a:latin typeface="Calibri" pitchFamily="34" charset="0"/>
             </a:endParaRPr>
           </a:p>
@@ -6154,7 +6164,7 @@
               <a:buFont typeface="Arial" charset="0"/>
               <a:buChar char="•"/>
             </a:pPr>
-            <a:endParaRPr lang="en-US" sz="1800" dirty="0" smtClean="0">
+            <a:endParaRPr lang="en-US" sz="1800" dirty="0">
               <a:latin typeface="Calibri" pitchFamily="34" charset="0"/>
             </a:endParaRPr>
           </a:p>
@@ -6171,7 +6181,7 @@
             <a:pPr marL="400050" lvl="1" indent="0">
               <a:buNone/>
             </a:pPr>
-            <a:endParaRPr lang="en-US" sz="1800" dirty="0" smtClean="0">
+            <a:endParaRPr lang="en-US" sz="1800" dirty="0">
               <a:latin typeface="Calibri" pitchFamily="34" charset="0"/>
             </a:endParaRPr>
           </a:p>
@@ -6179,7 +6189,7 @@
             <a:pPr marL="400050" lvl="1" indent="0">
               <a:buNone/>
             </a:pPr>
-            <a:endParaRPr lang="en-US" sz="1800" dirty="0" smtClean="0">
+            <a:endParaRPr lang="en-US" sz="1800" dirty="0">
               <a:latin typeface="Calibri" pitchFamily="34" charset="0"/>
             </a:endParaRPr>
           </a:p>
@@ -6188,15 +6198,15 @@
               <a:buFont typeface="Arial" charset="0"/>
               <a:buChar char="•"/>
             </a:pPr>
-            <a:endParaRPr lang="en-US" sz="1800" dirty="0" smtClean="0">
-              <a:latin typeface="Calibri" pitchFamily="34" charset="0"/>
-            </a:endParaRPr>
-          </a:p>
-          <a:p>
-            <a:endParaRPr lang="en-ZA" dirty="0" smtClean="0"/>
-          </a:p>
-          <a:p>
-            <a:endParaRPr lang="en-ZA" dirty="0" smtClean="0"/>
+            <a:endParaRPr lang="en-US" sz="1800" dirty="0">
+              <a:latin typeface="Calibri" pitchFamily="34" charset="0"/>
+            </a:endParaRPr>
+          </a:p>
+          <a:p>
+            <a:endParaRPr lang="en-ZA" dirty="0"/>
+          </a:p>
+          <a:p>
+            <a:endParaRPr lang="en-ZA" dirty="0"/>
           </a:p>
         </p:txBody>
       </p:sp>
@@ -6210,13 +6220,6 @@
   <p:clrMapOvr>
     <a:masterClrMapping/>
   </p:clrMapOvr>
-  <p:timing>
-    <p:tnLst>
-      <p:par>
-        <p:cTn id="1" dur="indefinite" restart="never" nodeType="tmRoot"/>
-      </p:par>
-    </p:tnLst>
-  </p:timing>
 </p:sld>
 </file>
 
@@ -6311,10 +6314,10 @@
           <a:lstStyle/>
           <a:p>
             <a:r>
-              <a:rPr lang="en-US" b="1" dirty="0" smtClean="0"/>
+              <a:rPr lang="en-US" b="1" dirty="0"/>
               <a:t>Why do larger firms pay more?</a:t>
             </a:r>
-            <a:endParaRPr lang="en-ZA" dirty="0" smtClean="0"/>
+            <a:endParaRPr lang="en-ZA" dirty="0"/>
           </a:p>
         </p:txBody>
       </p:sp>
@@ -6342,7 +6345,7 @@
               <a:buNone/>
             </a:pPr>
             <a:r>
-              <a:rPr lang="en-US" sz="2000" dirty="0" smtClean="0"/>
+              <a:rPr lang="en-US" sz="2000" dirty="0"/>
               <a:t>How would we go about figuring out which of these explanations are the most likely?</a:t>
             </a:r>
           </a:p>
@@ -6358,7 +6361,7 @@
               <a:buChar char="-"/>
             </a:pPr>
             <a:r>
-              <a:rPr lang="en-US" sz="2000" dirty="0" smtClean="0"/>
+              <a:rPr lang="en-US" sz="2000" dirty="0"/>
               <a:t>Data</a:t>
             </a:r>
           </a:p>
@@ -6375,7 +6378,7 @@
               <a:buChar char="-"/>
             </a:pPr>
             <a:r>
-              <a:rPr lang="en-US" sz="2000" dirty="0" smtClean="0"/>
+              <a:rPr lang="en-US" sz="2000" dirty="0"/>
               <a:t>Methodology</a:t>
             </a:r>
           </a:p>
@@ -6384,11 +6387,11 @@
               <a:buFontTx/>
               <a:buChar char="-"/>
             </a:pPr>
-            <a:endParaRPr lang="en-US" sz="1700" dirty="0" smtClean="0"/>
+            <a:endParaRPr lang="en-US" sz="1700" dirty="0"/>
           </a:p>
           <a:p>
             <a:pPr marL="1257300" lvl="2" indent="-457200"/>
-            <a:endParaRPr lang="en-US" sz="1600" dirty="0" smtClean="0">
+            <a:endParaRPr lang="en-US" sz="1600" dirty="0">
               <a:latin typeface="Calibri" pitchFamily="34" charset="0"/>
             </a:endParaRPr>
           </a:p>
@@ -6396,7 +6399,7 @@
             <a:pPr marL="0" indent="0">
               <a:buNone/>
             </a:pPr>
-            <a:endParaRPr lang="en-US" sz="1800" dirty="0" smtClean="0">
+            <a:endParaRPr lang="en-US" sz="1800" dirty="0">
               <a:latin typeface="Calibri" pitchFamily="34" charset="0"/>
             </a:endParaRPr>
           </a:p>
@@ -6408,7 +6411,7 @@
           </a:p>
           <a:p>
             <a:pPr marL="857250" lvl="1" indent="-457200"/>
-            <a:endParaRPr lang="en-US" sz="1800" dirty="0" smtClean="0">
+            <a:endParaRPr lang="en-US" sz="1800" dirty="0">
               <a:latin typeface="Calibri" pitchFamily="34" charset="0"/>
             </a:endParaRPr>
           </a:p>
@@ -6416,7 +6419,7 @@
             <a:pPr marL="0" indent="0">
               <a:buNone/>
             </a:pPr>
-            <a:endParaRPr lang="en-US" sz="1800" dirty="0" smtClean="0">
+            <a:endParaRPr lang="en-US" sz="1800" dirty="0">
               <a:latin typeface="Calibri" pitchFamily="34" charset="0"/>
             </a:endParaRPr>
           </a:p>
@@ -6434,7 +6437,7 @@
               <a:buFont typeface="Arial" charset="0"/>
               <a:buChar char="•"/>
             </a:pPr>
-            <a:endParaRPr lang="en-US" sz="1800" dirty="0" smtClean="0">
+            <a:endParaRPr lang="en-US" sz="1800" dirty="0">
               <a:latin typeface="Calibri" pitchFamily="34" charset="0"/>
             </a:endParaRPr>
           </a:p>
@@ -6443,7 +6446,7 @@
               <a:buFont typeface="Arial" charset="0"/>
               <a:buChar char="•"/>
             </a:pPr>
-            <a:endParaRPr lang="en-US" sz="1800" dirty="0" smtClean="0">
+            <a:endParaRPr lang="en-US" sz="1800" dirty="0">
               <a:latin typeface="Calibri" pitchFamily="34" charset="0"/>
             </a:endParaRPr>
           </a:p>
@@ -6452,7 +6455,7 @@
               <a:buFont typeface="Arial" charset="0"/>
               <a:buChar char="•"/>
             </a:pPr>
-            <a:endParaRPr lang="en-US" sz="1800" dirty="0" smtClean="0">
+            <a:endParaRPr lang="en-US" sz="1800" dirty="0">
               <a:latin typeface="Calibri" pitchFamily="34" charset="0"/>
             </a:endParaRPr>
           </a:p>
@@ -6469,7 +6472,7 @@
             <a:pPr marL="400050" lvl="1" indent="0">
               <a:buNone/>
             </a:pPr>
-            <a:endParaRPr lang="en-US" sz="1800" dirty="0" smtClean="0">
+            <a:endParaRPr lang="en-US" sz="1800" dirty="0">
               <a:latin typeface="Calibri" pitchFamily="34" charset="0"/>
             </a:endParaRPr>
           </a:p>
@@ -6477,7 +6480,7 @@
             <a:pPr marL="400050" lvl="1" indent="0">
               <a:buNone/>
             </a:pPr>
-            <a:endParaRPr lang="en-US" sz="1800" dirty="0" smtClean="0">
+            <a:endParaRPr lang="en-US" sz="1800" dirty="0">
               <a:latin typeface="Calibri" pitchFamily="34" charset="0"/>
             </a:endParaRPr>
           </a:p>
@@ -6486,15 +6489,15 @@
               <a:buFont typeface="Arial" charset="0"/>
               <a:buChar char="•"/>
             </a:pPr>
-            <a:endParaRPr lang="en-US" sz="1800" dirty="0" smtClean="0">
-              <a:latin typeface="Calibri" pitchFamily="34" charset="0"/>
-            </a:endParaRPr>
-          </a:p>
-          <a:p>
-            <a:endParaRPr lang="en-ZA" dirty="0" smtClean="0"/>
-          </a:p>
-          <a:p>
-            <a:endParaRPr lang="en-ZA" dirty="0" smtClean="0"/>
+            <a:endParaRPr lang="en-US" sz="1800" dirty="0">
+              <a:latin typeface="Calibri" pitchFamily="34" charset="0"/>
+            </a:endParaRPr>
+          </a:p>
+          <a:p>
+            <a:endParaRPr lang="en-ZA" dirty="0"/>
+          </a:p>
+          <a:p>
+            <a:endParaRPr lang="en-ZA" dirty="0"/>
           </a:p>
         </p:txBody>
       </p:sp>
@@ -6508,13 +6511,6 @@
   <p:clrMapOvr>
     <a:masterClrMapping/>
   </p:clrMapOvr>
-  <p:timing>
-    <p:tnLst>
-      <p:par>
-        <p:cTn id="1" dur="indefinite" restart="never" nodeType="tmRoot"/>
-      </p:par>
-    </p:tnLst>
-  </p:timing>
 </p:sld>
 </file>
 
@@ -6611,14 +6607,6 @@
             <a:pPr marL="0" indent="0" algn="ctr">
               <a:buNone/>
             </a:pPr>
-            <a:endParaRPr lang="en-ZA" sz="4000" dirty="0" smtClean="0">
-              <a:latin typeface="+mj-lt"/>
-            </a:endParaRPr>
-          </a:p>
-          <a:p>
-            <a:pPr marL="0" indent="0" algn="ctr">
-              <a:buNone/>
-            </a:pPr>
             <a:endParaRPr lang="en-ZA" sz="4000" dirty="0">
               <a:latin typeface="+mj-lt"/>
             </a:endParaRPr>
@@ -6627,15 +6615,20 @@
             <a:pPr marL="0" indent="0" algn="ctr">
               <a:buNone/>
             </a:pPr>
-            <a:r>
-              <a:rPr lang="en-ZA" sz="4000" dirty="0" smtClean="0">
+            <a:endParaRPr lang="en-ZA" sz="4000" dirty="0">
+              <a:latin typeface="+mj-lt"/>
+            </a:endParaRPr>
+          </a:p>
+          <a:p>
+            <a:pPr marL="0" indent="0" algn="ctr">
+              <a:buNone/>
+            </a:pPr>
+            <a:r>
+              <a:rPr lang="en-ZA" sz="4000" dirty="0">
                 <a:latin typeface="+mj-lt"/>
               </a:rPr>
               <a:t>The firm size distribution</a:t>
             </a:r>
-            <a:endParaRPr lang="en-ZA" sz="4000" dirty="0">
-              <a:latin typeface="+mj-lt"/>
-            </a:endParaRPr>
           </a:p>
         </p:txBody>
       </p:sp>
@@ -6649,13 +6642,6 @@
   <p:clrMapOvr>
     <a:masterClrMapping/>
   </p:clrMapOvr>
-  <p:timing>
-    <p:tnLst>
-      <p:par>
-        <p:cTn id="1" dur="indefinite" restart="never" nodeType="tmRoot"/>
-      </p:par>
-    </p:tnLst>
-  </p:timing>
 </p:sld>
 </file>
 
@@ -6750,10 +6736,10 @@
           <a:lstStyle/>
           <a:p>
             <a:r>
-              <a:rPr lang="en-US" b="1" dirty="0" smtClean="0"/>
+              <a:rPr lang="en-US" b="1" dirty="0"/>
               <a:t>The firm size distribution</a:t>
             </a:r>
-            <a:endParaRPr lang="en-ZA" dirty="0" smtClean="0"/>
+            <a:endParaRPr lang="en-ZA" dirty="0"/>
           </a:p>
         </p:txBody>
       </p:sp>
@@ -6781,11 +6767,11 @@
               <a:buFontTx/>
               <a:buChar char="-"/>
             </a:pPr>
-            <a:endParaRPr lang="en-US" sz="1700" dirty="0" smtClean="0"/>
+            <a:endParaRPr lang="en-US" sz="1700" dirty="0"/>
           </a:p>
           <a:p>
             <a:pPr marL="1257300" lvl="2" indent="-457200"/>
-            <a:endParaRPr lang="en-US" sz="1600" dirty="0" smtClean="0">
+            <a:endParaRPr lang="en-US" sz="1600" dirty="0">
               <a:latin typeface="Calibri" pitchFamily="34" charset="0"/>
             </a:endParaRPr>
           </a:p>
@@ -6793,7 +6779,7 @@
             <a:pPr marL="0" indent="0">
               <a:buNone/>
             </a:pPr>
-            <a:endParaRPr lang="en-US" sz="1800" dirty="0" smtClean="0">
+            <a:endParaRPr lang="en-US" sz="1800" dirty="0">
               <a:latin typeface="Calibri" pitchFamily="34" charset="0"/>
             </a:endParaRPr>
           </a:p>
@@ -6805,7 +6791,7 @@
           </a:p>
           <a:p>
             <a:pPr marL="857250" lvl="1" indent="-457200"/>
-            <a:endParaRPr lang="en-US" sz="1800" dirty="0" smtClean="0">
+            <a:endParaRPr lang="en-US" sz="1800" dirty="0">
               <a:latin typeface="Calibri" pitchFamily="34" charset="0"/>
             </a:endParaRPr>
           </a:p>
@@ -6813,7 +6799,7 @@
             <a:pPr marL="0" indent="0">
               <a:buNone/>
             </a:pPr>
-            <a:endParaRPr lang="en-US" sz="1800" dirty="0" smtClean="0">
+            <a:endParaRPr lang="en-US" sz="1800" dirty="0">
               <a:latin typeface="Calibri" pitchFamily="34" charset="0"/>
             </a:endParaRPr>
           </a:p>
@@ -6831,7 +6817,7 @@
               <a:buFont typeface="Arial" charset="0"/>
               <a:buChar char="•"/>
             </a:pPr>
-            <a:endParaRPr lang="en-US" sz="1800" dirty="0" smtClean="0">
+            <a:endParaRPr lang="en-US" sz="1800" dirty="0">
               <a:latin typeface="Calibri" pitchFamily="34" charset="0"/>
             </a:endParaRPr>
           </a:p>
@@ -6840,7 +6826,7 @@
               <a:buFont typeface="Arial" charset="0"/>
               <a:buChar char="•"/>
             </a:pPr>
-            <a:endParaRPr lang="en-US" sz="1800" dirty="0" smtClean="0">
+            <a:endParaRPr lang="en-US" sz="1800" dirty="0">
               <a:latin typeface="Calibri" pitchFamily="34" charset="0"/>
             </a:endParaRPr>
           </a:p>
@@ -6849,7 +6835,7 @@
               <a:buFont typeface="Arial" charset="0"/>
               <a:buChar char="•"/>
             </a:pPr>
-            <a:endParaRPr lang="en-US" sz="1800" dirty="0" smtClean="0">
+            <a:endParaRPr lang="en-US" sz="1800" dirty="0">
               <a:latin typeface="Calibri" pitchFamily="34" charset="0"/>
             </a:endParaRPr>
           </a:p>
@@ -6866,7 +6852,7 @@
             <a:pPr marL="400050" lvl="1" indent="0">
               <a:buNone/>
             </a:pPr>
-            <a:endParaRPr lang="en-US" sz="1800" dirty="0" smtClean="0">
+            <a:endParaRPr lang="en-US" sz="1800" dirty="0">
               <a:latin typeface="Calibri" pitchFamily="34" charset="0"/>
             </a:endParaRPr>
           </a:p>
@@ -6874,7 +6860,7 @@
             <a:pPr marL="400050" lvl="1" indent="0">
               <a:buNone/>
             </a:pPr>
-            <a:endParaRPr lang="en-US" sz="1800" dirty="0" smtClean="0">
+            <a:endParaRPr lang="en-US" sz="1800" dirty="0">
               <a:latin typeface="Calibri" pitchFamily="34" charset="0"/>
             </a:endParaRPr>
           </a:p>
@@ -6883,15 +6869,15 @@
               <a:buFont typeface="Arial" charset="0"/>
               <a:buChar char="•"/>
             </a:pPr>
-            <a:endParaRPr lang="en-US" sz="1800" dirty="0" smtClean="0">
-              <a:latin typeface="Calibri" pitchFamily="34" charset="0"/>
-            </a:endParaRPr>
-          </a:p>
-          <a:p>
-            <a:endParaRPr lang="en-ZA" dirty="0" smtClean="0"/>
-          </a:p>
-          <a:p>
-            <a:endParaRPr lang="en-ZA" dirty="0" smtClean="0"/>
+            <a:endParaRPr lang="en-US" sz="1800" dirty="0">
+              <a:latin typeface="Calibri" pitchFamily="34" charset="0"/>
+            </a:endParaRPr>
+          </a:p>
+          <a:p>
+            <a:endParaRPr lang="en-ZA" dirty="0"/>
+          </a:p>
+          <a:p>
+            <a:endParaRPr lang="en-ZA" dirty="0"/>
           </a:p>
         </p:txBody>
       </p:sp>
@@ -6972,14 +6958,11 @@
           <a:lstStyle/>
           <a:p>
             <a:r>
-              <a:rPr lang="en-ZA" sz="1400" dirty="0" smtClean="0">
+              <a:rPr lang="en-ZA" sz="1400" dirty="0">
                 <a:latin typeface="+mn-lt"/>
               </a:rPr>
               <a:t>Source: Cabral and Mata (2003)</a:t>
             </a:r>
-            <a:endParaRPr lang="en-ZA" sz="1400" dirty="0">
-              <a:latin typeface="+mn-lt"/>
-            </a:endParaRPr>
           </a:p>
         </p:txBody>
       </p:sp>
@@ -6993,13 +6976,6 @@
   <p:clrMapOvr>
     <a:masterClrMapping/>
   </p:clrMapOvr>
-  <p:timing>
-    <p:tnLst>
-      <p:par>
-        <p:cTn id="1" dur="indefinite" restart="never" nodeType="tmRoot"/>
-      </p:par>
-    </p:tnLst>
-  </p:timing>
 </p:sld>
 </file>
 
@@ -7094,10 +7070,10 @@
           <a:lstStyle/>
           <a:p>
             <a:r>
-              <a:rPr lang="en-US" b="1" dirty="0" smtClean="0"/>
+              <a:rPr lang="en-US" b="1" dirty="0"/>
               <a:t>The firm size distribution</a:t>
             </a:r>
-            <a:endParaRPr lang="en-ZA" dirty="0" smtClean="0"/>
+            <a:endParaRPr lang="en-ZA" dirty="0"/>
           </a:p>
         </p:txBody>
       </p:sp>
@@ -7125,7 +7101,7 @@
               <a:buNone/>
             </a:pPr>
             <a:r>
-              <a:rPr lang="en-US" sz="2000" dirty="0" smtClean="0"/>
+              <a:rPr lang="en-US" sz="2000" dirty="0"/>
               <a:t>But there may be some things that distort the firm size distribution:</a:t>
             </a:r>
           </a:p>
@@ -7141,7 +7117,7 @@
               <a:buChar char="•"/>
             </a:pPr>
             <a:r>
-              <a:rPr lang="en-US" sz="2000" dirty="0" smtClean="0"/>
+              <a:rPr lang="en-US" sz="2000" dirty="0"/>
               <a:t>Regulations</a:t>
             </a:r>
           </a:p>
@@ -7151,7 +7127,7 @@
               <a:buChar char="•"/>
             </a:pPr>
             <a:r>
-              <a:rPr lang="en-US" sz="1800" dirty="0" smtClean="0"/>
+              <a:rPr lang="en-US" sz="1800" dirty="0"/>
               <a:t>The ‘missing middle’ in developing countries – firms either have to be small and informal, to fly under the radar, or big, to overcome fixed regulation cost</a:t>
             </a:r>
           </a:p>
@@ -7168,7 +7144,7 @@
               <a:buChar char="•"/>
             </a:pPr>
             <a:r>
-              <a:rPr lang="en-US" sz="1800" dirty="0" smtClean="0"/>
+              <a:rPr lang="en-US" sz="1800" dirty="0"/>
               <a:t>Not just a developing country, or formal vs informal firm, occurrence. </a:t>
             </a:r>
           </a:p>
@@ -7185,7 +7161,7 @@
               <a:buChar char="•"/>
             </a:pPr>
             <a:r>
-              <a:rPr lang="en-US" sz="1800" dirty="0" smtClean="0"/>
+              <a:rPr lang="en-US" sz="1800" dirty="0"/>
               <a:t>Many countries have regulations which only kick in at certain size thresholds or things like tax regulations or different minimum wages which are different below a certain size.</a:t>
             </a:r>
           </a:p>
@@ -7202,15 +7178,15 @@
               <a:buChar char="•"/>
             </a:pPr>
             <a:r>
-              <a:rPr lang="en-US" sz="1800" dirty="0" smtClean="0"/>
+              <a:rPr lang="en-US" sz="1800" dirty="0"/>
               <a:t>These may affect </a:t>
             </a:r>
             <a:r>
-              <a:rPr lang="en-US" sz="1800" dirty="0" err="1" smtClean="0"/>
+              <a:rPr lang="en-US" sz="1800" dirty="0" err="1"/>
               <a:t>labour</a:t>
             </a:r>
             <a:r>
-              <a:rPr lang="en-US" sz="1800" dirty="0" smtClean="0"/>
+              <a:rPr lang="en-US" sz="1800" dirty="0"/>
               <a:t> cost and thus firm size</a:t>
             </a:r>
           </a:p>
@@ -7219,11 +7195,11 @@
               <a:buFontTx/>
               <a:buChar char="-"/>
             </a:pPr>
-            <a:endParaRPr lang="en-US" sz="1700" dirty="0" smtClean="0"/>
+            <a:endParaRPr lang="en-US" sz="1700" dirty="0"/>
           </a:p>
           <a:p>
             <a:pPr marL="1257300" lvl="2" indent="-457200"/>
-            <a:endParaRPr lang="en-US" sz="1600" dirty="0" smtClean="0">
+            <a:endParaRPr lang="en-US" sz="1600" dirty="0">
               <a:latin typeface="Calibri" pitchFamily="34" charset="0"/>
             </a:endParaRPr>
           </a:p>
@@ -7231,7 +7207,7 @@
             <a:pPr marL="0" indent="0">
               <a:buNone/>
             </a:pPr>
-            <a:endParaRPr lang="en-US" sz="1800" dirty="0" smtClean="0">
+            <a:endParaRPr lang="en-US" sz="1800" dirty="0">
               <a:latin typeface="Calibri" pitchFamily="34" charset="0"/>
             </a:endParaRPr>
           </a:p>
@@ -7243,7 +7219,7 @@
           </a:p>
           <a:p>
             <a:pPr marL="857250" lvl="1" indent="-457200"/>
-            <a:endParaRPr lang="en-US" sz="1800" dirty="0" smtClean="0">
+            <a:endParaRPr lang="en-US" sz="1800" dirty="0">
               <a:latin typeface="Calibri" pitchFamily="34" charset="0"/>
             </a:endParaRPr>
           </a:p>
@@ -7251,7 +7227,7 @@
             <a:pPr marL="0" indent="0">
               <a:buNone/>
             </a:pPr>
-            <a:endParaRPr lang="en-US" sz="1800" dirty="0" smtClean="0">
+            <a:endParaRPr lang="en-US" sz="1800" dirty="0">
               <a:latin typeface="Calibri" pitchFamily="34" charset="0"/>
             </a:endParaRPr>
           </a:p>
@@ -7269,7 +7245,7 @@
               <a:buFont typeface="Arial" charset="0"/>
               <a:buChar char="•"/>
             </a:pPr>
-            <a:endParaRPr lang="en-US" sz="1800" dirty="0" smtClean="0">
+            <a:endParaRPr lang="en-US" sz="1800" dirty="0">
               <a:latin typeface="Calibri" pitchFamily="34" charset="0"/>
             </a:endParaRPr>
           </a:p>
@@ -7278,7 +7254,7 @@
               <a:buFont typeface="Arial" charset="0"/>
               <a:buChar char="•"/>
             </a:pPr>
-            <a:endParaRPr lang="en-US" sz="1800" dirty="0" smtClean="0">
+            <a:endParaRPr lang="en-US" sz="1800" dirty="0">
               <a:latin typeface="Calibri" pitchFamily="34" charset="0"/>
             </a:endParaRPr>
           </a:p>
@@ -7287,7 +7263,7 @@
               <a:buFont typeface="Arial" charset="0"/>
               <a:buChar char="•"/>
             </a:pPr>
-            <a:endParaRPr lang="en-US" sz="1800" dirty="0" smtClean="0">
+            <a:endParaRPr lang="en-US" sz="1800" dirty="0">
               <a:latin typeface="Calibri" pitchFamily="34" charset="0"/>
             </a:endParaRPr>
           </a:p>
@@ -7304,7 +7280,7 @@
             <a:pPr marL="400050" lvl="1" indent="0">
               <a:buNone/>
             </a:pPr>
-            <a:endParaRPr lang="en-US" sz="1800" dirty="0" smtClean="0">
+            <a:endParaRPr lang="en-US" sz="1800" dirty="0">
               <a:latin typeface="Calibri" pitchFamily="34" charset="0"/>
             </a:endParaRPr>
           </a:p>
@@ -7312,7 +7288,7 @@
             <a:pPr marL="400050" lvl="1" indent="0">
               <a:buNone/>
             </a:pPr>
-            <a:endParaRPr lang="en-US" sz="1800" dirty="0" smtClean="0">
+            <a:endParaRPr lang="en-US" sz="1800" dirty="0">
               <a:latin typeface="Calibri" pitchFamily="34" charset="0"/>
             </a:endParaRPr>
           </a:p>
@@ -7321,15 +7297,15 @@
               <a:buFont typeface="Arial" charset="0"/>
               <a:buChar char="•"/>
             </a:pPr>
-            <a:endParaRPr lang="en-US" sz="1800" dirty="0" smtClean="0">
-              <a:latin typeface="Calibri" pitchFamily="34" charset="0"/>
-            </a:endParaRPr>
-          </a:p>
-          <a:p>
-            <a:endParaRPr lang="en-ZA" dirty="0" smtClean="0"/>
-          </a:p>
-          <a:p>
-            <a:endParaRPr lang="en-ZA" dirty="0" smtClean="0"/>
+            <a:endParaRPr lang="en-US" sz="1800" dirty="0">
+              <a:latin typeface="Calibri" pitchFamily="34" charset="0"/>
+            </a:endParaRPr>
+          </a:p>
+          <a:p>
+            <a:endParaRPr lang="en-ZA" dirty="0"/>
+          </a:p>
+          <a:p>
+            <a:endParaRPr lang="en-ZA" dirty="0"/>
           </a:p>
         </p:txBody>
       </p:sp>
@@ -7343,13 +7319,6 @@
   <p:clrMapOvr>
     <a:masterClrMapping/>
   </p:clrMapOvr>
-  <p:timing>
-    <p:tnLst>
-      <p:par>
-        <p:cTn id="1" dur="indefinite" restart="never" nodeType="tmRoot"/>
-      </p:par>
-    </p:tnLst>
-  </p:timing>
 </p:sld>
 </file>
 
@@ -7444,14 +7413,14 @@
           <a:lstStyle/>
           <a:p>
             <a:r>
-              <a:rPr lang="en-US" b="1" dirty="0" smtClean="0"/>
+              <a:rPr lang="en-US" b="1" dirty="0"/>
               <a:t>The firm size distribution – France</a:t>
             </a:r>
             <a:br>
-              <a:rPr lang="en-US" b="1" dirty="0" smtClean="0"/>
+              <a:rPr lang="en-US" b="1" dirty="0"/>
             </a:br>
             <a:r>
-              <a:rPr lang="en-GB" dirty="0" err="1" smtClean="0"/>
+              <a:rPr lang="en-GB" dirty="0" err="1"/>
               <a:t>Garicano</a:t>
             </a:r>
             <a:r>
@@ -7472,13 +7441,9 @@
             </a:r>
             <a:r>
               <a:rPr lang="en-GB" dirty="0"/>
-              <a:t> </a:t>
-            </a:r>
-            <a:r>
-              <a:rPr lang="en-GB" dirty="0" smtClean="0"/>
-              <a:t>(2013)</a:t>
-            </a:r>
-            <a:endParaRPr lang="en-ZA" dirty="0" smtClean="0"/>
+              <a:t> (2013)</a:t>
+            </a:r>
+            <a:endParaRPr lang="en-ZA" dirty="0"/>
           </a:p>
         </p:txBody>
       </p:sp>
@@ -7578,7 +7543,7 @@
           <a:lstStyle/>
           <a:p>
             <a:r>
-              <a:rPr lang="en-ZA" sz="1400" dirty="0" smtClean="0">
+              <a:rPr lang="en-ZA" sz="1400" dirty="0">
                 <a:latin typeface="+mn-lt"/>
               </a:rPr>
               <a:t>Source: </a:t>
@@ -7635,13 +7600,6 @@
   <p:clrMapOvr>
     <a:masterClrMapping/>
   </p:clrMapOvr>
-  <p:timing>
-    <p:tnLst>
-      <p:par>
-        <p:cTn id="1" dur="indefinite" restart="never" nodeType="tmRoot"/>
-      </p:par>
-    </p:tnLst>
-  </p:timing>
 </p:sld>
 </file>
 
@@ -7736,10 +7694,10 @@
           <a:lstStyle/>
           <a:p>
             <a:r>
-              <a:rPr lang="en-US" b="1" dirty="0" smtClean="0"/>
+              <a:rPr lang="en-US" b="1" dirty="0"/>
               <a:t>The firm size distribution - France</a:t>
             </a:r>
-            <a:endParaRPr lang="en-ZA" dirty="0" smtClean="0"/>
+            <a:endParaRPr lang="en-ZA" dirty="0"/>
           </a:p>
         </p:txBody>
       </p:sp>
@@ -7785,7 +7743,7 @@
           <a:lstStyle/>
           <a:p>
             <a:r>
-              <a:rPr lang="en-ZA" sz="1400" dirty="0" smtClean="0">
+              <a:rPr lang="en-ZA" sz="1400" dirty="0">
                 <a:latin typeface="+mn-lt"/>
               </a:rPr>
               <a:t>Source: </a:t>
@@ -7896,13 +7854,6 @@
   <p:clrMapOvr>
     <a:masterClrMapping/>
   </p:clrMapOvr>
-  <p:timing>
-    <p:tnLst>
-      <p:par>
-        <p:cTn id="1" dur="indefinite" restart="never" nodeType="tmRoot"/>
-      </p:par>
-    </p:tnLst>
-  </p:timing>
 </p:sld>
 </file>
 
@@ -7997,10 +7948,10 @@
           <a:lstStyle/>
           <a:p>
             <a:r>
-              <a:rPr lang="en-US" b="1" dirty="0" smtClean="0"/>
+              <a:rPr lang="en-US" b="1" dirty="0"/>
               <a:t>The firm size distribution - France</a:t>
             </a:r>
-            <a:endParaRPr lang="en-ZA" dirty="0" smtClean="0"/>
+            <a:endParaRPr lang="en-ZA" dirty="0"/>
           </a:p>
         </p:txBody>
       </p:sp>
@@ -8028,7 +7979,7 @@
               <a:buNone/>
             </a:pPr>
             <a:r>
-              <a:rPr lang="en-US" sz="2000" dirty="0" smtClean="0"/>
+              <a:rPr lang="en-US" sz="2000" dirty="0"/>
               <a:t>What is going on?</a:t>
             </a:r>
           </a:p>
@@ -8037,16 +7988,8 @@
               <a:buNone/>
             </a:pPr>
             <a:r>
-              <a:rPr lang="en-ZA" sz="2000" dirty="0" smtClean="0"/>
-              <a:t>When </a:t>
-            </a:r>
-            <a:r>
               <a:rPr lang="en-ZA" sz="2000" dirty="0"/>
-              <a:t>firms get to the 50 employee threshold they need to undertake the following </a:t>
-            </a:r>
-            <a:r>
-              <a:rPr lang="en-ZA" sz="2000" dirty="0" smtClean="0"/>
-              <a:t>duties</a:t>
+              <a:t>When firms get to the 50 employee threshold they need to undertake the following duties</a:t>
             </a:r>
           </a:p>
           <a:p>
@@ -8057,12 +8000,8 @@
           </a:p>
           <a:p>
             <a:r>
-              <a:rPr lang="en-ZA" sz="1600" dirty="0" smtClean="0"/>
-              <a:t>They </a:t>
-            </a:r>
-            <a:r>
               <a:rPr lang="en-ZA" sz="1600" dirty="0"/>
-              <a:t>must set up a “works council” (“</a:t>
+              <a:t>They must set up a “works council” (“</a:t>
             </a:r>
             <a:r>
               <a:rPr lang="en-ZA" sz="1600" dirty="0" err="1"/>
@@ -8083,90 +8022,38 @@
           </a:p>
           <a:p>
             <a:r>
-              <a:rPr lang="en-ZA" sz="1600" dirty="0" smtClean="0"/>
-              <a:t>They </a:t>
-            </a:r>
-            <a:r>
               <a:rPr lang="en-ZA" sz="1600" dirty="0"/>
-              <a:t>must establish a committee on health, safety and working conditions (CHSCT)</a:t>
-            </a:r>
-          </a:p>
-          <a:p>
-            <a:r>
-              <a:rPr lang="en-ZA" sz="1600" dirty="0" smtClean="0"/>
-              <a:t>A </a:t>
-            </a:r>
+              <a:t>They must establish a committee on health, safety and working conditions (CHSCT)</a:t>
+            </a:r>
+          </a:p>
+          <a:p>
             <a:r>
               <a:rPr lang="en-ZA" sz="1600" dirty="0"/>
-              <a:t>union representative (i.e. not simply a local representative of the firm’s workers) must be appointed if </a:t>
-            </a:r>
-            <a:r>
-              <a:rPr lang="en-ZA" sz="1600" dirty="0" smtClean="0"/>
-              <a:t>wanted by </a:t>
-            </a:r>
+              <a:t>A union representative (i.e. not simply a local representative of the firm’s workers) must be appointed if wanted by workers</a:t>
+            </a:r>
+          </a:p>
+          <a:p>
             <a:r>
               <a:rPr lang="en-ZA" sz="1600" dirty="0"/>
-              <a:t>workers</a:t>
-            </a:r>
-          </a:p>
-          <a:p>
-            <a:r>
-              <a:rPr lang="en-ZA" sz="1600" dirty="0" smtClean="0"/>
-              <a:t>They </a:t>
-            </a:r>
+              <a:t>They must establish a profit sharing plan</a:t>
+            </a:r>
+          </a:p>
+          <a:p>
             <a:r>
               <a:rPr lang="en-ZA" sz="1600" dirty="0"/>
-              <a:t>must establish a profit sharing plan</a:t>
-            </a:r>
-          </a:p>
-          <a:p>
-            <a:r>
-              <a:rPr lang="en-ZA" sz="1600" dirty="0" smtClean="0"/>
-              <a:t>They </a:t>
-            </a:r>
+              <a:t>They incur higher liability in case of a workplace accident</a:t>
+            </a:r>
+          </a:p>
+          <a:p>
             <a:r>
               <a:rPr lang="en-ZA" sz="1600" dirty="0"/>
-              <a:t>incur higher liability in case of a workplace </a:t>
-            </a:r>
-            <a:r>
-              <a:rPr lang="en-ZA" sz="1600" dirty="0" smtClean="0"/>
-              <a:t>accident</a:t>
-            </a:r>
-          </a:p>
-          <a:p>
-            <a:r>
-              <a:rPr lang="en-ZA" sz="1600" dirty="0" smtClean="0"/>
-              <a:t>They </a:t>
-            </a:r>
+              <a:t>They must report monthly and in detail all of the labour contracts to the government.</a:t>
+            </a:r>
+          </a:p>
+          <a:p>
             <a:r>
               <a:rPr lang="en-ZA" sz="1600" dirty="0"/>
-              <a:t>must report monthly and in detail all of the </a:t>
-            </a:r>
-            <a:r>
-              <a:rPr lang="en-ZA" sz="1600" dirty="0" smtClean="0"/>
-              <a:t>labour </a:t>
-            </a:r>
-            <a:r>
-              <a:rPr lang="en-ZA" sz="1600" dirty="0"/>
-              <a:t>contracts to the government.</a:t>
-            </a:r>
-          </a:p>
-          <a:p>
-            <a:r>
-              <a:rPr lang="en-ZA" sz="1600" dirty="0" smtClean="0"/>
-              <a:t>Firing </a:t>
-            </a:r>
-            <a:r>
-              <a:rPr lang="en-ZA" sz="1600" dirty="0"/>
-              <a:t>costs increase substantially in the case of collective dismissals of 10 or more workers. This increase is </a:t>
-            </a:r>
-            <a:r>
-              <a:rPr lang="en-ZA" sz="1600" dirty="0" smtClean="0"/>
-              <a:t>an implicit </a:t>
-            </a:r>
-            <a:r>
-              <a:rPr lang="en-ZA" sz="1600" dirty="0"/>
-              <a:t>tax on firm size (e.g. </a:t>
+              <a:t>Firing costs increase substantially in the case of collective dismissals of 10 or more workers. This increase is an implicit tax on firm size (e.g. </a:t>
             </a:r>
             <a:r>
               <a:rPr lang="en-ZA" sz="1600" dirty="0" err="1"/>
@@ -8187,18 +8074,14 @@
           </a:p>
           <a:p>
             <a:r>
-              <a:rPr lang="en-ZA" sz="1600" dirty="0" smtClean="0"/>
-              <a:t>They </a:t>
-            </a:r>
-            <a:r>
               <a:rPr lang="en-ZA" sz="1600" dirty="0"/>
-              <a:t>must undertake to do a formal “Professional assessment” for each worker older than 45.</a:t>
-            </a:r>
-            <a:endParaRPr lang="en-US" sz="1600" dirty="0" smtClean="0"/>
+              <a:t>They must undertake to do a formal “Professional assessment” for each worker older than 45.</a:t>
+            </a:r>
+            <a:endParaRPr lang="en-US" sz="1600" dirty="0"/>
           </a:p>
           <a:p>
             <a:pPr marL="1257300" lvl="2" indent="-457200"/>
-            <a:endParaRPr lang="en-US" sz="1600" dirty="0" smtClean="0">
+            <a:endParaRPr lang="en-US" sz="1600" dirty="0">
               <a:latin typeface="Calibri" pitchFamily="34" charset="0"/>
             </a:endParaRPr>
           </a:p>
@@ -8206,7 +8089,7 @@
             <a:pPr marL="0" indent="0">
               <a:buNone/>
             </a:pPr>
-            <a:endParaRPr lang="en-US" sz="1800" dirty="0" smtClean="0">
+            <a:endParaRPr lang="en-US" sz="1800" dirty="0">
               <a:latin typeface="Calibri" pitchFamily="34" charset="0"/>
             </a:endParaRPr>
           </a:p>
@@ -8218,7 +8101,7 @@
           </a:p>
           <a:p>
             <a:pPr marL="857250" lvl="1" indent="-457200"/>
-            <a:endParaRPr lang="en-US" sz="1800" dirty="0" smtClean="0">
+            <a:endParaRPr lang="en-US" sz="1800" dirty="0">
               <a:latin typeface="Calibri" pitchFamily="34" charset="0"/>
             </a:endParaRPr>
           </a:p>
@@ -8226,7 +8109,7 @@
             <a:pPr marL="0" indent="0">
               <a:buNone/>
             </a:pPr>
-            <a:endParaRPr lang="en-US" sz="1800" dirty="0" smtClean="0">
+            <a:endParaRPr lang="en-US" sz="1800" dirty="0">
               <a:latin typeface="Calibri" pitchFamily="34" charset="0"/>
             </a:endParaRPr>
           </a:p>
@@ -8244,7 +8127,7 @@
               <a:buFont typeface="Arial" charset="0"/>
               <a:buChar char="•"/>
             </a:pPr>
-            <a:endParaRPr lang="en-US" sz="1800" dirty="0" smtClean="0">
+            <a:endParaRPr lang="en-US" sz="1800" dirty="0">
               <a:latin typeface="Calibri" pitchFamily="34" charset="0"/>
             </a:endParaRPr>
           </a:p>
@@ -8253,7 +8136,7 @@
               <a:buFont typeface="Arial" charset="0"/>
               <a:buChar char="•"/>
             </a:pPr>
-            <a:endParaRPr lang="en-US" sz="1800" dirty="0" smtClean="0">
+            <a:endParaRPr lang="en-US" sz="1800" dirty="0">
               <a:latin typeface="Calibri" pitchFamily="34" charset="0"/>
             </a:endParaRPr>
           </a:p>
@@ -8262,7 +8145,7 @@
               <a:buFont typeface="Arial" charset="0"/>
               <a:buChar char="•"/>
             </a:pPr>
-            <a:endParaRPr lang="en-US" sz="1800" dirty="0" smtClean="0">
+            <a:endParaRPr lang="en-US" sz="1800" dirty="0">
               <a:latin typeface="Calibri" pitchFamily="34" charset="0"/>
             </a:endParaRPr>
           </a:p>
@@ -8279,7 +8162,7 @@
             <a:pPr marL="400050" lvl="1" indent="0">
               <a:buNone/>
             </a:pPr>
-            <a:endParaRPr lang="en-US" sz="1800" dirty="0" smtClean="0">
+            <a:endParaRPr lang="en-US" sz="1800" dirty="0">
               <a:latin typeface="Calibri" pitchFamily="34" charset="0"/>
             </a:endParaRPr>
           </a:p>
@@ -8287,7 +8170,7 @@
             <a:pPr marL="400050" lvl="1" indent="0">
               <a:buNone/>
             </a:pPr>
-            <a:endParaRPr lang="en-US" sz="1800" dirty="0" smtClean="0">
+            <a:endParaRPr lang="en-US" sz="1800" dirty="0">
               <a:latin typeface="Calibri" pitchFamily="34" charset="0"/>
             </a:endParaRPr>
           </a:p>
@@ -8296,15 +8179,15 @@
               <a:buFont typeface="Arial" charset="0"/>
               <a:buChar char="•"/>
             </a:pPr>
-            <a:endParaRPr lang="en-US" sz="1800" dirty="0" smtClean="0">
-              <a:latin typeface="Calibri" pitchFamily="34" charset="0"/>
-            </a:endParaRPr>
-          </a:p>
-          <a:p>
-            <a:endParaRPr lang="en-ZA" dirty="0" smtClean="0"/>
-          </a:p>
-          <a:p>
-            <a:endParaRPr lang="en-ZA" dirty="0" smtClean="0"/>
+            <a:endParaRPr lang="en-US" sz="1800" dirty="0">
+              <a:latin typeface="Calibri" pitchFamily="34" charset="0"/>
+            </a:endParaRPr>
+          </a:p>
+          <a:p>
+            <a:endParaRPr lang="en-ZA" dirty="0"/>
+          </a:p>
+          <a:p>
+            <a:endParaRPr lang="en-ZA" dirty="0"/>
           </a:p>
         </p:txBody>
       </p:sp>
@@ -8318,13 +8201,6 @@
   <p:clrMapOvr>
     <a:masterClrMapping/>
   </p:clrMapOvr>
-  <p:timing>
-    <p:tnLst>
-      <p:par>
-        <p:cTn id="1" dur="indefinite" restart="never" nodeType="tmRoot"/>
-      </p:par>
-    </p:tnLst>
-  </p:timing>
 </p:sld>
 </file>
 
@@ -8419,10 +8295,10 @@
           <a:lstStyle/>
           <a:p>
             <a:r>
-              <a:rPr lang="en-US" b="1" dirty="0" smtClean="0"/>
+              <a:rPr lang="en-US" b="1" dirty="0"/>
               <a:t>The firm size distribution – France, data</a:t>
             </a:r>
-            <a:endParaRPr lang="en-ZA" dirty="0" smtClean="0"/>
+            <a:endParaRPr lang="en-ZA" dirty="0"/>
           </a:p>
         </p:txBody>
       </p:sp>
@@ -8447,24 +8323,17 @@
           <a:lstStyle/>
           <a:p>
             <a:r>
-              <a:rPr lang="en-ZA" sz="1800" dirty="0" smtClean="0"/>
-              <a:t>Data </a:t>
-            </a:r>
-            <a:r>
               <a:rPr lang="en-ZA" sz="1800" dirty="0"/>
-              <a:t>covering the universe of French </a:t>
-            </a:r>
-            <a:r>
-              <a:rPr lang="en-ZA" sz="1800" dirty="0" smtClean="0"/>
-              <a:t>firms between </a:t>
-            </a:r>
+              <a:t>Data covering the universe of French firms between 2002 and 2007 (FICUS)</a:t>
+            </a:r>
+          </a:p>
+          <a:p>
+            <a:endParaRPr lang="en-ZA" sz="1800" dirty="0"/>
+          </a:p>
+          <a:p>
             <a:r>
               <a:rPr lang="en-ZA" sz="1800" dirty="0"/>
-              <a:t>2002 and </a:t>
-            </a:r>
-            <a:r>
-              <a:rPr lang="en-ZA" sz="1800" dirty="0" smtClean="0"/>
-              <a:t>2007 (FICUS)</a:t>
+              <a:t>From various tax records</a:t>
             </a:r>
           </a:p>
           <a:p>
@@ -8472,46 +8341,25 @@
           </a:p>
           <a:p>
             <a:r>
-              <a:rPr lang="en-ZA" sz="1800" dirty="0" smtClean="0"/>
-              <a:t>From various tax records</a:t>
+              <a:rPr lang="en-ZA" sz="1800" dirty="0"/>
+              <a:t>The employment measure in the FICUS relates to a headcount of the number of workers in the firm averaged over the four quarters of the fiscal year</a:t>
             </a:r>
           </a:p>
           <a:p>
             <a:endParaRPr lang="en-ZA" sz="1800" dirty="0"/>
           </a:p>
           <a:p>
-            <a:r>
-              <a:rPr lang="en-ZA" sz="1800" dirty="0"/>
-              <a:t>The employment measure in the FICUS relates to a headcount of the number of workers in the firm </a:t>
-            </a:r>
-            <a:r>
-              <a:rPr lang="en-ZA" sz="1800" dirty="0" smtClean="0"/>
-              <a:t>averaged over </a:t>
-            </a:r>
-            <a:r>
-              <a:rPr lang="en-ZA" sz="1800" dirty="0"/>
-              <a:t>the four quarters of the fiscal </a:t>
-            </a:r>
-            <a:r>
-              <a:rPr lang="en-ZA" sz="1800" dirty="0" smtClean="0"/>
-              <a:t>year</a:t>
-            </a:r>
-          </a:p>
-          <a:p>
             <a:endParaRPr lang="en-ZA" sz="1800" dirty="0"/>
           </a:p>
           <a:p>
-            <a:endParaRPr lang="en-ZA" sz="1800" dirty="0" smtClean="0"/>
-          </a:p>
-          <a:p>
             <a:endParaRPr lang="en-ZA" sz="1800" dirty="0"/>
           </a:p>
           <a:p>
-            <a:endParaRPr lang="en-US" sz="1800" dirty="0" smtClean="0"/>
+            <a:endParaRPr lang="en-US" sz="1800" dirty="0"/>
           </a:p>
           <a:p>
             <a:pPr marL="1257300" lvl="2" indent="-457200"/>
-            <a:endParaRPr lang="en-US" sz="1600" dirty="0" smtClean="0">
+            <a:endParaRPr lang="en-US" sz="1600" dirty="0">
               <a:latin typeface="Calibri" pitchFamily="34" charset="0"/>
             </a:endParaRPr>
           </a:p>
@@ -8519,7 +8367,7 @@
             <a:pPr marL="0" indent="0">
               <a:buNone/>
             </a:pPr>
-            <a:endParaRPr lang="en-US" sz="1800" dirty="0" smtClean="0">
+            <a:endParaRPr lang="en-US" sz="1800" dirty="0">
               <a:latin typeface="Calibri" pitchFamily="34" charset="0"/>
             </a:endParaRPr>
           </a:p>
@@ -8531,7 +8379,7 @@
           </a:p>
           <a:p>
             <a:pPr marL="857250" lvl="1" indent="-457200"/>
-            <a:endParaRPr lang="en-US" sz="1800" dirty="0" smtClean="0">
+            <a:endParaRPr lang="en-US" sz="1800" dirty="0">
               <a:latin typeface="Calibri" pitchFamily="34" charset="0"/>
             </a:endParaRPr>
           </a:p>
@@ -8539,7 +8387,7 @@
             <a:pPr marL="0" indent="0">
               <a:buNone/>
             </a:pPr>
-            <a:endParaRPr lang="en-US" sz="1800" dirty="0" smtClean="0">
+            <a:endParaRPr lang="en-US" sz="1800" dirty="0">
               <a:latin typeface="Calibri" pitchFamily="34" charset="0"/>
             </a:endParaRPr>
           </a:p>
@@ -8557,7 +8405,7 @@
               <a:buFont typeface="Arial" charset="0"/>
               <a:buChar char="•"/>
             </a:pPr>
-            <a:endParaRPr lang="en-US" sz="1800" dirty="0" smtClean="0">
+            <a:endParaRPr lang="en-US" sz="1800" dirty="0">
               <a:latin typeface="Calibri" pitchFamily="34" charset="0"/>
             </a:endParaRPr>
           </a:p>
@@ -8566,7 +8414,7 @@
               <a:buFont typeface="Arial" charset="0"/>
               <a:buChar char="•"/>
             </a:pPr>
-            <a:endParaRPr lang="en-US" sz="1800" dirty="0" smtClean="0">
+            <a:endParaRPr lang="en-US" sz="1800" dirty="0">
               <a:latin typeface="Calibri" pitchFamily="34" charset="0"/>
             </a:endParaRPr>
           </a:p>
@@ -8575,7 +8423,7 @@
               <a:buFont typeface="Arial" charset="0"/>
               <a:buChar char="•"/>
             </a:pPr>
-            <a:endParaRPr lang="en-US" sz="1800" dirty="0" smtClean="0">
+            <a:endParaRPr lang="en-US" sz="1800" dirty="0">
               <a:latin typeface="Calibri" pitchFamily="34" charset="0"/>
             </a:endParaRPr>
           </a:p>
@@ -8592,7 +8440,7 @@
             <a:pPr marL="400050" lvl="1" indent="0">
               <a:buNone/>
             </a:pPr>
-            <a:endParaRPr lang="en-US" sz="1800" dirty="0" smtClean="0">
+            <a:endParaRPr lang="en-US" sz="1800" dirty="0">
               <a:latin typeface="Calibri" pitchFamily="34" charset="0"/>
             </a:endParaRPr>
           </a:p>
@@ -8600,7 +8448,7 @@
             <a:pPr marL="400050" lvl="1" indent="0">
               <a:buNone/>
             </a:pPr>
-            <a:endParaRPr lang="en-US" sz="1800" dirty="0" smtClean="0">
+            <a:endParaRPr lang="en-US" sz="1800" dirty="0">
               <a:latin typeface="Calibri" pitchFamily="34" charset="0"/>
             </a:endParaRPr>
           </a:p>
@@ -8609,15 +8457,15 @@
               <a:buFont typeface="Arial" charset="0"/>
               <a:buChar char="•"/>
             </a:pPr>
-            <a:endParaRPr lang="en-US" sz="1800" dirty="0" smtClean="0">
-              <a:latin typeface="Calibri" pitchFamily="34" charset="0"/>
-            </a:endParaRPr>
-          </a:p>
-          <a:p>
-            <a:endParaRPr lang="en-ZA" dirty="0" smtClean="0"/>
-          </a:p>
-          <a:p>
-            <a:endParaRPr lang="en-ZA" dirty="0" smtClean="0"/>
+            <a:endParaRPr lang="en-US" sz="1800" dirty="0">
+              <a:latin typeface="Calibri" pitchFamily="34" charset="0"/>
+            </a:endParaRPr>
+          </a:p>
+          <a:p>
+            <a:endParaRPr lang="en-ZA" dirty="0"/>
+          </a:p>
+          <a:p>
+            <a:endParaRPr lang="en-ZA" dirty="0"/>
           </a:p>
         </p:txBody>
       </p:sp>
@@ -8631,13 +8479,6 @@
   <p:clrMapOvr>
     <a:masterClrMapping/>
   </p:clrMapOvr>
-  <p:timing>
-    <p:tnLst>
-      <p:par>
-        <p:cTn id="1" dur="indefinite" restart="never" nodeType="tmRoot"/>
-      </p:par>
-    </p:tnLst>
-  </p:timing>
 </p:sld>
 </file>
 
@@ -8732,10 +8573,10 @@
           <a:lstStyle/>
           <a:p>
             <a:r>
-              <a:rPr lang="en-US" b="1" dirty="0" smtClean="0"/>
+              <a:rPr lang="en-US" b="1" dirty="0"/>
               <a:t>A robust relationship</a:t>
             </a:r>
-            <a:endParaRPr lang="en-ZA" dirty="0" smtClean="0"/>
+            <a:endParaRPr lang="en-ZA" dirty="0"/>
           </a:p>
         </p:txBody>
       </p:sp>
@@ -8807,7 +8648,7 @@
           <a:lstStyle/>
           <a:p>
             <a:r>
-              <a:rPr lang="en-ZA" dirty="0" smtClean="0">
+              <a:rPr lang="en-ZA" dirty="0">
                 <a:latin typeface="+mn-lt"/>
               </a:rPr>
               <a:t>Why?</a:t>
@@ -8815,14 +8656,11 @@
           </a:p>
           <a:p>
             <a:r>
-              <a:rPr lang="en-ZA" dirty="0" smtClean="0">
+              <a:rPr lang="en-ZA" dirty="0">
                 <a:latin typeface="+mn-lt"/>
               </a:rPr>
               <a:t>And how do we figure out the causal mechanism?</a:t>
             </a:r>
-            <a:endParaRPr lang="en-ZA" dirty="0">
-              <a:latin typeface="+mn-lt"/>
-            </a:endParaRPr>
           </a:p>
         </p:txBody>
       </p:sp>
@@ -8836,13 +8674,6 @@
   <p:clrMapOvr>
     <a:masterClrMapping/>
   </p:clrMapOvr>
-  <p:timing>
-    <p:tnLst>
-      <p:par>
-        <p:cTn id="1" dur="indefinite" restart="never" nodeType="tmRoot"/>
-      </p:par>
-    </p:tnLst>
-  </p:timing>
 </p:sld>
 </file>
 
@@ -8937,10 +8768,10 @@
           <a:lstStyle/>
           <a:p>
             <a:r>
-              <a:rPr lang="en-US" b="1" dirty="0" smtClean="0"/>
+              <a:rPr lang="en-US" b="1" dirty="0"/>
               <a:t>The firm size distribution - France</a:t>
             </a:r>
-            <a:endParaRPr lang="en-ZA" dirty="0" smtClean="0"/>
+            <a:endParaRPr lang="en-ZA" dirty="0"/>
           </a:p>
         </p:txBody>
       </p:sp>
@@ -8967,7 +8798,7 @@
           <a:lstStyle/>
           <a:p>
             <a:r>
-              <a:rPr lang="en-ZA" sz="1400" dirty="0" smtClean="0">
+              <a:rPr lang="en-ZA" sz="1400" dirty="0">
                 <a:latin typeface="+mn-lt"/>
               </a:rPr>
               <a:t>Source: </a:t>
@@ -9080,13 +8911,6 @@
   <p:clrMapOvr>
     <a:masterClrMapping/>
   </p:clrMapOvr>
-  <p:timing>
-    <p:tnLst>
-      <p:par>
-        <p:cTn id="1" dur="indefinite" restart="never" nodeType="tmRoot"/>
-      </p:par>
-    </p:tnLst>
-  </p:timing>
 </p:sld>
 </file>
 
@@ -9181,10 +9005,10 @@
           <a:lstStyle/>
           <a:p>
             <a:r>
-              <a:rPr lang="en-US" b="1" dirty="0" smtClean="0"/>
+              <a:rPr lang="en-US" b="1" dirty="0"/>
               <a:t>What about productivity?</a:t>
             </a:r>
-            <a:endParaRPr lang="en-ZA" dirty="0" smtClean="0"/>
+            <a:endParaRPr lang="en-ZA" dirty="0"/>
           </a:p>
         </p:txBody>
       </p:sp>
@@ -9211,7 +9035,7 @@
           <a:lstStyle/>
           <a:p>
             <a:r>
-              <a:rPr lang="en-ZA" sz="1400" dirty="0" smtClean="0">
+              <a:rPr lang="en-ZA" sz="1400" dirty="0">
                 <a:latin typeface="+mn-lt"/>
               </a:rPr>
               <a:t>Source: </a:t>
@@ -9324,13 +9148,6 @@
   <p:clrMapOvr>
     <a:masterClrMapping/>
   </p:clrMapOvr>
-  <p:timing>
-    <p:tnLst>
-      <p:par>
-        <p:cTn id="1" dur="indefinite" restart="never" nodeType="tmRoot"/>
-      </p:par>
-    </p:tnLst>
-  </p:timing>
 </p:sld>
 </file>
 
@@ -9425,10 +9242,10 @@
           <a:lstStyle/>
           <a:p>
             <a:r>
-              <a:rPr lang="en-US" b="1" dirty="0" smtClean="0"/>
+              <a:rPr lang="en-US" b="1" dirty="0"/>
               <a:t>The firm size distribution – France</a:t>
             </a:r>
-            <a:endParaRPr lang="en-ZA" dirty="0" smtClean="0"/>
+            <a:endParaRPr lang="en-ZA" dirty="0"/>
           </a:p>
         </p:txBody>
       </p:sp>
@@ -9456,7 +9273,7 @@
               <a:buNone/>
             </a:pPr>
             <a:r>
-              <a:rPr lang="en-ZA" sz="1800" dirty="0" smtClean="0"/>
+              <a:rPr lang="en-ZA" sz="1800" dirty="0"/>
               <a:t>What are the costs?</a:t>
             </a:r>
           </a:p>
@@ -9464,29 +9281,21 @@
             <a:pPr marL="0" indent="0">
               <a:buNone/>
             </a:pPr>
-            <a:endParaRPr lang="en-ZA" sz="1800" dirty="0" smtClean="0"/>
+            <a:endParaRPr lang="en-ZA" sz="1800" dirty="0"/>
           </a:p>
           <a:p>
             <a:pPr marL="0" indent="0">
               <a:buNone/>
             </a:pPr>
             <a:r>
-              <a:rPr lang="en-ZA" sz="1800" dirty="0" smtClean="0"/>
+              <a:rPr lang="en-ZA" sz="1800" dirty="0"/>
               <a:t>The regulation causes welfare loses by:</a:t>
             </a:r>
           </a:p>
           <a:p>
             <a:r>
-              <a:rPr lang="en-ZA" sz="1800" dirty="0" smtClean="0"/>
-              <a:t>allocating </a:t>
-            </a:r>
-            <a:r>
               <a:rPr lang="en-ZA" sz="1800" dirty="0"/>
-              <a:t>too little employment to more productive firms who choose to be just below the regulatory threshold</a:t>
-            </a:r>
-            <a:r>
-              <a:rPr lang="en-ZA" sz="1800" dirty="0" smtClean="0"/>
-              <a:t>,</a:t>
+              <a:t>allocating too little employment to more productive firms who choose to be just below the regulatory threshold,</a:t>
             </a:r>
           </a:p>
           <a:p>
@@ -9494,72 +9303,31 @@
           </a:p>
           <a:p>
             <a:r>
-              <a:rPr lang="en-ZA" sz="1800" dirty="0" smtClean="0"/>
-              <a:t>allocating </a:t>
-            </a:r>
-            <a:r>
               <a:rPr lang="en-ZA" sz="1800" dirty="0"/>
-              <a:t>too little employment to more productive firms who bear the implicit </a:t>
-            </a:r>
-            <a:r>
-              <a:rPr lang="en-ZA" sz="1800" dirty="0" smtClean="0"/>
-              <a:t>labour </a:t>
-            </a:r>
+              <a:t>allocating too little employment to more productive firms who bear the implicit labour tax (whereas small firms do not) and </a:t>
+            </a:r>
+          </a:p>
+          <a:p>
+            <a:endParaRPr lang="en-ZA" sz="1800" dirty="0"/>
+          </a:p>
+          <a:p>
             <a:r>
               <a:rPr lang="en-ZA" sz="1800" dirty="0"/>
-              <a:t>tax (whereas small </a:t>
-            </a:r>
-            <a:r>
-              <a:rPr lang="en-ZA" sz="1800" dirty="0" smtClean="0"/>
-              <a:t>firms do </a:t>
-            </a:r>
-            <a:r>
-              <a:rPr lang="en-ZA" sz="1800" dirty="0"/>
-              <a:t>not) and </a:t>
-            </a:r>
-            <a:endParaRPr lang="en-ZA" sz="1800" dirty="0" smtClean="0"/>
-          </a:p>
-          <a:p>
-            <a:endParaRPr lang="en-ZA" sz="1800" dirty="0" smtClean="0"/>
-          </a:p>
-          <a:p>
-            <a:r>
-              <a:rPr lang="en-ZA" sz="1800" dirty="0" smtClean="0"/>
-              <a:t>through </a:t>
-            </a:r>
-            <a:r>
-              <a:rPr lang="en-ZA" sz="1800" dirty="0"/>
-              <a:t>reducing equilibrium wages (due to some tax incidence falling on workers) encourages </a:t>
-            </a:r>
-            <a:r>
-              <a:rPr lang="en-ZA" sz="1800" dirty="0" smtClean="0"/>
-              <a:t>too many </a:t>
-            </a:r>
-            <a:r>
-              <a:rPr lang="en-ZA" sz="1800" dirty="0"/>
-              <a:t>agents with low managerial ability to become small entrepreneurs rather than working as employees for </a:t>
-            </a:r>
-            <a:r>
-              <a:rPr lang="en-ZA" sz="1800" dirty="0" smtClean="0"/>
-              <a:t>more productive </a:t>
-            </a:r>
-            <a:r>
-              <a:rPr lang="en-ZA" sz="1800" dirty="0"/>
-              <a:t>entrepreneurs</a:t>
-            </a:r>
-          </a:p>
-          <a:p>
-            <a:endParaRPr lang="en-ZA" sz="1800" dirty="0" smtClean="0"/>
+              <a:t>through reducing equilibrium wages (due to some tax incidence falling on workers) encourages too many agents with low managerial ability to become small entrepreneurs rather than working as employees for more productive entrepreneurs</a:t>
+            </a:r>
           </a:p>
           <a:p>
             <a:endParaRPr lang="en-ZA" sz="1800" dirty="0"/>
           </a:p>
           <a:p>
-            <a:endParaRPr lang="en-US" sz="1800" dirty="0" smtClean="0"/>
+            <a:endParaRPr lang="en-ZA" sz="1800" dirty="0"/>
+          </a:p>
+          <a:p>
+            <a:endParaRPr lang="en-US" sz="1800" dirty="0"/>
           </a:p>
           <a:p>
             <a:pPr marL="1257300" lvl="2" indent="-457200"/>
-            <a:endParaRPr lang="en-US" sz="1600" dirty="0" smtClean="0">
+            <a:endParaRPr lang="en-US" sz="1600" dirty="0">
               <a:latin typeface="Calibri" pitchFamily="34" charset="0"/>
             </a:endParaRPr>
           </a:p>
@@ -9567,7 +9335,7 @@
             <a:pPr marL="0" indent="0">
               <a:buNone/>
             </a:pPr>
-            <a:endParaRPr lang="en-US" sz="1800" dirty="0" smtClean="0">
+            <a:endParaRPr lang="en-US" sz="1800" dirty="0">
               <a:latin typeface="Calibri" pitchFamily="34" charset="0"/>
             </a:endParaRPr>
           </a:p>
@@ -9579,7 +9347,7 @@
           </a:p>
           <a:p>
             <a:pPr marL="857250" lvl="1" indent="-457200"/>
-            <a:endParaRPr lang="en-US" sz="1800" dirty="0" smtClean="0">
+            <a:endParaRPr lang="en-US" sz="1800" dirty="0">
               <a:latin typeface="Calibri" pitchFamily="34" charset="0"/>
             </a:endParaRPr>
           </a:p>
@@ -9587,7 +9355,7 @@
             <a:pPr marL="0" indent="0">
               <a:buNone/>
             </a:pPr>
-            <a:endParaRPr lang="en-US" sz="1800" dirty="0" smtClean="0">
+            <a:endParaRPr lang="en-US" sz="1800" dirty="0">
               <a:latin typeface="Calibri" pitchFamily="34" charset="0"/>
             </a:endParaRPr>
           </a:p>
@@ -9605,7 +9373,7 @@
               <a:buFont typeface="Arial" charset="0"/>
               <a:buChar char="•"/>
             </a:pPr>
-            <a:endParaRPr lang="en-US" sz="1800" dirty="0" smtClean="0">
+            <a:endParaRPr lang="en-US" sz="1800" dirty="0">
               <a:latin typeface="Calibri" pitchFamily="34" charset="0"/>
             </a:endParaRPr>
           </a:p>
@@ -9614,7 +9382,7 @@
               <a:buFont typeface="Arial" charset="0"/>
               <a:buChar char="•"/>
             </a:pPr>
-            <a:endParaRPr lang="en-US" sz="1800" dirty="0" smtClean="0">
+            <a:endParaRPr lang="en-US" sz="1800" dirty="0">
               <a:latin typeface="Calibri" pitchFamily="34" charset="0"/>
             </a:endParaRPr>
           </a:p>
@@ -9623,7 +9391,7 @@
               <a:buFont typeface="Arial" charset="0"/>
               <a:buChar char="•"/>
             </a:pPr>
-            <a:endParaRPr lang="en-US" sz="1800" dirty="0" smtClean="0">
+            <a:endParaRPr lang="en-US" sz="1800" dirty="0">
               <a:latin typeface="Calibri" pitchFamily="34" charset="0"/>
             </a:endParaRPr>
           </a:p>
@@ -9640,7 +9408,7 @@
             <a:pPr marL="400050" lvl="1" indent="0">
               <a:buNone/>
             </a:pPr>
-            <a:endParaRPr lang="en-US" sz="1800" dirty="0" smtClean="0">
+            <a:endParaRPr lang="en-US" sz="1800" dirty="0">
               <a:latin typeface="Calibri" pitchFamily="34" charset="0"/>
             </a:endParaRPr>
           </a:p>
@@ -9648,7 +9416,7 @@
             <a:pPr marL="400050" lvl="1" indent="0">
               <a:buNone/>
             </a:pPr>
-            <a:endParaRPr lang="en-US" sz="1800" dirty="0" smtClean="0">
+            <a:endParaRPr lang="en-US" sz="1800" dirty="0">
               <a:latin typeface="Calibri" pitchFamily="34" charset="0"/>
             </a:endParaRPr>
           </a:p>
@@ -9657,15 +9425,15 @@
               <a:buFont typeface="Arial" charset="0"/>
               <a:buChar char="•"/>
             </a:pPr>
-            <a:endParaRPr lang="en-US" sz="1800" dirty="0" smtClean="0">
-              <a:latin typeface="Calibri" pitchFamily="34" charset="0"/>
-            </a:endParaRPr>
-          </a:p>
-          <a:p>
-            <a:endParaRPr lang="en-ZA" dirty="0" smtClean="0"/>
-          </a:p>
-          <a:p>
-            <a:endParaRPr lang="en-ZA" dirty="0" smtClean="0"/>
+            <a:endParaRPr lang="en-US" sz="1800" dirty="0">
+              <a:latin typeface="Calibri" pitchFamily="34" charset="0"/>
+            </a:endParaRPr>
+          </a:p>
+          <a:p>
+            <a:endParaRPr lang="en-ZA" dirty="0"/>
+          </a:p>
+          <a:p>
+            <a:endParaRPr lang="en-ZA" dirty="0"/>
           </a:p>
         </p:txBody>
       </p:sp>
@@ -9679,13 +9447,6 @@
   <p:clrMapOvr>
     <a:masterClrMapping/>
   </p:clrMapOvr>
-  <p:timing>
-    <p:tnLst>
-      <p:par>
-        <p:cTn id="1" dur="indefinite" restart="never" nodeType="tmRoot"/>
-      </p:par>
-    </p:tnLst>
-  </p:timing>
 </p:sld>
 </file>
 
@@ -9780,14 +9541,10 @@
           <a:lstStyle/>
           <a:p>
             <a:r>
-              <a:rPr lang="en-US" b="1" dirty="0" smtClean="0"/>
-              <a:t>What about South Africa</a:t>
-            </a:r>
-            <a:r>
-              <a:rPr lang="en-US" b="1" dirty="0" smtClean="0"/>
-              <a:t>? Flowerday et al (2017)</a:t>
-            </a:r>
-            <a:endParaRPr lang="en-ZA" dirty="0" smtClean="0"/>
+              <a:rPr lang="en-US" b="1" dirty="0"/>
+              <a:t>What about South Africa? Flowerday et al (2017)</a:t>
+            </a:r>
+            <a:endParaRPr lang="en-ZA" dirty="0"/>
           </a:p>
         </p:txBody>
       </p:sp>
@@ -9815,7 +9572,7 @@
               <a:buNone/>
             </a:pPr>
             <a:r>
-              <a:rPr lang="en-ZA" sz="1800" dirty="0" smtClean="0"/>
+              <a:rPr lang="en-ZA" sz="1800" dirty="0"/>
               <a:t>A number of regulations which have size thresholds. For example:</a:t>
             </a:r>
           </a:p>
@@ -9827,7 +9584,7 @@
           </a:p>
           <a:p>
             <a:r>
-              <a:rPr lang="en-ZA" sz="1800" dirty="0" smtClean="0"/>
+              <a:rPr lang="en-ZA" sz="1800" dirty="0"/>
               <a:t>Employment Equity Act</a:t>
             </a:r>
           </a:p>
@@ -9836,7 +9593,7 @@
           </a:p>
           <a:p>
             <a:r>
-              <a:rPr lang="en-ZA" sz="1800" dirty="0" smtClean="0"/>
+              <a:rPr lang="en-ZA" sz="1800" dirty="0"/>
               <a:t>BBBEE</a:t>
             </a:r>
           </a:p>
@@ -9845,7 +9602,7 @@
           </a:p>
           <a:p>
             <a:r>
-              <a:rPr lang="en-ZA" sz="1800" dirty="0" smtClean="0"/>
+              <a:rPr lang="en-ZA" sz="1800" dirty="0"/>
               <a:t>Small business tax incentive</a:t>
             </a:r>
           </a:p>
@@ -9856,14 +9613,14 @@
             <a:pPr marL="0" indent="0">
               <a:buNone/>
             </a:pPr>
-            <a:endParaRPr lang="en-ZA" sz="1800" dirty="0" smtClean="0"/>
+            <a:endParaRPr lang="en-ZA" sz="1800" dirty="0"/>
           </a:p>
           <a:p>
             <a:pPr marL="0" indent="0">
               <a:buNone/>
             </a:pPr>
             <a:r>
-              <a:rPr lang="en-ZA" sz="1800" dirty="0" smtClean="0"/>
+              <a:rPr lang="en-ZA" sz="1800" dirty="0"/>
               <a:t>How might these affect employment?</a:t>
             </a:r>
           </a:p>
@@ -9871,23 +9628,23 @@
             <a:endParaRPr lang="en-ZA" sz="1800" dirty="0"/>
           </a:p>
           <a:p>
-            <a:endParaRPr lang="en-ZA" sz="1800" dirty="0" smtClean="0"/>
-          </a:p>
-          <a:p>
             <a:endParaRPr lang="en-ZA" sz="1800" dirty="0"/>
           </a:p>
           <a:p>
-            <a:endParaRPr lang="en-ZA" sz="1800" dirty="0" smtClean="0"/>
-          </a:p>
-          <a:p>
             <a:endParaRPr lang="en-ZA" sz="1800" dirty="0"/>
           </a:p>
           <a:p>
-            <a:endParaRPr lang="en-US" sz="1800" dirty="0" smtClean="0"/>
+            <a:endParaRPr lang="en-ZA" sz="1800" dirty="0"/>
+          </a:p>
+          <a:p>
+            <a:endParaRPr lang="en-ZA" sz="1800" dirty="0"/>
+          </a:p>
+          <a:p>
+            <a:endParaRPr lang="en-US" sz="1800" dirty="0"/>
           </a:p>
           <a:p>
             <a:pPr marL="1257300" lvl="2" indent="-457200"/>
-            <a:endParaRPr lang="en-US" sz="1600" dirty="0" smtClean="0">
+            <a:endParaRPr lang="en-US" sz="1600" dirty="0">
               <a:latin typeface="Calibri" pitchFamily="34" charset="0"/>
             </a:endParaRPr>
           </a:p>
@@ -9895,7 +9652,7 @@
             <a:pPr marL="0" indent="0">
               <a:buNone/>
             </a:pPr>
-            <a:endParaRPr lang="en-US" sz="1800" dirty="0" smtClean="0">
+            <a:endParaRPr lang="en-US" sz="1800" dirty="0">
               <a:latin typeface="Calibri" pitchFamily="34" charset="0"/>
             </a:endParaRPr>
           </a:p>
@@ -9907,7 +9664,7 @@
           </a:p>
           <a:p>
             <a:pPr marL="857250" lvl="1" indent="-457200"/>
-            <a:endParaRPr lang="en-US" sz="1800" dirty="0" smtClean="0">
+            <a:endParaRPr lang="en-US" sz="1800" dirty="0">
               <a:latin typeface="Calibri" pitchFamily="34" charset="0"/>
             </a:endParaRPr>
           </a:p>
@@ -9915,7 +9672,7 @@
             <a:pPr marL="0" indent="0">
               <a:buNone/>
             </a:pPr>
-            <a:endParaRPr lang="en-US" sz="1800" dirty="0" smtClean="0">
+            <a:endParaRPr lang="en-US" sz="1800" dirty="0">
               <a:latin typeface="Calibri" pitchFamily="34" charset="0"/>
             </a:endParaRPr>
           </a:p>
@@ -9933,7 +9690,7 @@
               <a:buFont typeface="Arial" charset="0"/>
               <a:buChar char="•"/>
             </a:pPr>
-            <a:endParaRPr lang="en-US" sz="1800" dirty="0" smtClean="0">
+            <a:endParaRPr lang="en-US" sz="1800" dirty="0">
               <a:latin typeface="Calibri" pitchFamily="34" charset="0"/>
             </a:endParaRPr>
           </a:p>
@@ -9942,7 +9699,7 @@
               <a:buFont typeface="Arial" charset="0"/>
               <a:buChar char="•"/>
             </a:pPr>
-            <a:endParaRPr lang="en-US" sz="1800" dirty="0" smtClean="0">
+            <a:endParaRPr lang="en-US" sz="1800" dirty="0">
               <a:latin typeface="Calibri" pitchFamily="34" charset="0"/>
             </a:endParaRPr>
           </a:p>
@@ -9951,7 +9708,7 @@
               <a:buFont typeface="Arial" charset="0"/>
               <a:buChar char="•"/>
             </a:pPr>
-            <a:endParaRPr lang="en-US" sz="1800" dirty="0" smtClean="0">
+            <a:endParaRPr lang="en-US" sz="1800" dirty="0">
               <a:latin typeface="Calibri" pitchFamily="34" charset="0"/>
             </a:endParaRPr>
           </a:p>
@@ -9968,7 +9725,7 @@
             <a:pPr marL="400050" lvl="1" indent="0">
               <a:buNone/>
             </a:pPr>
-            <a:endParaRPr lang="en-US" sz="1800" dirty="0" smtClean="0">
+            <a:endParaRPr lang="en-US" sz="1800" dirty="0">
               <a:latin typeface="Calibri" pitchFamily="34" charset="0"/>
             </a:endParaRPr>
           </a:p>
@@ -9976,7 +9733,7 @@
             <a:pPr marL="400050" lvl="1" indent="0">
               <a:buNone/>
             </a:pPr>
-            <a:endParaRPr lang="en-US" sz="1800" dirty="0" smtClean="0">
+            <a:endParaRPr lang="en-US" sz="1800" dirty="0">
               <a:latin typeface="Calibri" pitchFamily="34" charset="0"/>
             </a:endParaRPr>
           </a:p>
@@ -9985,15 +9742,15 @@
               <a:buFont typeface="Arial" charset="0"/>
               <a:buChar char="•"/>
             </a:pPr>
-            <a:endParaRPr lang="en-US" sz="1800" dirty="0" smtClean="0">
-              <a:latin typeface="Calibri" pitchFamily="34" charset="0"/>
-            </a:endParaRPr>
-          </a:p>
-          <a:p>
-            <a:endParaRPr lang="en-ZA" dirty="0" smtClean="0"/>
-          </a:p>
-          <a:p>
-            <a:endParaRPr lang="en-ZA" dirty="0" smtClean="0"/>
+            <a:endParaRPr lang="en-US" sz="1800" dirty="0">
+              <a:latin typeface="Calibri" pitchFamily="34" charset="0"/>
+            </a:endParaRPr>
+          </a:p>
+          <a:p>
+            <a:endParaRPr lang="en-ZA" dirty="0"/>
+          </a:p>
+          <a:p>
+            <a:endParaRPr lang="en-ZA" dirty="0"/>
           </a:p>
         </p:txBody>
       </p:sp>
@@ -10007,13 +9764,6 @@
   <p:clrMapOvr>
     <a:masterClrMapping/>
   </p:clrMapOvr>
-  <p:timing>
-    <p:tnLst>
-      <p:par>
-        <p:cTn id="1" dur="indefinite" restart="never" nodeType="tmRoot"/>
-      </p:par>
-    </p:tnLst>
-  </p:timing>
 </p:sld>
 </file>
 
@@ -10108,10 +9858,10 @@
           <a:lstStyle/>
           <a:p>
             <a:r>
-              <a:rPr lang="en-US" b="1" dirty="0" smtClean="0"/>
+              <a:rPr lang="en-US" b="1" dirty="0"/>
               <a:t>South Africa</a:t>
             </a:r>
-            <a:endParaRPr lang="en-ZA" dirty="0" smtClean="0"/>
+            <a:endParaRPr lang="en-ZA" dirty="0"/>
           </a:p>
         </p:txBody>
       </p:sp>
@@ -10139,7 +9889,7 @@
               <a:buNone/>
             </a:pPr>
             <a:r>
-              <a:rPr lang="en-ZA" sz="1800" dirty="0" smtClean="0"/>
+              <a:rPr lang="en-ZA" sz="1800" dirty="0"/>
               <a:t>Flowerday uses a balanced panel of manufacturing firms for the years 1996 and 2001</a:t>
             </a:r>
           </a:p>
@@ -10154,7 +9904,7 @@
               <a:buNone/>
             </a:pPr>
             <a:r>
-              <a:rPr lang="en-ZA" sz="1800" dirty="0" smtClean="0"/>
+              <a:rPr lang="en-ZA" sz="1800" dirty="0"/>
               <a:t>EEA was implemented in 1998</a:t>
             </a:r>
           </a:p>
@@ -10169,7 +9919,7 @@
               <a:buNone/>
             </a:pPr>
             <a:r>
-              <a:rPr lang="en-ZA" sz="1800" dirty="0" smtClean="0"/>
+              <a:rPr lang="en-ZA" sz="1800" dirty="0"/>
               <a:t>Only applicable to firms with 50+ employees</a:t>
             </a:r>
           </a:p>
@@ -10184,14 +9934,14 @@
               <a:buNone/>
             </a:pPr>
             <a:r>
-              <a:rPr lang="en-ZA" sz="1800" dirty="0" smtClean="0"/>
+              <a:rPr lang="en-ZA" sz="1800" dirty="0"/>
               <a:t>Uncertainty about procedures </a:t>
             </a:r>
             <a:r>
-              <a:rPr lang="en-ZA" sz="1800" dirty="0" err="1" smtClean="0"/>
+              <a:rPr lang="en-ZA" sz="1800" dirty="0" err="1"/>
               <a:t>etc</a:t>
             </a:r>
-            <a:endParaRPr lang="en-ZA" sz="1800" dirty="0" smtClean="0"/>
+            <a:endParaRPr lang="en-ZA" sz="1800" dirty="0"/>
           </a:p>
           <a:p>
             <a:pPr marL="0" indent="0">
@@ -10204,7 +9954,7 @@
               <a:buNone/>
             </a:pPr>
             <a:r>
-              <a:rPr lang="en-ZA" sz="1800" dirty="0" smtClean="0"/>
+              <a:rPr lang="en-ZA" sz="1800" dirty="0"/>
               <a:t>How did firms respond?</a:t>
             </a:r>
           </a:p>
@@ -10212,23 +9962,23 @@
             <a:endParaRPr lang="en-ZA" sz="1800" dirty="0"/>
           </a:p>
           <a:p>
-            <a:endParaRPr lang="en-ZA" sz="1800" dirty="0" smtClean="0"/>
-          </a:p>
-          <a:p>
             <a:endParaRPr lang="en-ZA" sz="1800" dirty="0"/>
           </a:p>
           <a:p>
-            <a:endParaRPr lang="en-ZA" sz="1800" dirty="0" smtClean="0"/>
-          </a:p>
-          <a:p>
             <a:endParaRPr lang="en-ZA" sz="1800" dirty="0"/>
           </a:p>
           <a:p>
-            <a:endParaRPr lang="en-US" sz="1800" dirty="0" smtClean="0"/>
+            <a:endParaRPr lang="en-ZA" sz="1800" dirty="0"/>
+          </a:p>
+          <a:p>
+            <a:endParaRPr lang="en-ZA" sz="1800" dirty="0"/>
+          </a:p>
+          <a:p>
+            <a:endParaRPr lang="en-US" sz="1800" dirty="0"/>
           </a:p>
           <a:p>
             <a:pPr marL="1257300" lvl="2" indent="-457200"/>
-            <a:endParaRPr lang="en-US" sz="1600" dirty="0" smtClean="0">
+            <a:endParaRPr lang="en-US" sz="1600" dirty="0">
               <a:latin typeface="Calibri" pitchFamily="34" charset="0"/>
             </a:endParaRPr>
           </a:p>
@@ -10236,7 +9986,7 @@
             <a:pPr marL="0" indent="0">
               <a:buNone/>
             </a:pPr>
-            <a:endParaRPr lang="en-US" sz="1800" dirty="0" smtClean="0">
+            <a:endParaRPr lang="en-US" sz="1800" dirty="0">
               <a:latin typeface="Calibri" pitchFamily="34" charset="0"/>
             </a:endParaRPr>
           </a:p>
@@ -10248,7 +9998,7 @@
           </a:p>
           <a:p>
             <a:pPr marL="857250" lvl="1" indent="-457200"/>
-            <a:endParaRPr lang="en-US" sz="1800" dirty="0" smtClean="0">
+            <a:endParaRPr lang="en-US" sz="1800" dirty="0">
               <a:latin typeface="Calibri" pitchFamily="34" charset="0"/>
             </a:endParaRPr>
           </a:p>
@@ -10256,7 +10006,7 @@
             <a:pPr marL="0" indent="0">
               <a:buNone/>
             </a:pPr>
-            <a:endParaRPr lang="en-US" sz="1800" dirty="0" smtClean="0">
+            <a:endParaRPr lang="en-US" sz="1800" dirty="0">
               <a:latin typeface="Calibri" pitchFamily="34" charset="0"/>
             </a:endParaRPr>
           </a:p>
@@ -10274,7 +10024,7 @@
               <a:buFont typeface="Arial" charset="0"/>
               <a:buChar char="•"/>
             </a:pPr>
-            <a:endParaRPr lang="en-US" sz="1800" dirty="0" smtClean="0">
+            <a:endParaRPr lang="en-US" sz="1800" dirty="0">
               <a:latin typeface="Calibri" pitchFamily="34" charset="0"/>
             </a:endParaRPr>
           </a:p>
@@ -10283,7 +10033,7 @@
               <a:buFont typeface="Arial" charset="0"/>
               <a:buChar char="•"/>
             </a:pPr>
-            <a:endParaRPr lang="en-US" sz="1800" dirty="0" smtClean="0">
+            <a:endParaRPr lang="en-US" sz="1800" dirty="0">
               <a:latin typeface="Calibri" pitchFamily="34" charset="0"/>
             </a:endParaRPr>
           </a:p>
@@ -10292,7 +10042,7 @@
               <a:buFont typeface="Arial" charset="0"/>
               <a:buChar char="•"/>
             </a:pPr>
-            <a:endParaRPr lang="en-US" sz="1800" dirty="0" smtClean="0">
+            <a:endParaRPr lang="en-US" sz="1800" dirty="0">
               <a:latin typeface="Calibri" pitchFamily="34" charset="0"/>
             </a:endParaRPr>
           </a:p>
@@ -10309,7 +10059,7 @@
             <a:pPr marL="400050" lvl="1" indent="0">
               <a:buNone/>
             </a:pPr>
-            <a:endParaRPr lang="en-US" sz="1800" dirty="0" smtClean="0">
+            <a:endParaRPr lang="en-US" sz="1800" dirty="0">
               <a:latin typeface="Calibri" pitchFamily="34" charset="0"/>
             </a:endParaRPr>
           </a:p>
@@ -10317,7 +10067,7 @@
             <a:pPr marL="400050" lvl="1" indent="0">
               <a:buNone/>
             </a:pPr>
-            <a:endParaRPr lang="en-US" sz="1800" dirty="0" smtClean="0">
+            <a:endParaRPr lang="en-US" sz="1800" dirty="0">
               <a:latin typeface="Calibri" pitchFamily="34" charset="0"/>
             </a:endParaRPr>
           </a:p>
@@ -10326,15 +10076,15 @@
               <a:buFont typeface="Arial" charset="0"/>
               <a:buChar char="•"/>
             </a:pPr>
-            <a:endParaRPr lang="en-US" sz="1800" dirty="0" smtClean="0">
-              <a:latin typeface="Calibri" pitchFamily="34" charset="0"/>
-            </a:endParaRPr>
-          </a:p>
-          <a:p>
-            <a:endParaRPr lang="en-ZA" dirty="0" smtClean="0"/>
-          </a:p>
-          <a:p>
-            <a:endParaRPr lang="en-ZA" dirty="0" smtClean="0"/>
+            <a:endParaRPr lang="en-US" sz="1800" dirty="0">
+              <a:latin typeface="Calibri" pitchFamily="34" charset="0"/>
+            </a:endParaRPr>
+          </a:p>
+          <a:p>
+            <a:endParaRPr lang="en-ZA" dirty="0"/>
+          </a:p>
+          <a:p>
+            <a:endParaRPr lang="en-ZA" dirty="0"/>
           </a:p>
         </p:txBody>
       </p:sp>
@@ -10348,13 +10098,6 @@
   <p:clrMapOvr>
     <a:masterClrMapping/>
   </p:clrMapOvr>
-  <p:timing>
-    <p:tnLst>
-      <p:par>
-        <p:cTn id="1" dur="indefinite" restart="never" nodeType="tmRoot"/>
-      </p:par>
-    </p:tnLst>
-  </p:timing>
 </p:sld>
 </file>
 
@@ -10449,10 +10192,10 @@
           <a:lstStyle/>
           <a:p>
             <a:r>
-              <a:rPr lang="en-US" b="1" dirty="0" smtClean="0"/>
+              <a:rPr lang="en-US" b="1" dirty="0"/>
               <a:t>South Africa</a:t>
             </a:r>
-            <a:endParaRPr lang="en-ZA" dirty="0" smtClean="0"/>
+            <a:endParaRPr lang="en-ZA" dirty="0"/>
           </a:p>
         </p:txBody>
       </p:sp>
@@ -10532,7 +10275,7 @@
               <a:tabLst/>
             </a:pPr>
             <a:r>
-              <a:rPr kumimoji="0" lang="en-US" altLang="en-US" sz="1200" b="1" i="0" u="none" strike="noStrike" cap="none" normalizeH="0" baseline="0" dirty="0" smtClean="0">
+              <a:rPr kumimoji="0" lang="en-US" altLang="en-US" sz="1200" b="1" i="0" u="none" strike="noStrike" cap="none" normalizeH="0" baseline="0" dirty="0">
                 <a:ln>
                   <a:noFill/>
                 </a:ln>
@@ -10547,7 +10290,7 @@
               <a:t>Figure 1: Number of firms per employment bracket in 1996, and 2001</a:t>
             </a:r>
             <a:r>
-              <a:rPr kumimoji="0" lang="en-US" altLang="en-US" sz="800" b="0" i="0" u="none" strike="noStrike" cap="none" normalizeH="0" baseline="0" dirty="0" smtClean="0">
+              <a:rPr kumimoji="0" lang="en-US" altLang="en-US" sz="800" b="0" i="0" u="none" strike="noStrike" cap="none" normalizeH="0" baseline="0" dirty="0">
                 <a:ln>
                   <a:noFill/>
                 </a:ln>
@@ -10561,7 +10304,7 @@
               </a:rPr>
               <a:t> </a:t>
             </a:r>
-            <a:endParaRPr kumimoji="0" lang="en-ZA" altLang="en-US" sz="700" b="0" i="0" u="none" strike="noStrike" cap="none" normalizeH="0" baseline="0" dirty="0" smtClean="0">
+            <a:endParaRPr kumimoji="0" lang="en-ZA" altLang="en-US" sz="700" b="0" i="0" u="none" strike="noStrike" cap="none" normalizeH="0" baseline="0" dirty="0">
               <a:ln>
                 <a:noFill/>
               </a:ln>
@@ -10590,7 +10333,7 @@
               <a:buNone/>
               <a:tabLst/>
             </a:pPr>
-            <a:endParaRPr kumimoji="0" lang="en-ZA" altLang="en-US" sz="1800" b="0" i="0" u="none" strike="noStrike" cap="none" normalizeH="0" baseline="0" dirty="0" smtClean="0">
+            <a:endParaRPr kumimoji="0" lang="en-ZA" altLang="en-US" sz="1800" b="0" i="0" u="none" strike="noStrike" cap="none" normalizeH="0" baseline="0" dirty="0">
               <a:ln>
                 <a:noFill/>
               </a:ln>
@@ -10720,7 +10463,7 @@
               <a:buNone/>
               <a:tabLst/>
             </a:pPr>
-            <a:endParaRPr kumimoji="0" lang="en-US" altLang="en-US" sz="1800" b="0" i="0" u="none" strike="noStrike" cap="none" normalizeH="0" baseline="0" smtClean="0">
+            <a:endParaRPr kumimoji="0" lang="en-US" altLang="en-US" sz="1800" b="0" i="0" u="none" strike="noStrike" cap="none" normalizeH="0" baseline="0">
               <a:ln>
                 <a:noFill/>
               </a:ln>
@@ -10744,13 +10487,6 @@
   <p:clrMapOvr>
     <a:masterClrMapping/>
   </p:clrMapOvr>
-  <p:timing>
-    <p:tnLst>
-      <p:par>
-        <p:cTn id="1" dur="indefinite" restart="never" nodeType="tmRoot"/>
-      </p:par>
-    </p:tnLst>
-  </p:timing>
 </p:sld>
 </file>
 
@@ -10845,10 +10581,10 @@
           <a:lstStyle/>
           <a:p>
             <a:r>
-              <a:rPr lang="en-US" b="1" dirty="0" smtClean="0"/>
+              <a:rPr lang="en-US" b="1" dirty="0"/>
               <a:t>South Africa</a:t>
             </a:r>
-            <a:endParaRPr lang="en-ZA" dirty="0" smtClean="0"/>
+            <a:endParaRPr lang="en-ZA" dirty="0"/>
           </a:p>
         </p:txBody>
       </p:sp>
@@ -10927,7 +10663,7 @@
               <a:buNone/>
               <a:tabLst/>
             </a:pPr>
-            <a:endParaRPr kumimoji="0" lang="en-US" altLang="en-US" sz="1800" b="0" i="0" u="none" strike="noStrike" cap="none" normalizeH="0" baseline="0" smtClean="0">
+            <a:endParaRPr kumimoji="0" lang="en-US" altLang="en-US" sz="1800" b="0" i="0" u="none" strike="noStrike" cap="none" normalizeH="0" baseline="0">
               <a:ln>
                 <a:noFill/>
               </a:ln>
@@ -11017,7 +10753,7 @@
               <a:tabLst/>
             </a:pPr>
             <a:r>
-              <a:rPr kumimoji="0" lang="en-US" altLang="en-US" sz="1200" b="1" i="0" u="none" strike="noStrike" cap="none" normalizeH="0" baseline="0" dirty="0" smtClean="0">
+              <a:rPr kumimoji="0" lang="en-US" altLang="en-US" sz="1200" b="1" i="0" u="none" strike="noStrike" cap="none" normalizeH="0" baseline="0" dirty="0">
                 <a:ln>
                   <a:noFill/>
                 </a:ln>
@@ -11031,7 +10767,7 @@
               </a:rPr>
               <a:t>Figure 3: Average difference in asset value of firms</a:t>
             </a:r>
-            <a:endParaRPr kumimoji="0" lang="en-ZA" altLang="en-US" sz="700" b="0" i="0" u="none" strike="noStrike" cap="none" normalizeH="0" baseline="0" dirty="0" smtClean="0">
+            <a:endParaRPr kumimoji="0" lang="en-ZA" altLang="en-US" sz="700" b="0" i="0" u="none" strike="noStrike" cap="none" normalizeH="0" baseline="0" dirty="0">
               <a:ln>
                 <a:noFill/>
               </a:ln>
@@ -11060,7 +10796,7 @@
               <a:buNone/>
               <a:tabLst/>
             </a:pPr>
-            <a:endParaRPr kumimoji="0" lang="en-ZA" altLang="en-US" sz="1800" b="0" i="0" u="none" strike="noStrike" cap="none" normalizeH="0" baseline="0" dirty="0" smtClean="0">
+            <a:endParaRPr kumimoji="0" lang="en-ZA" altLang="en-US" sz="1800" b="0" i="0" u="none" strike="noStrike" cap="none" normalizeH="0" baseline="0" dirty="0">
               <a:ln>
                 <a:noFill/>
               </a:ln>
@@ -11190,7 +10926,7 @@
               <a:buNone/>
               <a:tabLst/>
             </a:pPr>
-            <a:endParaRPr kumimoji="0" lang="en-US" altLang="en-US" sz="1800" b="0" i="0" u="none" strike="noStrike" cap="none" normalizeH="0" baseline="0" smtClean="0">
+            <a:endParaRPr kumimoji="0" lang="en-US" altLang="en-US" sz="1800" b="0" i="0" u="none" strike="noStrike" cap="none" normalizeH="0" baseline="0">
               <a:ln>
                 <a:noFill/>
               </a:ln>
@@ -11214,13 +10950,6 @@
   <p:clrMapOvr>
     <a:masterClrMapping/>
   </p:clrMapOvr>
-  <p:timing>
-    <p:tnLst>
-      <p:par>
-        <p:cTn id="1" dur="indefinite" restart="never" nodeType="tmRoot"/>
-      </p:par>
-    </p:tnLst>
-  </p:timing>
 </p:sld>
 </file>
 
@@ -11315,10 +11044,10 @@
           <a:lstStyle/>
           <a:p>
             <a:r>
-              <a:rPr lang="en-US" b="1" dirty="0" smtClean="0"/>
+              <a:rPr lang="en-US" b="1" dirty="0"/>
               <a:t>South Africa</a:t>
             </a:r>
-            <a:endParaRPr lang="en-ZA" dirty="0" smtClean="0"/>
+            <a:endParaRPr lang="en-ZA" dirty="0"/>
           </a:p>
         </p:txBody>
       </p:sp>
@@ -11397,7 +11126,7 @@
               <a:buNone/>
               <a:tabLst/>
             </a:pPr>
-            <a:endParaRPr kumimoji="0" lang="en-US" altLang="en-US" sz="1800" b="0" i="0" u="none" strike="noStrike" cap="none" normalizeH="0" baseline="0" smtClean="0">
+            <a:endParaRPr kumimoji="0" lang="en-US" altLang="en-US" sz="1800" b="0" i="0" u="none" strike="noStrike" cap="none" normalizeH="0" baseline="0">
               <a:ln>
                 <a:noFill/>
               </a:ln>
@@ -11486,7 +11215,7 @@
               <a:buNone/>
               <a:tabLst/>
             </a:pPr>
-            <a:endParaRPr kumimoji="0" lang="en-US" altLang="en-US" sz="1800" b="0" i="0" u="none" strike="noStrike" cap="none" normalizeH="0" baseline="0" smtClean="0">
+            <a:endParaRPr kumimoji="0" lang="en-US" altLang="en-US" sz="1800" b="0" i="0" u="none" strike="noStrike" cap="none" normalizeH="0" baseline="0">
               <a:ln>
                 <a:noFill/>
               </a:ln>
@@ -11576,7 +11305,7 @@
               <a:tabLst/>
             </a:pPr>
             <a:r>
-              <a:rPr kumimoji="0" lang="en-US" altLang="en-US" sz="1200" b="1" i="0" u="none" strike="noStrike" cap="none" normalizeH="0" baseline="0" dirty="0" smtClean="0">
+              <a:rPr kumimoji="0" lang="en-US" altLang="en-US" sz="1200" b="1" i="0" u="none" strike="noStrike" cap="none" normalizeH="0" baseline="0" dirty="0">
                 <a:ln>
                   <a:noFill/>
                 </a:ln>
@@ -11590,7 +11319,7 @@
               </a:rPr>
               <a:t>Figure 4: Average difference in average wages per employee</a:t>
             </a:r>
-            <a:endParaRPr kumimoji="0" lang="en-US" altLang="en-US" sz="1800" b="0" i="0" u="none" strike="noStrike" cap="none" normalizeH="0" baseline="0" dirty="0" smtClean="0">
+            <a:endParaRPr kumimoji="0" lang="en-US" altLang="en-US" sz="1800" b="0" i="0" u="none" strike="noStrike" cap="none" normalizeH="0" baseline="0" dirty="0">
               <a:ln>
                 <a:noFill/>
               </a:ln>
@@ -11720,7 +11449,7 @@
               <a:buNone/>
               <a:tabLst/>
             </a:pPr>
-            <a:endParaRPr kumimoji="0" lang="en-US" altLang="en-US" sz="1800" b="0" i="0" u="none" strike="noStrike" cap="none" normalizeH="0" baseline="0" smtClean="0">
+            <a:endParaRPr kumimoji="0" lang="en-US" altLang="en-US" sz="1800" b="0" i="0" u="none" strike="noStrike" cap="none" normalizeH="0" baseline="0">
               <a:ln>
                 <a:noFill/>
               </a:ln>
@@ -11744,13 +11473,6 @@
   <p:clrMapOvr>
     <a:masterClrMapping/>
   </p:clrMapOvr>
-  <p:timing>
-    <p:tnLst>
-      <p:par>
-        <p:cTn id="1" dur="indefinite" restart="never" nodeType="tmRoot"/>
-      </p:par>
-    </p:tnLst>
-  </p:timing>
 </p:sld>
 </file>
 
@@ -11845,10 +11567,10 @@
           <a:lstStyle/>
           <a:p>
             <a:r>
-              <a:rPr lang="en-US" b="1" dirty="0" smtClean="0"/>
+              <a:rPr lang="en-US" b="1" dirty="0"/>
               <a:t>South Africa</a:t>
             </a:r>
-            <a:endParaRPr lang="en-ZA" dirty="0" smtClean="0"/>
+            <a:endParaRPr lang="en-ZA" dirty="0"/>
           </a:p>
         </p:txBody>
       </p:sp>
@@ -11927,7 +11649,7 @@
               <a:buNone/>
               <a:tabLst/>
             </a:pPr>
-            <a:endParaRPr kumimoji="0" lang="en-US" altLang="en-US" sz="1800" b="0" i="0" u="none" strike="noStrike" cap="none" normalizeH="0" baseline="0" smtClean="0">
+            <a:endParaRPr kumimoji="0" lang="en-US" altLang="en-US" sz="1800" b="0" i="0" u="none" strike="noStrike" cap="none" normalizeH="0" baseline="0">
               <a:ln>
                 <a:noFill/>
               </a:ln>
@@ -12016,7 +11738,7 @@
               <a:buNone/>
               <a:tabLst/>
             </a:pPr>
-            <a:endParaRPr kumimoji="0" lang="en-US" altLang="en-US" sz="1800" b="0" i="0" u="none" strike="noStrike" cap="none" normalizeH="0" baseline="0" smtClean="0">
+            <a:endParaRPr kumimoji="0" lang="en-US" altLang="en-US" sz="1800" b="0" i="0" u="none" strike="noStrike" cap="none" normalizeH="0" baseline="0">
               <a:ln>
                 <a:noFill/>
               </a:ln>
@@ -12106,7 +11828,7 @@
               <a:tabLst/>
             </a:pPr>
             <a:r>
-              <a:rPr kumimoji="0" lang="en-US" altLang="en-US" sz="1200" b="1" i="0" u="none" strike="noStrike" cap="none" normalizeH="0" baseline="0" dirty="0" smtClean="0">
+              <a:rPr kumimoji="0" lang="en-US" altLang="en-US" sz="1200" b="1" i="0" u="none" strike="noStrike" cap="none" normalizeH="0" baseline="0" dirty="0">
                 <a:ln>
                   <a:noFill/>
                 </a:ln>
@@ -12118,39 +11840,9 @@
                 <a:ea typeface="Calibri" pitchFamily="34" charset="0"/>
                 <a:cs typeface="Times New Roman" pitchFamily="18" charset="0"/>
               </a:rPr>
-              <a:t>Average </a:t>
-            </a:r>
-            <a:r>
-              <a:rPr kumimoji="0" lang="en-US" altLang="en-US" sz="1200" b="1" i="0" u="none" strike="noStrike" cap="none" normalizeH="0" baseline="0" dirty="0" smtClean="0">
-                <a:ln>
-                  <a:noFill/>
-                </a:ln>
-                <a:solidFill>
-                  <a:schemeClr val="tx1"/>
-                </a:solidFill>
-                <a:effectLst/>
-                <a:latin typeface="Arial" pitchFamily="34" charset="0"/>
-                <a:ea typeface="Calibri" pitchFamily="34" charset="0"/>
-                <a:cs typeface="Times New Roman" pitchFamily="18" charset="0"/>
-              </a:rPr>
-              <a:t>difference in </a:t>
-            </a:r>
-            <a:r>
-              <a:rPr kumimoji="0" lang="en-US" altLang="en-US" sz="1200" b="1" i="0" u="none" strike="noStrike" cap="none" normalizeH="0" baseline="0" dirty="0" smtClean="0">
-                <a:ln>
-                  <a:noFill/>
-                </a:ln>
-                <a:solidFill>
-                  <a:schemeClr val="tx1"/>
-                </a:solidFill>
-                <a:effectLst/>
-                <a:latin typeface="Arial" pitchFamily="34" charset="0"/>
-                <a:ea typeface="Calibri" pitchFamily="34" charset="0"/>
-                <a:cs typeface="Times New Roman" pitchFamily="18" charset="0"/>
-              </a:rPr>
-              <a:t>output</a:t>
-            </a:r>
-            <a:endParaRPr kumimoji="0" lang="en-US" altLang="en-US" sz="1800" b="0" i="0" u="none" strike="noStrike" cap="none" normalizeH="0" baseline="0" dirty="0" smtClean="0">
+              <a:t>Average difference in output</a:t>
+            </a:r>
+            <a:endParaRPr kumimoji="0" lang="en-US" altLang="en-US" sz="1800" b="0" i="0" u="none" strike="noStrike" cap="none" normalizeH="0" baseline="0" dirty="0">
               <a:ln>
                 <a:noFill/>
               </a:ln>
@@ -12239,7 +11931,7 @@
               <a:buNone/>
               <a:tabLst/>
             </a:pPr>
-            <a:endParaRPr kumimoji="0" lang="en-US" altLang="en-US" sz="1800" b="0" i="0" u="none" strike="noStrike" cap="none" normalizeH="0" baseline="0" smtClean="0">
+            <a:endParaRPr kumimoji="0" lang="en-US" altLang="en-US" sz="1800" b="0" i="0" u="none" strike="noStrike" cap="none" normalizeH="0" baseline="0">
               <a:ln>
                 <a:noFill/>
               </a:ln>
@@ -12317,13 +12009,6 @@
   <p:clrMapOvr>
     <a:masterClrMapping/>
   </p:clrMapOvr>
-  <p:timing>
-    <p:tnLst>
-      <p:par>
-        <p:cTn id="1" dur="indefinite" restart="never" nodeType="tmRoot"/>
-      </p:par>
-    </p:tnLst>
-  </p:timing>
 </p:sld>
 </file>
 
@@ -12418,10 +12103,10 @@
           <a:lstStyle/>
           <a:p>
             <a:r>
-              <a:rPr lang="en-US" b="1" dirty="0" smtClean="0"/>
+              <a:rPr lang="en-US" b="1" dirty="0"/>
               <a:t>South Africa</a:t>
             </a:r>
-            <a:endParaRPr lang="en-ZA" dirty="0" smtClean="0"/>
+            <a:endParaRPr lang="en-ZA" dirty="0"/>
           </a:p>
         </p:txBody>
       </p:sp>
@@ -12446,7 +12131,7 @@
           <a:lstStyle/>
           <a:p>
             <a:r>
-              <a:rPr lang="en-ZA" sz="1800" dirty="0" smtClean="0"/>
+              <a:rPr lang="en-ZA" sz="1800" dirty="0"/>
               <a:t>Fewer firms just above the threshold and a bulge just below</a:t>
             </a:r>
           </a:p>
@@ -12455,7 +12140,7 @@
           </a:p>
           <a:p>
             <a:r>
-              <a:rPr lang="en-ZA" sz="1800" dirty="0" smtClean="0"/>
+              <a:rPr lang="en-ZA" sz="1800" dirty="0"/>
               <a:t>Those that cross, cross by a lot and invest heavily in capital</a:t>
             </a:r>
           </a:p>
@@ -12464,7 +12149,7 @@
           </a:p>
           <a:p>
             <a:r>
-              <a:rPr lang="en-ZA" sz="1800" dirty="0" smtClean="0"/>
+              <a:rPr lang="en-ZA" sz="1800" dirty="0"/>
               <a:t>Those just below seem to be paying higher wages</a:t>
             </a:r>
           </a:p>
@@ -12473,7 +12158,7 @@
           </a:p>
           <a:p>
             <a:r>
-              <a:rPr lang="en-ZA" sz="1800" dirty="0" smtClean="0"/>
+              <a:rPr lang="en-ZA" sz="1800" dirty="0"/>
               <a:t>Cannot say anything about firm entry and exit (these are firms that are there in both years)</a:t>
             </a:r>
           </a:p>
@@ -12482,28 +12167,28 @@
           </a:p>
           <a:p>
             <a:r>
-              <a:rPr lang="en-ZA" sz="1800" dirty="0" smtClean="0"/>
+              <a:rPr lang="en-ZA" sz="1800" dirty="0"/>
               <a:t>In later years 2005, 2008 does not seem to be there</a:t>
             </a:r>
           </a:p>
           <a:p>
             <a:pPr lvl="1"/>
             <a:r>
-              <a:rPr lang="en-ZA" sz="1600" dirty="0" smtClean="0"/>
+              <a:rPr lang="en-ZA" sz="1600" dirty="0"/>
               <a:t>Potential explanations:</a:t>
             </a:r>
           </a:p>
           <a:p>
             <a:pPr lvl="2"/>
             <a:r>
-              <a:rPr lang="en-ZA" sz="1400" dirty="0" smtClean="0"/>
+              <a:rPr lang="en-ZA" sz="1400" dirty="0"/>
               <a:t>Firms had learned how to deal with the regulations</a:t>
             </a:r>
           </a:p>
           <a:p>
             <a:pPr lvl="2"/>
             <a:r>
-              <a:rPr lang="en-ZA" sz="1400" dirty="0" smtClean="0"/>
+              <a:rPr lang="en-ZA" sz="1400" dirty="0"/>
               <a:t>The regulations were not enforced and thus had no ‘bite’</a:t>
             </a:r>
           </a:p>
@@ -12511,23 +12196,23 @@
             <a:endParaRPr lang="en-ZA" sz="1800" dirty="0"/>
           </a:p>
           <a:p>
-            <a:endParaRPr lang="en-ZA" sz="1800" dirty="0" smtClean="0"/>
-          </a:p>
-          <a:p>
             <a:endParaRPr lang="en-ZA" sz="1800" dirty="0"/>
           </a:p>
           <a:p>
-            <a:endParaRPr lang="en-ZA" sz="1800" dirty="0" smtClean="0"/>
-          </a:p>
-          <a:p>
             <a:endParaRPr lang="en-ZA" sz="1800" dirty="0"/>
           </a:p>
           <a:p>
-            <a:endParaRPr lang="en-US" sz="1800" dirty="0" smtClean="0"/>
+            <a:endParaRPr lang="en-ZA" sz="1800" dirty="0"/>
+          </a:p>
+          <a:p>
+            <a:endParaRPr lang="en-ZA" sz="1800" dirty="0"/>
+          </a:p>
+          <a:p>
+            <a:endParaRPr lang="en-US" sz="1800" dirty="0"/>
           </a:p>
           <a:p>
             <a:pPr marL="1257300" lvl="2" indent="-457200"/>
-            <a:endParaRPr lang="en-US" sz="1600" dirty="0" smtClean="0">
+            <a:endParaRPr lang="en-US" sz="1600" dirty="0">
               <a:latin typeface="Calibri" pitchFamily="34" charset="0"/>
             </a:endParaRPr>
           </a:p>
@@ -12535,7 +12220,7 @@
             <a:pPr marL="0" indent="0">
               <a:buNone/>
             </a:pPr>
-            <a:endParaRPr lang="en-US" sz="1800" dirty="0" smtClean="0">
+            <a:endParaRPr lang="en-US" sz="1800" dirty="0">
               <a:latin typeface="Calibri" pitchFamily="34" charset="0"/>
             </a:endParaRPr>
           </a:p>
@@ -12547,7 +12232,7 @@
           </a:p>
           <a:p>
             <a:pPr marL="857250" lvl="1" indent="-457200"/>
-            <a:endParaRPr lang="en-US" sz="1800" dirty="0" smtClean="0">
+            <a:endParaRPr lang="en-US" sz="1800" dirty="0">
               <a:latin typeface="Calibri" pitchFamily="34" charset="0"/>
             </a:endParaRPr>
           </a:p>
@@ -12555,7 +12240,7 @@
             <a:pPr marL="0" indent="0">
               <a:buNone/>
             </a:pPr>
-            <a:endParaRPr lang="en-US" sz="1800" dirty="0" smtClean="0">
+            <a:endParaRPr lang="en-US" sz="1800" dirty="0">
               <a:latin typeface="Calibri" pitchFamily="34" charset="0"/>
             </a:endParaRPr>
           </a:p>
@@ -12573,7 +12258,7 @@
               <a:buFont typeface="Arial" charset="0"/>
               <a:buChar char="•"/>
             </a:pPr>
-            <a:endParaRPr lang="en-US" sz="1800" dirty="0" smtClean="0">
+            <a:endParaRPr lang="en-US" sz="1800" dirty="0">
               <a:latin typeface="Calibri" pitchFamily="34" charset="0"/>
             </a:endParaRPr>
           </a:p>
@@ -12582,7 +12267,7 @@
               <a:buFont typeface="Arial" charset="0"/>
               <a:buChar char="•"/>
             </a:pPr>
-            <a:endParaRPr lang="en-US" sz="1800" dirty="0" smtClean="0">
+            <a:endParaRPr lang="en-US" sz="1800" dirty="0">
               <a:latin typeface="Calibri" pitchFamily="34" charset="0"/>
             </a:endParaRPr>
           </a:p>
@@ -12591,7 +12276,7 @@
               <a:buFont typeface="Arial" charset="0"/>
               <a:buChar char="•"/>
             </a:pPr>
-            <a:endParaRPr lang="en-US" sz="1800" dirty="0" smtClean="0">
+            <a:endParaRPr lang="en-US" sz="1800" dirty="0">
               <a:latin typeface="Calibri" pitchFamily="34" charset="0"/>
             </a:endParaRPr>
           </a:p>
@@ -12608,7 +12293,7 @@
             <a:pPr marL="400050" lvl="1" indent="0">
               <a:buNone/>
             </a:pPr>
-            <a:endParaRPr lang="en-US" sz="1800" dirty="0" smtClean="0">
+            <a:endParaRPr lang="en-US" sz="1800" dirty="0">
               <a:latin typeface="Calibri" pitchFamily="34" charset="0"/>
             </a:endParaRPr>
           </a:p>
@@ -12616,7 +12301,7 @@
             <a:pPr marL="400050" lvl="1" indent="0">
               <a:buNone/>
             </a:pPr>
-            <a:endParaRPr lang="en-US" sz="1800" dirty="0" smtClean="0">
+            <a:endParaRPr lang="en-US" sz="1800" dirty="0">
               <a:latin typeface="Calibri" pitchFamily="34" charset="0"/>
             </a:endParaRPr>
           </a:p>
@@ -12625,15 +12310,15 @@
               <a:buFont typeface="Arial" charset="0"/>
               <a:buChar char="•"/>
             </a:pPr>
-            <a:endParaRPr lang="en-US" sz="1800" dirty="0" smtClean="0">
-              <a:latin typeface="Calibri" pitchFamily="34" charset="0"/>
-            </a:endParaRPr>
-          </a:p>
-          <a:p>
-            <a:endParaRPr lang="en-ZA" dirty="0" smtClean="0"/>
-          </a:p>
-          <a:p>
-            <a:endParaRPr lang="en-ZA" dirty="0" smtClean="0"/>
+            <a:endParaRPr lang="en-US" sz="1800" dirty="0">
+              <a:latin typeface="Calibri" pitchFamily="34" charset="0"/>
+            </a:endParaRPr>
+          </a:p>
+          <a:p>
+            <a:endParaRPr lang="en-ZA" dirty="0"/>
+          </a:p>
+          <a:p>
+            <a:endParaRPr lang="en-ZA" dirty="0"/>
           </a:p>
         </p:txBody>
       </p:sp>
@@ -12647,13 +12332,6 @@
   <p:clrMapOvr>
     <a:masterClrMapping/>
   </p:clrMapOvr>
-  <p:timing>
-    <p:tnLst>
-      <p:par>
-        <p:cTn id="1" dur="indefinite" restart="never" nodeType="tmRoot"/>
-      </p:par>
-    </p:tnLst>
-  </p:timing>
 </p:sld>
 </file>
 
@@ -12748,10 +12426,10 @@
           <a:lstStyle/>
           <a:p>
             <a:r>
-              <a:rPr lang="en-US" b="1" dirty="0" smtClean="0"/>
+              <a:rPr lang="en-US" b="1" dirty="0"/>
               <a:t>Outline</a:t>
             </a:r>
-            <a:endParaRPr lang="en-ZA" dirty="0" smtClean="0"/>
+            <a:endParaRPr lang="en-ZA" dirty="0"/>
           </a:p>
         </p:txBody>
       </p:sp>
@@ -12780,7 +12458,7 @@
               <a:buChar char="•"/>
             </a:pPr>
             <a:r>
-              <a:rPr lang="en-ZA" sz="2000" dirty="0" smtClean="0"/>
+              <a:rPr lang="en-ZA" sz="2000" dirty="0"/>
               <a:t>Why do larger firms pay more?</a:t>
             </a:r>
           </a:p>
@@ -12797,7 +12475,7 @@
               <a:buChar char="•"/>
             </a:pPr>
             <a:r>
-              <a:rPr lang="en-ZA" sz="2000" dirty="0" smtClean="0"/>
+              <a:rPr lang="en-ZA" sz="2000" dirty="0"/>
               <a:t>The firm-size distribution and how government regulations may distort this</a:t>
             </a:r>
           </a:p>
@@ -12808,13 +12486,6 @@
   <p:clrMapOvr>
     <a:masterClrMapping/>
   </p:clrMapOvr>
-  <p:timing>
-    <p:tnLst>
-      <p:par>
-        <p:cTn id="1" dur="indefinite" restart="never" nodeType="tmRoot"/>
-      </p:par>
-    </p:tnLst>
-  </p:timing>
 </p:sld>
 </file>
 
@@ -12909,10 +12580,10 @@
           <a:lstStyle/>
           <a:p>
             <a:r>
-              <a:rPr lang="en-US" b="1" dirty="0" smtClean="0"/>
+              <a:rPr lang="en-US" b="1" dirty="0"/>
               <a:t>Readings</a:t>
             </a:r>
-            <a:endParaRPr lang="en-ZA" dirty="0" smtClean="0"/>
+            <a:endParaRPr lang="en-ZA" dirty="0"/>
           </a:p>
         </p:txBody>
       </p:sp>
@@ -12937,7 +12608,7 @@
           <a:lstStyle/>
           <a:p>
             <a:r>
-              <a:rPr lang="en-ZA" sz="2000" dirty="0" smtClean="0"/>
+              <a:rPr lang="en-ZA" sz="2000" dirty="0"/>
               <a:t>OI and IDSON (1999)</a:t>
             </a:r>
           </a:p>
@@ -12950,17 +12621,13 @@
           </a:p>
           <a:p>
             <a:r>
-              <a:rPr lang="en-GB" sz="2000" dirty="0" smtClean="0"/>
-              <a:t>GARICANO, LUIS, CLAIRE LELARGE, AND JOHN VAN REENEN. (2013) </a:t>
-            </a:r>
-            <a:r>
               <a:rPr lang="en-GB" sz="2000" dirty="0"/>
-              <a:t>“Firm Size Distortions And The Productivity Distribution: Evidence From France.” Working Paper 18841. NBER Working Paper Series.</a:t>
+              <a:t>GARICANO, LUIS, CLAIRE LELARGE, AND JOHN VAN REENEN. (2013) “Firm Size Distortions And The Productivity Distribution: Evidence From France.” Working Paper 18841. NBER Working Paper Series.</a:t>
             </a:r>
             <a:endParaRPr lang="en-ZA" sz="2000" dirty="0"/>
           </a:p>
           <a:p>
-            <a:endParaRPr lang="en-ZA" sz="2000" dirty="0" smtClean="0">
+            <a:endParaRPr lang="en-ZA" sz="2000" dirty="0">
               <a:solidFill>
                 <a:srgbClr val="FF0000"/>
               </a:solidFill>
@@ -12968,32 +12635,31 @@
           </a:p>
           <a:p>
             <a:r>
-              <a:rPr lang="en-ZA" sz="2000" dirty="0" smtClean="0">
-                <a:solidFill>
-                  <a:srgbClr val="FF0000"/>
-                </a:solidFill>
-              </a:rPr>
-              <a:t>FLOWERDAY et al (2017)</a:t>
-            </a:r>
-            <a:endParaRPr lang="en-ZA" sz="2000" dirty="0" smtClean="0">
+              <a:rPr lang="en-ZA" sz="2000" dirty="0"/>
+              <a:t>FLOWERDAY et al (2017) “Continuity and Change in South African </a:t>
+            </a:r>
+            <a:r>
+              <a:rPr lang="en-ZA" sz="2000" dirty="0" err="1"/>
+              <a:t>Labor</a:t>
+            </a:r>
+            <a:r>
+              <a:rPr lang="en-ZA" sz="2000" dirty="0"/>
+              <a:t> Market Regulations: the Impact of Employment Equity Act of 1998 on Employment Strategies of Firms”</a:t>
+            </a:r>
+          </a:p>
+          <a:p>
+            <a:pPr marL="285750" indent="-285750">
+              <a:buFont typeface="Arial" charset="0"/>
+              <a:buChar char="•"/>
+            </a:pPr>
+            <a:endParaRPr lang="en-ZA" sz="2000" dirty="0">
               <a:solidFill>
                 <a:srgbClr val="FF0000"/>
               </a:solidFill>
             </a:endParaRPr>
           </a:p>
           <a:p>
-            <a:pPr marL="285750" indent="-285750">
-              <a:buFont typeface="Arial" charset="0"/>
-              <a:buChar char="•"/>
-            </a:pPr>
-            <a:endParaRPr lang="en-ZA" sz="2000" dirty="0" smtClean="0">
-              <a:solidFill>
-                <a:srgbClr val="FF0000"/>
-              </a:solidFill>
-            </a:endParaRPr>
-          </a:p>
-          <a:p>
-            <a:endParaRPr lang="en-ZA" sz="2000" dirty="0" smtClean="0">
+            <a:endParaRPr lang="en-ZA" sz="2000" dirty="0">
               <a:solidFill>
                 <a:srgbClr val="FF0000"/>
               </a:solidFill>
@@ -13011,13 +12677,6 @@
   <p:clrMapOvr>
     <a:masterClrMapping/>
   </p:clrMapOvr>
-  <p:timing>
-    <p:tnLst>
-      <p:par>
-        <p:cTn id="1" dur="indefinite" restart="never" nodeType="tmRoot"/>
-      </p:par>
-    </p:tnLst>
-  </p:timing>
 </p:sld>
 </file>
 
@@ -13112,10 +12771,10 @@
           <a:lstStyle/>
           <a:p>
             <a:r>
-              <a:rPr lang="en-US" b="1" dirty="0" smtClean="0"/>
+              <a:rPr lang="en-US" b="1" dirty="0"/>
               <a:t>Why do larger firms pay more?</a:t>
             </a:r>
-            <a:endParaRPr lang="en-ZA" dirty="0" smtClean="0"/>
+            <a:endParaRPr lang="en-ZA" dirty="0"/>
           </a:p>
         </p:txBody>
       </p:sp>
@@ -13144,31 +12803,31 @@
               <a:buChar char="•"/>
             </a:pPr>
             <a:r>
-              <a:rPr lang="en-US" sz="2000" dirty="0" smtClean="0"/>
+              <a:rPr lang="en-US" sz="2000" dirty="0"/>
               <a:t>A robust finding in empirical </a:t>
             </a:r>
             <a:r>
-              <a:rPr lang="en-US" sz="2000" dirty="0" err="1" smtClean="0"/>
+              <a:rPr lang="en-US" sz="2000" dirty="0" err="1"/>
               <a:t>labour</a:t>
             </a:r>
             <a:r>
-              <a:rPr lang="en-US" sz="2000" dirty="0" smtClean="0"/>
+              <a:rPr lang="en-US" sz="2000" dirty="0"/>
               <a:t> economics is that larger firms pay more (see </a:t>
             </a:r>
             <a:r>
-              <a:rPr lang="en-US" sz="2000" dirty="0" err="1" smtClean="0"/>
+              <a:rPr lang="en-US" sz="2000" dirty="0" err="1"/>
               <a:t>Oi</a:t>
             </a:r>
             <a:r>
-              <a:rPr lang="en-US" sz="2000" dirty="0" smtClean="0"/>
+              <a:rPr lang="en-US" sz="2000" dirty="0"/>
               <a:t> and </a:t>
             </a:r>
             <a:r>
-              <a:rPr lang="en-US" sz="2000" dirty="0" err="1" smtClean="0"/>
+              <a:rPr lang="en-US" sz="2000" dirty="0" err="1"/>
               <a:t>Idson</a:t>
             </a:r>
             <a:r>
-              <a:rPr lang="en-US" sz="2000" dirty="0" smtClean="0"/>
+              <a:rPr lang="en-US" sz="2000" dirty="0"/>
               <a:t>, 1999 for a review)</a:t>
             </a:r>
           </a:p>
@@ -13185,7 +12844,7 @@
               <a:buChar char="•"/>
             </a:pPr>
             <a:r>
-              <a:rPr lang="en-US" sz="2000" dirty="0" smtClean="0"/>
+              <a:rPr lang="en-US" sz="2000" dirty="0"/>
               <a:t>Why?</a:t>
             </a:r>
           </a:p>
@@ -13195,7 +12854,7 @@
               <a:buChar char="•"/>
             </a:pPr>
             <a:r>
-              <a:rPr lang="en-US" sz="2000" dirty="0" smtClean="0"/>
+              <a:rPr lang="en-US" sz="2000" dirty="0"/>
               <a:t>Something about the individuals</a:t>
             </a:r>
           </a:p>
@@ -13203,7 +12862,7 @@
             <a:pPr marL="400050" lvl="1" indent="0">
               <a:buNone/>
             </a:pPr>
-            <a:endParaRPr lang="en-US" sz="2000" dirty="0" smtClean="0"/>
+            <a:endParaRPr lang="en-US" sz="2000" dirty="0"/>
           </a:p>
           <a:p>
             <a:pPr marL="685800" lvl="1">
@@ -13211,7 +12870,7 @@
               <a:buChar char="•"/>
             </a:pPr>
             <a:r>
-              <a:rPr lang="en-US" sz="2000" dirty="0" smtClean="0"/>
+              <a:rPr lang="en-US" sz="2000" dirty="0"/>
               <a:t>Something about the firms</a:t>
             </a:r>
           </a:p>
@@ -13219,7 +12878,7 @@
             <a:pPr marL="400050" lvl="1" indent="0">
               <a:buNone/>
             </a:pPr>
-            <a:endParaRPr lang="en-US" sz="2000" dirty="0" smtClean="0"/>
+            <a:endParaRPr lang="en-US" sz="2000" dirty="0"/>
           </a:p>
           <a:p>
             <a:pPr marL="685800" lvl="1">
@@ -13227,7 +12886,7 @@
               <a:buChar char="•"/>
             </a:pPr>
             <a:r>
-              <a:rPr lang="en-US" sz="2000" dirty="0" smtClean="0"/>
+              <a:rPr lang="en-US" sz="2000" dirty="0"/>
               <a:t>Something else</a:t>
             </a:r>
           </a:p>
@@ -13254,7 +12913,7 @@
               <a:buFont typeface="Arial" charset="0"/>
               <a:buChar char="•"/>
             </a:pPr>
-            <a:endParaRPr lang="en-US" sz="1800" dirty="0" smtClean="0">
+            <a:endParaRPr lang="en-US" sz="1800" dirty="0">
               <a:latin typeface="Calibri" pitchFamily="34" charset="0"/>
             </a:endParaRPr>
           </a:p>
@@ -13263,7 +12922,7 @@
               <a:buFont typeface="Arial" charset="0"/>
               <a:buChar char="•"/>
             </a:pPr>
-            <a:endParaRPr lang="en-US" sz="1800" dirty="0" smtClean="0">
+            <a:endParaRPr lang="en-US" sz="1800" dirty="0">
               <a:latin typeface="Calibri" pitchFamily="34" charset="0"/>
             </a:endParaRPr>
           </a:p>
@@ -13272,7 +12931,7 @@
               <a:buFont typeface="Arial" charset="0"/>
               <a:buChar char="•"/>
             </a:pPr>
-            <a:endParaRPr lang="en-US" sz="1800" dirty="0" smtClean="0">
+            <a:endParaRPr lang="en-US" sz="1800" dirty="0">
               <a:latin typeface="Calibri" pitchFamily="34" charset="0"/>
             </a:endParaRPr>
           </a:p>
@@ -13289,7 +12948,7 @@
             <a:pPr marL="400050" lvl="1" indent="0">
               <a:buNone/>
             </a:pPr>
-            <a:endParaRPr lang="en-US" sz="1800" dirty="0" smtClean="0">
+            <a:endParaRPr lang="en-US" sz="1800" dirty="0">
               <a:latin typeface="Calibri" pitchFamily="34" charset="0"/>
             </a:endParaRPr>
           </a:p>
@@ -13297,7 +12956,7 @@
             <a:pPr marL="400050" lvl="1" indent="0">
               <a:buNone/>
             </a:pPr>
-            <a:endParaRPr lang="en-US" sz="1800" dirty="0" smtClean="0">
+            <a:endParaRPr lang="en-US" sz="1800" dirty="0">
               <a:latin typeface="Calibri" pitchFamily="34" charset="0"/>
             </a:endParaRPr>
           </a:p>
@@ -13306,15 +12965,15 @@
               <a:buFont typeface="Arial" charset="0"/>
               <a:buChar char="•"/>
             </a:pPr>
-            <a:endParaRPr lang="en-US" sz="1800" dirty="0" smtClean="0">
-              <a:latin typeface="Calibri" pitchFamily="34" charset="0"/>
-            </a:endParaRPr>
-          </a:p>
-          <a:p>
-            <a:endParaRPr lang="en-ZA" dirty="0" smtClean="0"/>
-          </a:p>
-          <a:p>
-            <a:endParaRPr lang="en-ZA" dirty="0" smtClean="0"/>
+            <a:endParaRPr lang="en-US" sz="1800" dirty="0">
+              <a:latin typeface="Calibri" pitchFamily="34" charset="0"/>
+            </a:endParaRPr>
+          </a:p>
+          <a:p>
+            <a:endParaRPr lang="en-ZA" dirty="0"/>
+          </a:p>
+          <a:p>
+            <a:endParaRPr lang="en-ZA" dirty="0"/>
           </a:p>
         </p:txBody>
       </p:sp>
@@ -13328,13 +12987,6 @@
   <p:clrMapOvr>
     <a:masterClrMapping/>
   </p:clrMapOvr>
-  <p:timing>
-    <p:tnLst>
-      <p:par>
-        <p:cTn id="1" dur="indefinite" restart="never" nodeType="tmRoot"/>
-      </p:par>
-    </p:tnLst>
-  </p:timing>
 </p:sld>
 </file>
 
@@ -13429,10 +13081,10 @@
           <a:lstStyle/>
           <a:p>
             <a:r>
-              <a:rPr lang="en-US" b="1" dirty="0" smtClean="0"/>
+              <a:rPr lang="en-US" b="1" dirty="0"/>
               <a:t>Why do larger firms pay more?</a:t>
             </a:r>
-            <a:endParaRPr lang="en-ZA" dirty="0" smtClean="0"/>
+            <a:endParaRPr lang="en-ZA" dirty="0"/>
           </a:p>
         </p:txBody>
       </p:sp>
@@ -13460,7 +13112,7 @@
               <a:buNone/>
             </a:pPr>
             <a:r>
-              <a:rPr lang="en-US" sz="2000" dirty="0" smtClean="0"/>
+              <a:rPr lang="en-US" sz="2000" dirty="0"/>
               <a:t>Some potential theoretical explanations</a:t>
             </a:r>
           </a:p>
@@ -13476,29 +13128,29 @@
               <a:buAutoNum type="arabicPeriod"/>
             </a:pPr>
             <a:r>
-              <a:rPr lang="en-US" sz="2000" dirty="0" smtClean="0"/>
+              <a:rPr lang="en-US" sz="2000" dirty="0"/>
               <a:t>Skills composition</a:t>
             </a:r>
           </a:p>
           <a:p>
             <a:pPr marL="685800" lvl="1"/>
             <a:r>
-              <a:rPr lang="en-US" sz="1800" dirty="0" smtClean="0"/>
+              <a:rPr lang="en-US" sz="1800" dirty="0"/>
               <a:t>Larger firms use more skilled </a:t>
             </a:r>
             <a:r>
-              <a:rPr lang="en-US" sz="1800" dirty="0" err="1" smtClean="0"/>
+              <a:rPr lang="en-US" sz="1800" dirty="0" err="1"/>
               <a:t>labour</a:t>
             </a:r>
             <a:r>
-              <a:rPr lang="en-US" sz="1800" dirty="0" smtClean="0"/>
+              <a:rPr lang="en-US" sz="1800" dirty="0"/>
               <a:t> than smaller firms</a:t>
             </a:r>
           </a:p>
           <a:p>
             <a:pPr marL="685800" lvl="1"/>
             <a:r>
-              <a:rPr lang="en-US" sz="1800" dirty="0" smtClean="0"/>
+              <a:rPr lang="en-US" sz="1800" dirty="0"/>
               <a:t>These may be observable or unobservable</a:t>
             </a:r>
           </a:p>
@@ -13516,7 +13168,7 @@
           </a:p>
           <a:p>
             <a:pPr marL="857250" lvl="1" indent="-457200"/>
-            <a:endParaRPr lang="en-US" sz="1800" dirty="0" smtClean="0">
+            <a:endParaRPr lang="en-US" sz="1800" dirty="0">
               <a:latin typeface="Calibri" pitchFamily="34" charset="0"/>
             </a:endParaRPr>
           </a:p>
@@ -13524,7 +13176,7 @@
             <a:pPr marL="0" indent="0">
               <a:buNone/>
             </a:pPr>
-            <a:endParaRPr lang="en-US" sz="1800" dirty="0" smtClean="0">
+            <a:endParaRPr lang="en-US" sz="1800" dirty="0">
               <a:latin typeface="Calibri" pitchFamily="34" charset="0"/>
             </a:endParaRPr>
           </a:p>
@@ -13542,7 +13194,7 @@
               <a:buFont typeface="Arial" charset="0"/>
               <a:buChar char="•"/>
             </a:pPr>
-            <a:endParaRPr lang="en-US" sz="1800" dirty="0" smtClean="0">
+            <a:endParaRPr lang="en-US" sz="1800" dirty="0">
               <a:latin typeface="Calibri" pitchFamily="34" charset="0"/>
             </a:endParaRPr>
           </a:p>
@@ -13551,7 +13203,7 @@
               <a:buFont typeface="Arial" charset="0"/>
               <a:buChar char="•"/>
             </a:pPr>
-            <a:endParaRPr lang="en-US" sz="1800" dirty="0" smtClean="0">
+            <a:endParaRPr lang="en-US" sz="1800" dirty="0">
               <a:latin typeface="Calibri" pitchFamily="34" charset="0"/>
             </a:endParaRPr>
           </a:p>
@@ -13560,7 +13212,7 @@
               <a:buFont typeface="Arial" charset="0"/>
               <a:buChar char="•"/>
             </a:pPr>
-            <a:endParaRPr lang="en-US" sz="1800" dirty="0" smtClean="0">
+            <a:endParaRPr lang="en-US" sz="1800" dirty="0">
               <a:latin typeface="Calibri" pitchFamily="34" charset="0"/>
             </a:endParaRPr>
           </a:p>
@@ -13577,7 +13229,7 @@
             <a:pPr marL="400050" lvl="1" indent="0">
               <a:buNone/>
             </a:pPr>
-            <a:endParaRPr lang="en-US" sz="1800" dirty="0" smtClean="0">
+            <a:endParaRPr lang="en-US" sz="1800" dirty="0">
               <a:latin typeface="Calibri" pitchFamily="34" charset="0"/>
             </a:endParaRPr>
           </a:p>
@@ -13585,7 +13237,7 @@
             <a:pPr marL="400050" lvl="1" indent="0">
               <a:buNone/>
             </a:pPr>
-            <a:endParaRPr lang="en-US" sz="1800" dirty="0" smtClean="0">
+            <a:endParaRPr lang="en-US" sz="1800" dirty="0">
               <a:latin typeface="Calibri" pitchFamily="34" charset="0"/>
             </a:endParaRPr>
           </a:p>
@@ -13594,15 +13246,15 @@
               <a:buFont typeface="Arial" charset="0"/>
               <a:buChar char="•"/>
             </a:pPr>
-            <a:endParaRPr lang="en-US" sz="1800" dirty="0" smtClean="0">
-              <a:latin typeface="Calibri" pitchFamily="34" charset="0"/>
-            </a:endParaRPr>
-          </a:p>
-          <a:p>
-            <a:endParaRPr lang="en-ZA" dirty="0" smtClean="0"/>
-          </a:p>
-          <a:p>
-            <a:endParaRPr lang="en-ZA" dirty="0" smtClean="0"/>
+            <a:endParaRPr lang="en-US" sz="1800" dirty="0">
+              <a:latin typeface="Calibri" pitchFamily="34" charset="0"/>
+            </a:endParaRPr>
+          </a:p>
+          <a:p>
+            <a:endParaRPr lang="en-ZA" dirty="0"/>
+          </a:p>
+          <a:p>
+            <a:endParaRPr lang="en-ZA" dirty="0"/>
           </a:p>
         </p:txBody>
       </p:sp>
@@ -13653,14 +13305,11 @@
           <a:lstStyle/>
           <a:p>
             <a:r>
-              <a:rPr lang="en-ZA" sz="1400" dirty="0" smtClean="0">
+              <a:rPr lang="en-ZA" sz="1400" dirty="0">
                 <a:latin typeface="+mn-lt"/>
               </a:rPr>
               <a:t>Source:  SAPED</a:t>
             </a:r>
-            <a:endParaRPr lang="en-ZA" sz="1400" dirty="0">
-              <a:latin typeface="+mn-lt"/>
-            </a:endParaRPr>
           </a:p>
         </p:txBody>
       </p:sp>
@@ -13674,13 +13323,6 @@
   <p:clrMapOvr>
     <a:masterClrMapping/>
   </p:clrMapOvr>
-  <p:timing>
-    <p:tnLst>
-      <p:par>
-        <p:cTn id="1" dur="indefinite" restart="never" nodeType="tmRoot"/>
-      </p:par>
-    </p:tnLst>
-  </p:timing>
 </p:sld>
 </file>
 
@@ -13775,10 +13417,10 @@
           <a:lstStyle/>
           <a:p>
             <a:r>
-              <a:rPr lang="en-US" b="1" dirty="0" smtClean="0"/>
+              <a:rPr lang="en-US" b="1" dirty="0"/>
               <a:t>Why do larger firms pay more?</a:t>
             </a:r>
-            <a:endParaRPr lang="en-ZA" dirty="0" smtClean="0"/>
+            <a:endParaRPr lang="en-ZA" dirty="0"/>
           </a:p>
         </p:txBody>
       </p:sp>
@@ -13806,7 +13448,7 @@
               <a:buNone/>
             </a:pPr>
             <a:r>
-              <a:rPr lang="en-US" sz="2000" dirty="0" smtClean="0"/>
+              <a:rPr lang="en-US" sz="2000" dirty="0"/>
               <a:t>Some potential theoretical explanations</a:t>
             </a:r>
           </a:p>
@@ -13821,44 +13463,44 @@
               <a:buNone/>
             </a:pPr>
             <a:r>
-              <a:rPr lang="en-US" sz="2000" dirty="0" smtClean="0"/>
+              <a:rPr lang="en-US" sz="2000" dirty="0"/>
               <a:t>2. Different technology choice</a:t>
             </a:r>
           </a:p>
           <a:p>
             <a:pPr marL="857250" lvl="1" indent="-457200"/>
             <a:r>
-              <a:rPr lang="en-US" sz="1800" dirty="0" smtClean="0"/>
+              <a:rPr lang="en-US" sz="1800" dirty="0"/>
               <a:t>Small and large firms operate with distinct technologies</a:t>
             </a:r>
           </a:p>
           <a:p>
             <a:pPr marL="857250" lvl="1" indent="-457200"/>
-            <a:endParaRPr lang="en-US" sz="1800" dirty="0" smtClean="0"/>
+            <a:endParaRPr lang="en-US" sz="1800" dirty="0"/>
           </a:p>
           <a:p>
             <a:pPr marL="857250" lvl="1" indent="-457200"/>
             <a:r>
-              <a:rPr lang="en-US" sz="1800" dirty="0" smtClean="0"/>
+              <a:rPr lang="en-US" sz="1800" dirty="0"/>
               <a:t>For example, capital investment is ‘lumpy’ and thus smaller firms would not be able to afford big pieces of machinery and would choose more </a:t>
             </a:r>
             <a:r>
-              <a:rPr lang="en-US" sz="1800" dirty="0" err="1" smtClean="0"/>
+              <a:rPr lang="en-US" sz="1800" dirty="0" err="1"/>
               <a:t>labour-intensive</a:t>
             </a:r>
             <a:r>
-              <a:rPr lang="en-US" sz="1800" dirty="0" smtClean="0"/>
+              <a:rPr lang="en-US" sz="1800" dirty="0"/>
               <a:t> methods of production</a:t>
             </a:r>
           </a:p>
           <a:p>
             <a:pPr marL="857250" lvl="1" indent="-457200"/>
-            <a:endParaRPr lang="en-US" sz="1800" dirty="0" smtClean="0"/>
+            <a:endParaRPr lang="en-US" sz="1800" dirty="0"/>
           </a:p>
           <a:p>
             <a:pPr marL="857250" lvl="1" indent="-457200"/>
             <a:r>
-              <a:rPr lang="en-US" sz="1800" dirty="0" smtClean="0"/>
+              <a:rPr lang="en-US" sz="1800" dirty="0"/>
               <a:t>Higher capital-intensity in larger firms means that the marginal revenue product of workers, and thus wages, is higher</a:t>
             </a:r>
           </a:p>
@@ -13870,7 +13512,7 @@
           </a:p>
           <a:p>
             <a:pPr marL="857250" lvl="1" indent="-457200"/>
-            <a:endParaRPr lang="en-US" sz="1800" dirty="0" smtClean="0">
+            <a:endParaRPr lang="en-US" sz="1800" dirty="0">
               <a:latin typeface="Calibri" pitchFamily="34" charset="0"/>
             </a:endParaRPr>
           </a:p>
@@ -13878,7 +13520,7 @@
             <a:pPr marL="0" indent="0">
               <a:buNone/>
             </a:pPr>
-            <a:endParaRPr lang="en-US" sz="1800" dirty="0" smtClean="0">
+            <a:endParaRPr lang="en-US" sz="1800" dirty="0">
               <a:latin typeface="Calibri" pitchFamily="34" charset="0"/>
             </a:endParaRPr>
           </a:p>
@@ -13896,7 +13538,7 @@
               <a:buFont typeface="Arial" charset="0"/>
               <a:buChar char="•"/>
             </a:pPr>
-            <a:endParaRPr lang="en-US" sz="1800" dirty="0" smtClean="0">
+            <a:endParaRPr lang="en-US" sz="1800" dirty="0">
               <a:latin typeface="Calibri" pitchFamily="34" charset="0"/>
             </a:endParaRPr>
           </a:p>
@@ -13905,7 +13547,7 @@
               <a:buFont typeface="Arial" charset="0"/>
               <a:buChar char="•"/>
             </a:pPr>
-            <a:endParaRPr lang="en-US" sz="1800" dirty="0" smtClean="0">
+            <a:endParaRPr lang="en-US" sz="1800" dirty="0">
               <a:latin typeface="Calibri" pitchFamily="34" charset="0"/>
             </a:endParaRPr>
           </a:p>
@@ -13914,7 +13556,7 @@
               <a:buFont typeface="Arial" charset="0"/>
               <a:buChar char="•"/>
             </a:pPr>
-            <a:endParaRPr lang="en-US" sz="1800" dirty="0" smtClean="0">
+            <a:endParaRPr lang="en-US" sz="1800" dirty="0">
               <a:latin typeface="Calibri" pitchFamily="34" charset="0"/>
             </a:endParaRPr>
           </a:p>
@@ -13931,7 +13573,7 @@
             <a:pPr marL="400050" lvl="1" indent="0">
               <a:buNone/>
             </a:pPr>
-            <a:endParaRPr lang="en-US" sz="1800" dirty="0" smtClean="0">
+            <a:endParaRPr lang="en-US" sz="1800" dirty="0">
               <a:latin typeface="Calibri" pitchFamily="34" charset="0"/>
             </a:endParaRPr>
           </a:p>
@@ -13939,7 +13581,7 @@
             <a:pPr marL="400050" lvl="1" indent="0">
               <a:buNone/>
             </a:pPr>
-            <a:endParaRPr lang="en-US" sz="1800" dirty="0" smtClean="0">
+            <a:endParaRPr lang="en-US" sz="1800" dirty="0">
               <a:latin typeface="Calibri" pitchFamily="34" charset="0"/>
             </a:endParaRPr>
           </a:p>
@@ -13948,15 +13590,15 @@
               <a:buFont typeface="Arial" charset="0"/>
               <a:buChar char="•"/>
             </a:pPr>
-            <a:endParaRPr lang="en-US" sz="1800" dirty="0" smtClean="0">
-              <a:latin typeface="Calibri" pitchFamily="34" charset="0"/>
-            </a:endParaRPr>
-          </a:p>
-          <a:p>
-            <a:endParaRPr lang="en-ZA" dirty="0" smtClean="0"/>
-          </a:p>
-          <a:p>
-            <a:endParaRPr lang="en-ZA" dirty="0" smtClean="0"/>
+            <a:endParaRPr lang="en-US" sz="1800" dirty="0">
+              <a:latin typeface="Calibri" pitchFamily="34" charset="0"/>
+            </a:endParaRPr>
+          </a:p>
+          <a:p>
+            <a:endParaRPr lang="en-ZA" dirty="0"/>
+          </a:p>
+          <a:p>
+            <a:endParaRPr lang="en-ZA" dirty="0"/>
           </a:p>
         </p:txBody>
       </p:sp>
@@ -13970,13 +13612,6 @@
   <p:clrMapOvr>
     <a:masterClrMapping/>
   </p:clrMapOvr>
-  <p:timing>
-    <p:tnLst>
-      <p:par>
-        <p:cTn id="1" dur="indefinite" restart="never" nodeType="tmRoot"/>
-      </p:par>
-    </p:tnLst>
-  </p:timing>
 </p:sld>
 </file>
 
@@ -14071,10 +13706,10 @@
           <a:lstStyle/>
           <a:p>
             <a:r>
-              <a:rPr lang="en-US" b="1" dirty="0" smtClean="0"/>
+              <a:rPr lang="en-US" b="1" dirty="0"/>
               <a:t>Why do larger firms pay more?</a:t>
             </a:r>
-            <a:endParaRPr lang="en-ZA" dirty="0" smtClean="0"/>
+            <a:endParaRPr lang="en-ZA" dirty="0"/>
           </a:p>
         </p:txBody>
       </p:sp>
@@ -14102,7 +13737,7 @@
               <a:buNone/>
             </a:pPr>
             <a:r>
-              <a:rPr lang="en-US" sz="1800" dirty="0" smtClean="0">
+              <a:rPr lang="en-US" sz="1800" dirty="0">
                 <a:latin typeface="Calibri" pitchFamily="34" charset="0"/>
               </a:rPr>
               <a:t>‘Standard’ picture</a:t>
@@ -14116,7 +13751,7 @@
           </a:p>
           <a:p>
             <a:pPr marL="857250" lvl="1" indent="-457200"/>
-            <a:endParaRPr lang="en-US" sz="1800" dirty="0" smtClean="0">
+            <a:endParaRPr lang="en-US" sz="1800" dirty="0">
               <a:latin typeface="Calibri" pitchFamily="34" charset="0"/>
             </a:endParaRPr>
           </a:p>
@@ -14124,7 +13759,7 @@
             <a:pPr marL="0" indent="0">
               <a:buNone/>
             </a:pPr>
-            <a:endParaRPr lang="en-US" sz="1800" dirty="0" smtClean="0">
+            <a:endParaRPr lang="en-US" sz="1800" dirty="0">
               <a:latin typeface="Calibri" pitchFamily="34" charset="0"/>
             </a:endParaRPr>
           </a:p>
@@ -14142,7 +13777,7 @@
               <a:buFont typeface="Arial" charset="0"/>
               <a:buChar char="•"/>
             </a:pPr>
-            <a:endParaRPr lang="en-US" sz="1800" dirty="0" smtClean="0">
+            <a:endParaRPr lang="en-US" sz="1800" dirty="0">
               <a:latin typeface="Calibri" pitchFamily="34" charset="0"/>
             </a:endParaRPr>
           </a:p>
@@ -14151,7 +13786,7 @@
               <a:buFont typeface="Arial" charset="0"/>
               <a:buChar char="•"/>
             </a:pPr>
-            <a:endParaRPr lang="en-US" sz="1800" dirty="0" smtClean="0">
+            <a:endParaRPr lang="en-US" sz="1800" dirty="0">
               <a:latin typeface="Calibri" pitchFamily="34" charset="0"/>
             </a:endParaRPr>
           </a:p>
@@ -14160,7 +13795,7 @@
               <a:buFont typeface="Arial" charset="0"/>
               <a:buChar char="•"/>
             </a:pPr>
-            <a:endParaRPr lang="en-US" sz="1800" dirty="0" smtClean="0">
+            <a:endParaRPr lang="en-US" sz="1800" dirty="0">
               <a:latin typeface="Calibri" pitchFamily="34" charset="0"/>
             </a:endParaRPr>
           </a:p>
@@ -14177,7 +13812,7 @@
             <a:pPr marL="400050" lvl="1" indent="0">
               <a:buNone/>
             </a:pPr>
-            <a:endParaRPr lang="en-US" sz="1800" dirty="0" smtClean="0">
+            <a:endParaRPr lang="en-US" sz="1800" dirty="0">
               <a:latin typeface="Calibri" pitchFamily="34" charset="0"/>
             </a:endParaRPr>
           </a:p>
@@ -14185,7 +13820,7 @@
             <a:pPr marL="400050" lvl="1" indent="0">
               <a:buNone/>
             </a:pPr>
-            <a:endParaRPr lang="en-US" sz="1800" dirty="0" smtClean="0">
+            <a:endParaRPr lang="en-US" sz="1800" dirty="0">
               <a:latin typeface="Calibri" pitchFamily="34" charset="0"/>
             </a:endParaRPr>
           </a:p>
@@ -14194,15 +13829,15 @@
               <a:buFont typeface="Arial" charset="0"/>
               <a:buChar char="•"/>
             </a:pPr>
-            <a:endParaRPr lang="en-US" sz="1800" dirty="0" smtClean="0">
-              <a:latin typeface="Calibri" pitchFamily="34" charset="0"/>
-            </a:endParaRPr>
-          </a:p>
-          <a:p>
-            <a:endParaRPr lang="en-ZA" dirty="0" smtClean="0"/>
-          </a:p>
-          <a:p>
-            <a:endParaRPr lang="en-ZA" dirty="0" smtClean="0"/>
+            <a:endParaRPr lang="en-US" sz="1800" dirty="0">
+              <a:latin typeface="Calibri" pitchFamily="34" charset="0"/>
+            </a:endParaRPr>
+          </a:p>
+          <a:p>
+            <a:endParaRPr lang="en-ZA" dirty="0"/>
+          </a:p>
+          <a:p>
+            <a:endParaRPr lang="en-ZA" dirty="0"/>
           </a:p>
         </p:txBody>
       </p:sp>
@@ -14216,13 +13851,6 @@
   <p:clrMapOvr>
     <a:masterClrMapping/>
   </p:clrMapOvr>
-  <p:timing>
-    <p:tnLst>
-      <p:par>
-        <p:cTn id="1" dur="indefinite" restart="never" nodeType="tmRoot"/>
-      </p:par>
-    </p:tnLst>
-  </p:timing>
 </p:sld>
 </file>
 
@@ -14317,10 +13945,10 @@
           <a:lstStyle/>
           <a:p>
             <a:r>
-              <a:rPr lang="en-US" b="1" dirty="0" smtClean="0"/>
+              <a:rPr lang="en-US" b="1" dirty="0"/>
               <a:t>Why do larger firms pay more?</a:t>
             </a:r>
-            <a:endParaRPr lang="en-ZA" dirty="0" smtClean="0"/>
+            <a:endParaRPr lang="en-ZA" dirty="0"/>
           </a:p>
         </p:txBody>
       </p:sp>
@@ -14351,7 +13979,7 @@
           </a:p>
           <a:p>
             <a:pPr marL="857250" lvl="1" indent="-457200"/>
-            <a:endParaRPr lang="en-US" sz="1800" dirty="0" smtClean="0">
+            <a:endParaRPr lang="en-US" sz="1800" dirty="0">
               <a:latin typeface="Calibri" pitchFamily="34" charset="0"/>
             </a:endParaRPr>
           </a:p>
@@ -14359,7 +13987,7 @@
             <a:pPr marL="0" indent="0">
               <a:buNone/>
             </a:pPr>
-            <a:endParaRPr lang="en-US" sz="1800" dirty="0" smtClean="0">
+            <a:endParaRPr lang="en-US" sz="1800" dirty="0">
               <a:latin typeface="Calibri" pitchFamily="34" charset="0"/>
             </a:endParaRPr>
           </a:p>
@@ -14377,7 +14005,7 @@
               <a:buFont typeface="Arial" charset="0"/>
               <a:buChar char="•"/>
             </a:pPr>
-            <a:endParaRPr lang="en-US" sz="1800" dirty="0" smtClean="0">
+            <a:endParaRPr lang="en-US" sz="1800" dirty="0">
               <a:latin typeface="Calibri" pitchFamily="34" charset="0"/>
             </a:endParaRPr>
           </a:p>
@@ -14386,7 +14014,7 @@
               <a:buFont typeface="Arial" charset="0"/>
               <a:buChar char="•"/>
             </a:pPr>
-            <a:endParaRPr lang="en-US" sz="1800" dirty="0" smtClean="0">
+            <a:endParaRPr lang="en-US" sz="1800" dirty="0">
               <a:latin typeface="Calibri" pitchFamily="34" charset="0"/>
             </a:endParaRPr>
           </a:p>
@@ -14395,7 +14023,7 @@
               <a:buFont typeface="Arial" charset="0"/>
               <a:buChar char="•"/>
             </a:pPr>
-            <a:endParaRPr lang="en-US" sz="1800" dirty="0" smtClean="0">
+            <a:endParaRPr lang="en-US" sz="1800" dirty="0">
               <a:latin typeface="Calibri" pitchFamily="34" charset="0"/>
             </a:endParaRPr>
           </a:p>
@@ -14412,7 +14040,7 @@
             <a:pPr marL="400050" lvl="1" indent="0">
               <a:buNone/>
             </a:pPr>
-            <a:endParaRPr lang="en-US" sz="1800" dirty="0" smtClean="0">
+            <a:endParaRPr lang="en-US" sz="1800" dirty="0">
               <a:latin typeface="Calibri" pitchFamily="34" charset="0"/>
             </a:endParaRPr>
           </a:p>
@@ -14420,7 +14048,7 @@
             <a:pPr marL="400050" lvl="1" indent="0">
               <a:buNone/>
             </a:pPr>
-            <a:endParaRPr lang="en-US" sz="1800" dirty="0" smtClean="0">
+            <a:endParaRPr lang="en-US" sz="1800" dirty="0">
               <a:latin typeface="Calibri" pitchFamily="34" charset="0"/>
             </a:endParaRPr>
           </a:p>
@@ -14429,15 +14057,15 @@
               <a:buFont typeface="Arial" charset="0"/>
               <a:buChar char="•"/>
             </a:pPr>
-            <a:endParaRPr lang="en-US" sz="1800" dirty="0" smtClean="0">
-              <a:latin typeface="Calibri" pitchFamily="34" charset="0"/>
-            </a:endParaRPr>
-          </a:p>
-          <a:p>
-            <a:endParaRPr lang="en-ZA" dirty="0" smtClean="0"/>
-          </a:p>
-          <a:p>
-            <a:endParaRPr lang="en-ZA" dirty="0" smtClean="0"/>
+            <a:endParaRPr lang="en-US" sz="1800" dirty="0">
+              <a:latin typeface="Calibri" pitchFamily="34" charset="0"/>
+            </a:endParaRPr>
+          </a:p>
+          <a:p>
+            <a:endParaRPr lang="en-ZA" dirty="0"/>
+          </a:p>
+          <a:p>
+            <a:endParaRPr lang="en-ZA" dirty="0"/>
           </a:p>
         </p:txBody>
       </p:sp>
@@ -14488,7 +14116,7 @@
           <a:lstStyle/>
           <a:p>
             <a:r>
-              <a:rPr lang="en-ZA" sz="1400" dirty="0" smtClean="0">
+              <a:rPr lang="en-ZA" sz="1400" dirty="0">
                 <a:latin typeface="+mn-lt"/>
               </a:rPr>
               <a:t>Source: SAPED</a:t>
@@ -14496,14 +14124,11 @@
           </a:p>
           <a:p>
             <a:r>
-              <a:rPr lang="en-ZA" sz="1400" dirty="0" smtClean="0">
+              <a:rPr lang="en-ZA" sz="1400" dirty="0">
                 <a:latin typeface="+mn-lt"/>
               </a:rPr>
               <a:t>Notes: Coefficient estimates on size categories. Dependent variable is ln(capital stock/employee).  Controls for industry (at the 2 digit level) and year.</a:t>
             </a:r>
-            <a:endParaRPr lang="en-ZA" sz="1400" dirty="0">
-              <a:latin typeface="+mn-lt"/>
-            </a:endParaRPr>
           </a:p>
         </p:txBody>
       </p:sp>
@@ -14517,13 +14142,6 @@
   <p:clrMapOvr>
     <a:masterClrMapping/>
   </p:clrMapOvr>
-  <p:timing>
-    <p:tnLst>
-      <p:par>
-        <p:cTn id="1" dur="indefinite" restart="never" nodeType="tmRoot"/>
-      </p:par>
-    </p:tnLst>
-  </p:timing>
 </p:sld>
 </file>
 

</xml_diff>